<commit_message>
New icons for Sync Lab
</commit_message>
<xml_diff>
--- a/doc/Icons-SyncLab.pptx
+++ b/doc/Icons-SyncLab.pptx
@@ -19,10 +19,6 @@
       <p:bold r:id="rId5"/>
       <p:italic r:id="rId6"/>
       <p:boldItalic r:id="rId7"/>
-    </p:embeddedFont>
-    <p:embeddedFont>
-      <p:font typeface="Gill Sans Ultra Bold" panose="020B0A02020104020203" pitchFamily="34" charset="0"/>
-      <p:regular r:id="rId8"/>
     </p:embeddedFont>
   </p:embeddedFontLst>
   <p:defaultTextStyle>
@@ -122,7 +118,7 @@
   </p:defaultTextStyle>
   <p:extLst>
     <p:ext uri="{EFAFB233-063F-42B5-8137-9DF3F51BA10A}">
-      <p15:sldGuideLst xmlns:p15="http://schemas.microsoft.com/office/powerpoint/2012/main">
+      <p15:sldGuideLst xmlns:p15="http://schemas.microsoft.com/office/powerpoint/2012/main" xmlns="">
         <p15:guide id="1" orient="horz" pos="2160">
           <p15:clr>
             <a:srgbClr val="A4A3A4"/>
@@ -221,7 +217,7 @@
           <a:p>
             <a:fld id="{6699ACB9-486C-4D62-A3A7-AF98E13EFDA3}" type="datetimeFigureOut">
               <a:rPr lang="en-US" smtClean="0"/>
-              <a:t>2/25/2016</a:t>
+              <a:t>5/25/2017</a:t>
             </a:fld>
             <a:endParaRPr lang="en-US"/>
           </a:p>
@@ -671,7 +667,7 @@
             <a:fld id="{1D8BD707-D9CF-40AE-B4C6-C98DA3205C09}" type="datetimeFigureOut">
               <a:rPr lang="en-US" smtClean="0"/>
               <a:pPr/>
-              <a:t>2/25/2016</a:t>
+              <a:t>5/25/2017</a:t>
             </a:fld>
             <a:endParaRPr lang="en-US"/>
           </a:p>
@@ -838,7 +834,7 @@
             <a:fld id="{1D8BD707-D9CF-40AE-B4C6-C98DA3205C09}" type="datetimeFigureOut">
               <a:rPr lang="en-US" smtClean="0"/>
               <a:pPr/>
-              <a:t>2/25/2016</a:t>
+              <a:t>5/25/2017</a:t>
             </a:fld>
             <a:endParaRPr lang="en-US"/>
           </a:p>
@@ -1015,7 +1011,7 @@
             <a:fld id="{1D8BD707-D9CF-40AE-B4C6-C98DA3205C09}" type="datetimeFigureOut">
               <a:rPr lang="en-US" smtClean="0"/>
               <a:pPr/>
-              <a:t>2/25/2016</a:t>
+              <a:t>5/25/2017</a:t>
             </a:fld>
             <a:endParaRPr lang="en-US"/>
           </a:p>
@@ -1182,7 +1178,7 @@
             <a:fld id="{1D8BD707-D9CF-40AE-B4C6-C98DA3205C09}" type="datetimeFigureOut">
               <a:rPr lang="en-US" smtClean="0"/>
               <a:pPr/>
-              <a:t>2/25/2016</a:t>
+              <a:t>5/25/2017</a:t>
             </a:fld>
             <a:endParaRPr lang="en-US"/>
           </a:p>
@@ -1425,7 +1421,7 @@
             <a:fld id="{1D8BD707-D9CF-40AE-B4C6-C98DA3205C09}" type="datetimeFigureOut">
               <a:rPr lang="en-US" smtClean="0"/>
               <a:pPr/>
-              <a:t>2/25/2016</a:t>
+              <a:t>5/25/2017</a:t>
             </a:fld>
             <a:endParaRPr lang="en-US"/>
           </a:p>
@@ -1710,7 +1706,7 @@
             <a:fld id="{1D8BD707-D9CF-40AE-B4C6-C98DA3205C09}" type="datetimeFigureOut">
               <a:rPr lang="en-US" smtClean="0"/>
               <a:pPr/>
-              <a:t>2/25/2016</a:t>
+              <a:t>5/25/2017</a:t>
             </a:fld>
             <a:endParaRPr lang="en-US"/>
           </a:p>
@@ -2129,7 +2125,7 @@
             <a:fld id="{1D8BD707-D9CF-40AE-B4C6-C98DA3205C09}" type="datetimeFigureOut">
               <a:rPr lang="en-US" smtClean="0"/>
               <a:pPr/>
-              <a:t>2/25/2016</a:t>
+              <a:t>5/25/2017</a:t>
             </a:fld>
             <a:endParaRPr lang="en-US"/>
           </a:p>
@@ -2244,7 +2240,7 @@
             <a:fld id="{1D8BD707-D9CF-40AE-B4C6-C98DA3205C09}" type="datetimeFigureOut">
               <a:rPr lang="en-US" smtClean="0"/>
               <a:pPr/>
-              <a:t>2/25/2016</a:t>
+              <a:t>5/25/2017</a:t>
             </a:fld>
             <a:endParaRPr lang="en-US"/>
           </a:p>
@@ -2336,7 +2332,7 @@
             <a:fld id="{1D8BD707-D9CF-40AE-B4C6-C98DA3205C09}" type="datetimeFigureOut">
               <a:rPr lang="en-US" smtClean="0"/>
               <a:pPr/>
-              <a:t>2/25/2016</a:t>
+              <a:t>5/25/2017</a:t>
             </a:fld>
             <a:endParaRPr lang="en-US"/>
           </a:p>
@@ -2610,7 +2606,7 @@
             <a:fld id="{1D8BD707-D9CF-40AE-B4C6-C98DA3205C09}" type="datetimeFigureOut">
               <a:rPr lang="en-US" smtClean="0"/>
               <a:pPr/>
-              <a:t>2/25/2016</a:t>
+              <a:t>5/25/2017</a:t>
             </a:fld>
             <a:endParaRPr lang="en-US"/>
           </a:p>
@@ -2860,7 +2856,7 @@
             <a:fld id="{1D8BD707-D9CF-40AE-B4C6-C98DA3205C09}" type="datetimeFigureOut">
               <a:rPr lang="en-US" smtClean="0"/>
               <a:pPr/>
-              <a:t>2/25/2016</a:t>
+              <a:t>5/25/2017</a:t>
             </a:fld>
             <a:endParaRPr lang="en-US"/>
           </a:p>
@@ -3070,7 +3066,7 @@
             <a:fld id="{1D8BD707-D9CF-40AE-B4C6-C98DA3205C09}" type="datetimeFigureOut">
               <a:rPr lang="en-US" smtClean="0"/>
               <a:pPr/>
-              <a:t>2/25/2016</a:t>
+              <a:t>5/25/2017</a:t>
             </a:fld>
             <a:endParaRPr lang="en-US"/>
           </a:p>
@@ -3472,7 +3468,7 @@
         </p:blipFill>
         <p:spPr bwMode="auto">
           <a:xfrm>
-            <a:off x="5370276" y="1286373"/>
+            <a:off x="1047658" y="920908"/>
             <a:ext cx="841375" cy="405198"/>
           </a:xfrm>
           <a:prstGeom prst="rect">
@@ -3534,7 +3530,7 @@
         </p:blipFill>
         <p:spPr bwMode="auto">
           <a:xfrm>
-            <a:off x="5370275" y="1728303"/>
+            <a:off x="1047657" y="1362838"/>
             <a:ext cx="841375" cy="384235"/>
           </a:xfrm>
           <a:prstGeom prst="rect">
@@ -3575,70 +3571,6 @@
           </a:extLst>
         </p:spPr>
       </p:pic>
-      <p:sp>
-        <p:nvSpPr>
-          <p:cNvPr id="89" name="Rectangle 88"/>
-          <p:cNvSpPr>
-            <a:spLocks/>
-          </p:cNvSpPr>
-          <p:nvPr/>
-        </p:nvSpPr>
-        <p:spPr>
-          <a:xfrm>
-            <a:off x="5676819" y="3023477"/>
-            <a:ext cx="486412" cy="411139"/>
-          </a:xfrm>
-          <a:prstGeom prst="rect">
-            <a:avLst/>
-          </a:prstGeom>
-          <a:noFill/>
-          <a:ln>
-            <a:noFill/>
-          </a:ln>
-        </p:spPr>
-        <p:style>
-          <a:lnRef idx="2">
-            <a:schemeClr val="accent1">
-              <a:shade val="50000"/>
-            </a:schemeClr>
-          </a:lnRef>
-          <a:fillRef idx="1">
-            <a:schemeClr val="accent1"/>
-          </a:fillRef>
-          <a:effectRef idx="0">
-            <a:schemeClr val="accent1"/>
-          </a:effectRef>
-          <a:fontRef idx="minor">
-            <a:schemeClr val="lt1"/>
-          </a:fontRef>
-        </p:style>
-        <p:txBody>
-          <a:bodyPr rtlCol="0" anchor="ctr"/>
-          <a:lstStyle/>
-          <a:p>
-            <a:pPr algn="ctr"/>
-            <a:r>
-              <a:rPr lang="en-US" sz="3200" dirty="0" smtClean="0">
-                <a:solidFill>
-                  <a:schemeClr val="accent6">
-                    <a:lumMod val="75000"/>
-                  </a:schemeClr>
-                </a:solidFill>
-                <a:latin typeface="Gill Sans Ultra Bold" panose="020B0A02020104020203" pitchFamily="34" charset="0"/>
-              </a:rPr>
-              <a:t>s</a:t>
-            </a:r>
-            <a:endParaRPr lang="en-SG" sz="3200" dirty="0">
-              <a:solidFill>
-                <a:schemeClr val="accent6">
-                  <a:lumMod val="75000"/>
-                </a:schemeClr>
-              </a:solidFill>
-              <a:latin typeface="Gill Sans Ultra Bold" panose="020B0A02020104020203" pitchFamily="34" charset="0"/>
-            </a:endParaRPr>
-          </a:p>
-        </p:txBody>
-      </p:sp>
       <p:pic>
         <p:nvPicPr>
           <p:cNvPr id="1034" name="Picture 10"/>
@@ -3660,7 +3592,7 @@
         </p:blipFill>
         <p:spPr bwMode="auto">
           <a:xfrm>
-            <a:off x="5499596" y="1399757"/>
+            <a:off x="1176978" y="1034292"/>
             <a:ext cx="341745" cy="310398"/>
           </a:xfrm>
           <a:prstGeom prst="rect">
@@ -3722,7 +3654,7 @@
         </p:blipFill>
         <p:spPr bwMode="auto">
           <a:xfrm>
-            <a:off x="5803663" y="1691571"/>
+            <a:off x="1481045" y="1326106"/>
             <a:ext cx="341745" cy="310398"/>
           </a:xfrm>
           <a:prstGeom prst="rect">
@@ -3763,96 +3695,6 @@
           </a:extLst>
         </p:spPr>
       </p:pic>
-      <p:sp>
-        <p:nvSpPr>
-          <p:cNvPr id="93" name="Freeform 92"/>
-          <p:cNvSpPr>
-            <a:spLocks/>
-          </p:cNvSpPr>
-          <p:nvPr/>
-        </p:nvSpPr>
-        <p:spPr>
-          <a:xfrm>
-            <a:off x="5595245" y="2879498"/>
-            <a:ext cx="764929" cy="71832"/>
-          </a:xfrm>
-          <a:custGeom>
-            <a:avLst/>
-            <a:gdLst>
-              <a:gd name="connsiteX0" fmla="*/ 0 w 708025"/>
-              <a:gd name="connsiteY0" fmla="*/ 69850 h 69850"/>
-              <a:gd name="connsiteX1" fmla="*/ 330200 w 708025"/>
-              <a:gd name="connsiteY1" fmla="*/ 69850 h 69850"/>
-              <a:gd name="connsiteX2" fmla="*/ 409575 w 708025"/>
-              <a:gd name="connsiteY2" fmla="*/ 0 h 69850"/>
-              <a:gd name="connsiteX3" fmla="*/ 708025 w 708025"/>
-              <a:gd name="connsiteY3" fmla="*/ 0 h 69850"/>
-            </a:gdLst>
-            <a:ahLst/>
-            <a:cxnLst>
-              <a:cxn ang="0">
-                <a:pos x="connsiteX0" y="connsiteY0"/>
-              </a:cxn>
-              <a:cxn ang="0">
-                <a:pos x="connsiteX1" y="connsiteY1"/>
-              </a:cxn>
-              <a:cxn ang="0">
-                <a:pos x="connsiteX2" y="connsiteY2"/>
-              </a:cxn>
-              <a:cxn ang="0">
-                <a:pos x="connsiteX3" y="connsiteY3"/>
-              </a:cxn>
-            </a:cxnLst>
-            <a:rect l="l" t="t" r="r" b="b"/>
-            <a:pathLst>
-              <a:path w="708025" h="69850">
-                <a:moveTo>
-                  <a:pt x="0" y="69850"/>
-                </a:moveTo>
-                <a:lnTo>
-                  <a:pt x="330200" y="69850"/>
-                </a:lnTo>
-                <a:lnTo>
-                  <a:pt x="409575" y="0"/>
-                </a:lnTo>
-                <a:lnTo>
-                  <a:pt x="708025" y="0"/>
-                </a:lnTo>
-              </a:path>
-            </a:pathLst>
-          </a:custGeom>
-          <a:noFill/>
-          <a:ln w="57150">
-            <a:solidFill>
-              <a:srgbClr val="0070C0"/>
-            </a:solidFill>
-          </a:ln>
-        </p:spPr>
-        <p:style>
-          <a:lnRef idx="2">
-            <a:schemeClr val="accent1">
-              <a:shade val="50000"/>
-            </a:schemeClr>
-          </a:lnRef>
-          <a:fillRef idx="1">
-            <a:schemeClr val="accent1"/>
-          </a:fillRef>
-          <a:effectRef idx="0">
-            <a:schemeClr val="accent1"/>
-          </a:effectRef>
-          <a:fontRef idx="minor">
-            <a:schemeClr val="lt1"/>
-          </a:fontRef>
-        </p:style>
-        <p:txBody>
-          <a:bodyPr rtlCol="0" anchor="ctr"/>
-          <a:lstStyle/>
-          <a:p>
-            <a:pPr algn="ctr"/>
-            <a:endParaRPr lang="en-SG"/>
-          </a:p>
-        </p:txBody>
-      </p:sp>
       <p:pic>
         <p:nvPicPr>
           <p:cNvPr id="1035" name="Picture 11"/>
@@ -3874,7 +3716,7 @@
         </p:blipFill>
         <p:spPr bwMode="auto">
           <a:xfrm>
-            <a:off x="5411551" y="1644846"/>
+            <a:off x="1088933" y="1279381"/>
             <a:ext cx="774700" cy="128587"/>
           </a:xfrm>
           <a:prstGeom prst="rect">
@@ -3915,141 +3757,376 @@
           </a:extLst>
         </p:spPr>
       </p:pic>
-      <p:sp>
-        <p:nvSpPr>
-          <p:cNvPr id="9" name="Rectangle 4"/>
-          <p:cNvSpPr>
-            <a:spLocks/>
-          </p:cNvSpPr>
+      <p:pic>
+        <p:nvPicPr>
+          <p:cNvPr id="1027" name="Picture 3" descr="C:\Users\Ian\Desktop\Paint-Brush-01.png"/>
+          <p:cNvPicPr>
+            <a:picLocks noChangeAspect="1" noChangeArrowheads="1"/>
+          </p:cNvPicPr>
           <p:nvPr/>
-        </p:nvSpPr>
-        <p:spPr>
-          <a:xfrm rot="16200000">
-            <a:off x="3924989" y="2375244"/>
-            <a:ext cx="700291" cy="690781"/>
-          </a:xfrm>
-          <a:custGeom>
-            <a:avLst/>
-            <a:gdLst/>
-            <a:ahLst/>
-            <a:cxnLst/>
-            <a:rect l="l" t="t" r="r" b="b"/>
-            <a:pathLst>
-              <a:path w="1752603" h="1752600">
-                <a:moveTo>
-                  <a:pt x="533400" y="0"/>
-                </a:moveTo>
-                <a:lnTo>
-                  <a:pt x="533403" y="0"/>
-                </a:lnTo>
-                <a:lnTo>
-                  <a:pt x="1066800" y="0"/>
-                </a:lnTo>
-                <a:lnTo>
-                  <a:pt x="1752603" y="0"/>
-                </a:lnTo>
-                <a:lnTo>
-                  <a:pt x="1752603" y="1752600"/>
-                </a:lnTo>
-                <a:lnTo>
-                  <a:pt x="1219203" y="1752600"/>
-                </a:lnTo>
-                <a:lnTo>
-                  <a:pt x="533403" y="1752600"/>
-                </a:lnTo>
-                <a:lnTo>
-                  <a:pt x="3" y="1752600"/>
-                </a:lnTo>
-                <a:lnTo>
-                  <a:pt x="3" y="533430"/>
-                </a:lnTo>
-                <a:cubicBezTo>
-                  <a:pt x="0" y="533420"/>
-                  <a:pt x="0" y="533410"/>
-                  <a:pt x="0" y="533400"/>
-                </a:cubicBezTo>
-                <a:cubicBezTo>
-                  <a:pt x="0" y="238811"/>
-                  <a:pt x="238811" y="0"/>
-                  <a:pt x="533400" y="0"/>
-                </a:cubicBezTo>
-                <a:close/>
-              </a:path>
-            </a:pathLst>
-          </a:custGeom>
-          <a:noFill/>
-          <a:ln w="76200" cmpd="sng">
-            <a:solidFill>
-              <a:srgbClr val="0070C0"/>
-            </a:solidFill>
-            <a:miter lim="800000"/>
-          </a:ln>
-        </p:spPr>
-        <p:style>
-          <a:lnRef idx="2">
-            <a:schemeClr val="accent1">
-              <a:shade val="50000"/>
-            </a:schemeClr>
-          </a:lnRef>
-          <a:fillRef idx="1">
-            <a:schemeClr val="accent1"/>
-          </a:fillRef>
-          <a:effectRef idx="0">
-            <a:schemeClr val="accent1"/>
-          </a:effectRef>
-          <a:fontRef idx="minor">
-            <a:schemeClr val="lt1"/>
-          </a:fontRef>
-        </p:style>
-        <p:txBody>
-          <a:bodyPr rtlCol="0" anchor="ctr"/>
-          <a:lstStyle/>
-          <a:p>
-            <a:pPr algn="ctr"/>
-            <a:endParaRPr lang="en-US"/>
-          </a:p>
-        </p:txBody>
-      </p:sp>
-      <p:sp>
-        <p:nvSpPr>
-          <p:cNvPr id="10" name="TextBox 9"/>
-          <p:cNvSpPr txBox="1">
-            <a:spLocks/>
-          </p:cNvSpPr>
-          <p:nvPr/>
-        </p:nvSpPr>
-        <p:spPr>
+        </p:nvPicPr>
+        <p:blipFill>
+          <a:blip r:embed="rId5">
+            <a:extLst>
+              <a:ext uri="{28A0092B-C50C-407E-A947-70E740481C1C}">
+                <a14:useLocalDpi xmlns:a14="http://schemas.microsoft.com/office/drawing/2010/main" val="0"/>
+              </a:ext>
+            </a:extLst>
+          </a:blip>
+          <a:srcRect/>
+          <a:stretch>
+            <a:fillRect/>
+          </a:stretch>
+        </p:blipFill>
+        <p:spPr bwMode="auto">
           <a:xfrm>
-            <a:off x="4029590" y="2261658"/>
-            <a:ext cx="516488" cy="892552"/>
+            <a:off x="3213100" y="1152594"/>
+            <a:ext cx="457200" cy="457200"/>
           </a:xfrm>
           <a:prstGeom prst="rect">
             <a:avLst/>
           </a:prstGeom>
           <a:noFill/>
+          <a:extLst>
+            <a:ext uri="{909E8E84-426E-40DD-AFC4-6F175D3DCCD1}">
+              <a14:hiddenFill xmlns:a14="http://schemas.microsoft.com/office/drawing/2010/main">
+                <a:solidFill>
+                  <a:srgbClr val="FFFFFF"/>
+                </a:solidFill>
+              </a14:hiddenFill>
+            </a:ext>
+          </a:extLst>
         </p:spPr>
-        <p:txBody>
-          <a:bodyPr wrap="none" rtlCol="0">
-            <a:spAutoFit/>
-          </a:bodyPr>
-          <a:lstStyle/>
-          <a:p>
-            <a:r>
-              <a:rPr lang="en-US" sz="5200" dirty="0" smtClean="0">
+      </p:pic>
+      <p:pic>
+        <p:nvPicPr>
+          <p:cNvPr id="1028" name="Picture 4" descr="C:\Users\Ian\Desktop\Color1.png"/>
+          <p:cNvPicPr>
+            <a:picLocks noChangeAspect="1" noChangeArrowheads="1"/>
+          </p:cNvPicPr>
+          <p:nvPr/>
+        </p:nvPicPr>
+        <p:blipFill>
+          <a:blip r:embed="rId6">
+            <a:extLst>
+              <a:ext uri="{28A0092B-C50C-407E-A947-70E740481C1C}">
+                <a14:useLocalDpi xmlns:a14="http://schemas.microsoft.com/office/drawing/2010/main" val="0"/>
+              </a:ext>
+            </a:extLst>
+          </a:blip>
+          <a:srcRect/>
+          <a:stretch>
+            <a:fillRect/>
+          </a:stretch>
+        </p:blipFill>
+        <p:spPr bwMode="auto">
+          <a:xfrm>
+            <a:off x="4035211" y="1152594"/>
+            <a:ext cx="457200" cy="457200"/>
+          </a:xfrm>
+          <a:prstGeom prst="rect">
+            <a:avLst/>
+          </a:prstGeom>
+          <a:noFill/>
+          <a:extLst>
+            <a:ext uri="{909E8E84-426E-40DD-AFC4-6F175D3DCCD1}">
+              <a14:hiddenFill xmlns:a14="http://schemas.microsoft.com/office/drawing/2010/main">
                 <a:solidFill>
-                  <a:srgbClr val="E46A09"/>
+                  <a:srgbClr val="FFFFFF"/>
                 </a:solidFill>
-              </a:rPr>
-              <a:t>=</a:t>
-            </a:r>
-            <a:endParaRPr lang="en-US" sz="5200" dirty="0">
+              </a14:hiddenFill>
+            </a:ext>
+          </a:extLst>
+        </p:spPr>
+      </p:pic>
+      <p:pic>
+        <p:nvPicPr>
+          <p:cNvPr id="1029" name="Picture 5" descr="C:\Users\Ian\Desktop\Garbage-Closed.png"/>
+          <p:cNvPicPr>
+            <a:picLocks noChangeAspect="1" noChangeArrowheads="1"/>
+          </p:cNvPicPr>
+          <p:nvPr/>
+        </p:nvPicPr>
+        <p:blipFill>
+          <a:blip r:embed="rId7">
+            <a:extLst>
+              <a:ext uri="{28A0092B-C50C-407E-A947-70E740481C1C}">
+                <a14:useLocalDpi xmlns:a14="http://schemas.microsoft.com/office/drawing/2010/main" val="0"/>
+              </a:ext>
+            </a:extLst>
+          </a:blip>
+          <a:srcRect/>
+          <a:stretch>
+            <a:fillRect/>
+          </a:stretch>
+        </p:blipFill>
+        <p:spPr bwMode="auto">
+          <a:xfrm>
+            <a:off x="4825185" y="1163027"/>
+            <a:ext cx="457200" cy="457200"/>
+          </a:xfrm>
+          <a:prstGeom prst="rect">
+            <a:avLst/>
+          </a:prstGeom>
+          <a:noFill/>
+          <a:extLst>
+            <a:ext uri="{909E8E84-426E-40DD-AFC4-6F175D3DCCD1}">
+              <a14:hiddenFill xmlns:a14="http://schemas.microsoft.com/office/drawing/2010/main">
+                <a:solidFill>
+                  <a:srgbClr val="FFFFFF"/>
+                </a:solidFill>
+              </a14:hiddenFill>
+            </a:ext>
+          </a:extLst>
+        </p:spPr>
+      </p:pic>
+      <p:grpSp>
+        <p:nvGrpSpPr>
+          <p:cNvPr id="4" name="Group 3"/>
+          <p:cNvGrpSpPr/>
+          <p:nvPr/>
+        </p:nvGrpSpPr>
+        <p:grpSpPr>
+          <a:xfrm>
+            <a:off x="2330918" y="1161984"/>
+            <a:ext cx="457200" cy="457200"/>
+            <a:chOff x="2368537" y="1161984"/>
+            <a:chExt cx="457200" cy="457200"/>
+          </a:xfrm>
+        </p:grpSpPr>
+        <p:sp>
+          <p:nvSpPr>
+            <p:cNvPr id="17" name="Cross 16"/>
+            <p:cNvSpPr/>
+            <p:nvPr/>
+          </p:nvSpPr>
+          <p:spPr>
+            <a:xfrm>
+              <a:off x="2553637" y="1353160"/>
+              <a:ext cx="228600" cy="228600"/>
+            </a:xfrm>
+            <a:prstGeom prst="plus">
+              <a:avLst>
+                <a:gd name="adj" fmla="val 33338"/>
+              </a:avLst>
+            </a:prstGeom>
+            <a:solidFill>
+              <a:srgbClr val="4D7399"/>
+            </a:solidFill>
+            <a:ln>
+              <a:noFill/>
+            </a:ln>
+          </p:spPr>
+          <p:style>
+            <a:lnRef idx="2">
+              <a:schemeClr val="accent1">
+                <a:shade val="50000"/>
+              </a:schemeClr>
+            </a:lnRef>
+            <a:fillRef idx="1">
+              <a:schemeClr val="accent1"/>
+            </a:fillRef>
+            <a:effectRef idx="0">
+              <a:schemeClr val="accent1"/>
+            </a:effectRef>
+            <a:fontRef idx="minor">
+              <a:schemeClr val="lt1"/>
+            </a:fontRef>
+          </p:style>
+          <p:txBody>
+            <a:bodyPr rtlCol="0" anchor="ctr"/>
+            <a:lstStyle/>
+            <a:p>
+              <a:pPr algn="ctr"/>
+              <a:endParaRPr lang="en-US"/>
+            </a:p>
+          </p:txBody>
+        </p:sp>
+        <p:cxnSp>
+          <p:nvCxnSpPr>
+            <p:cNvPr id="3" name="Straight Connector 2"/>
+            <p:cNvCxnSpPr/>
+            <p:nvPr/>
+          </p:nvCxnSpPr>
+          <p:spPr>
+            <a:xfrm>
+              <a:off x="2451804" y="1197068"/>
+              <a:ext cx="0" cy="387033"/>
+            </a:xfrm>
+            <a:prstGeom prst="line">
+              <a:avLst/>
+            </a:prstGeom>
+            <a:ln w="38100" cap="rnd">
               <a:solidFill>
-                <a:srgbClr val="E46A09"/>
+                <a:srgbClr val="4D7399"/>
               </a:solidFill>
-            </a:endParaRPr>
-          </a:p>
-        </p:txBody>
-      </p:sp>
+            </a:ln>
+          </p:spPr>
+          <p:style>
+            <a:lnRef idx="1">
+              <a:schemeClr val="accent1"/>
+            </a:lnRef>
+            <a:fillRef idx="0">
+              <a:schemeClr val="accent1"/>
+            </a:fillRef>
+            <a:effectRef idx="0">
+              <a:schemeClr val="accent1"/>
+            </a:effectRef>
+            <a:fontRef idx="minor">
+              <a:schemeClr val="tx1"/>
+            </a:fontRef>
+          </p:style>
+        </p:cxnSp>
+        <p:cxnSp>
+          <p:nvCxnSpPr>
+            <p:cNvPr id="22" name="Straight Connector 21"/>
+            <p:cNvCxnSpPr/>
+            <p:nvPr/>
+          </p:nvCxnSpPr>
+          <p:spPr>
+            <a:xfrm>
+              <a:off x="2459977" y="1194126"/>
+              <a:ext cx="274320" cy="2942"/>
+            </a:xfrm>
+            <a:prstGeom prst="line">
+              <a:avLst/>
+            </a:prstGeom>
+            <a:ln w="38100" cap="rnd">
+              <a:solidFill>
+                <a:srgbClr val="4D7399"/>
+              </a:solidFill>
+            </a:ln>
+          </p:spPr>
+          <p:style>
+            <a:lnRef idx="1">
+              <a:schemeClr val="accent1"/>
+            </a:lnRef>
+            <a:fillRef idx="0">
+              <a:schemeClr val="accent1"/>
+            </a:fillRef>
+            <a:effectRef idx="0">
+              <a:schemeClr val="accent1"/>
+            </a:effectRef>
+            <a:fontRef idx="minor">
+              <a:schemeClr val="tx1"/>
+            </a:fontRef>
+          </p:style>
+        </p:cxnSp>
+        <p:cxnSp>
+          <p:nvCxnSpPr>
+            <p:cNvPr id="24" name="Straight Connector 23"/>
+            <p:cNvCxnSpPr/>
+            <p:nvPr/>
+          </p:nvCxnSpPr>
+          <p:spPr>
+            <a:xfrm flipV="1">
+              <a:off x="2734297" y="1200235"/>
+              <a:ext cx="0" cy="121003"/>
+            </a:xfrm>
+            <a:prstGeom prst="line">
+              <a:avLst/>
+            </a:prstGeom>
+            <a:ln w="38100" cap="rnd">
+              <a:solidFill>
+                <a:srgbClr val="4D7399"/>
+              </a:solidFill>
+            </a:ln>
+          </p:spPr>
+          <p:style>
+            <a:lnRef idx="1">
+              <a:schemeClr val="accent1"/>
+            </a:lnRef>
+            <a:fillRef idx="0">
+              <a:schemeClr val="accent1"/>
+            </a:fillRef>
+            <a:effectRef idx="0">
+              <a:schemeClr val="accent1"/>
+            </a:effectRef>
+            <a:fontRef idx="minor">
+              <a:schemeClr val="tx1"/>
+            </a:fontRef>
+          </p:style>
+        </p:cxnSp>
+        <p:cxnSp>
+          <p:nvCxnSpPr>
+            <p:cNvPr id="26" name="Straight Connector 25"/>
+            <p:cNvCxnSpPr/>
+            <p:nvPr/>
+          </p:nvCxnSpPr>
+          <p:spPr>
+            <a:xfrm>
+              <a:off x="2451804" y="1587563"/>
+              <a:ext cx="91440" cy="0"/>
+            </a:xfrm>
+            <a:prstGeom prst="line">
+              <a:avLst/>
+            </a:prstGeom>
+            <a:ln w="38100" cap="rnd">
+              <a:solidFill>
+                <a:srgbClr val="4D7399"/>
+              </a:solidFill>
+            </a:ln>
+          </p:spPr>
+          <p:style>
+            <a:lnRef idx="1">
+              <a:schemeClr val="accent1"/>
+            </a:lnRef>
+            <a:fillRef idx="0">
+              <a:schemeClr val="accent1"/>
+            </a:fillRef>
+            <a:effectRef idx="0">
+              <a:schemeClr val="accent1"/>
+            </a:effectRef>
+            <a:fontRef idx="minor">
+              <a:schemeClr val="tx1"/>
+            </a:fontRef>
+          </p:style>
+        </p:cxnSp>
+        <p:sp>
+          <p:nvSpPr>
+            <p:cNvPr id="2" name="Rectangle 1"/>
+            <p:cNvSpPr/>
+            <p:nvPr/>
+          </p:nvSpPr>
+          <p:spPr>
+            <a:xfrm>
+              <a:off x="2368537" y="1161984"/>
+              <a:ext cx="457200" cy="457200"/>
+            </a:xfrm>
+            <a:prstGeom prst="rect">
+              <a:avLst/>
+            </a:prstGeom>
+            <a:noFill/>
+            <a:ln>
+              <a:noFill/>
+            </a:ln>
+          </p:spPr>
+          <p:style>
+            <a:lnRef idx="2">
+              <a:schemeClr val="accent1">
+                <a:shade val="50000"/>
+              </a:schemeClr>
+            </a:lnRef>
+            <a:fillRef idx="1">
+              <a:schemeClr val="accent1"/>
+            </a:fillRef>
+            <a:effectRef idx="0">
+              <a:schemeClr val="accent1"/>
+            </a:effectRef>
+            <a:fontRef idx="minor">
+              <a:schemeClr val="lt1"/>
+            </a:fontRef>
+          </p:style>
+          <p:txBody>
+            <a:bodyPr rtlCol="0" anchor="ctr"/>
+            <a:lstStyle/>
+            <a:p>
+              <a:pPr algn="ctr"/>
+              <a:endParaRPr lang="en-US"/>
+            </a:p>
+          </p:txBody>
+        </p:sp>
+      </p:grpSp>
     </p:spTree>
     <p:extLst>
       <p:ext uri="{BB962C8B-B14F-4D97-AF65-F5344CB8AC3E}">

</xml_diff>

<commit_message>
Add padding to icons
</commit_message>
<xml_diff>
--- a/doc/Icons-SyncLab.pptx
+++ b/doc/Icons-SyncLab.pptx
@@ -118,7 +118,7 @@
   </p:defaultTextStyle>
   <p:extLst>
     <p:ext uri="{EFAFB233-063F-42B5-8137-9DF3F51BA10A}">
-      <p15:sldGuideLst xmlns:p15="http://schemas.microsoft.com/office/powerpoint/2012/main" xmlns="">
+      <p15:sldGuideLst xmlns="" xmlns:p15="http://schemas.microsoft.com/office/powerpoint/2012/main">
         <p15:guide id="1" orient="horz" pos="2160">
           <p15:clr>
             <a:srgbClr val="A4A3A4"/>
@@ -3888,10 +3888,10 @@
         </p:nvGrpSpPr>
         <p:grpSpPr>
           <a:xfrm>
-            <a:off x="2330918" y="1161984"/>
-            <a:ext cx="457200" cy="457200"/>
-            <a:chOff x="2368537" y="1161984"/>
-            <a:chExt cx="457200" cy="457200"/>
+            <a:off x="2308058" y="1140167"/>
+            <a:ext cx="502920" cy="502920"/>
+            <a:chOff x="2345677" y="1140167"/>
+            <a:chExt cx="502920" cy="502920"/>
           </a:xfrm>
         </p:grpSpPr>
         <p:sp>
@@ -4090,8 +4090,8 @@
           </p:nvSpPr>
           <p:spPr>
             <a:xfrm>
-              <a:off x="2368537" y="1161984"/>
-              <a:ext cx="457200" cy="457200"/>
+              <a:off x="2345677" y="1140167"/>
+              <a:ext cx="502920" cy="502920"/>
             </a:xfrm>
             <a:prstGeom prst="rect">
               <a:avLst/>

</xml_diff>

<commit_message>
Change icon according to suggestions
</commit_message>
<xml_diff>
--- a/doc/Icons-SyncLab.pptx
+++ b/doc/Icons-SyncLab.pptx
@@ -3757,162 +3757,251 @@
           </a:extLst>
         </p:spPr>
       </p:pic>
-      <p:pic>
-        <p:nvPicPr>
-          <p:cNvPr id="1027" name="Picture 3" descr="C:\Users\Ian\Desktop\Paint-Brush-01.png"/>
-          <p:cNvPicPr>
-            <a:picLocks noChangeAspect="1" noChangeArrowheads="1"/>
-          </p:cNvPicPr>
-          <p:nvPr/>
-        </p:nvPicPr>
-        <p:blipFill>
-          <a:blip r:embed="rId5">
-            <a:extLst>
-              <a:ext uri="{28A0092B-C50C-407E-A947-70E740481C1C}">
-                <a14:useLocalDpi xmlns:a14="http://schemas.microsoft.com/office/drawing/2010/main" val="0"/>
-              </a:ext>
-            </a:extLst>
-          </a:blip>
-          <a:srcRect/>
-          <a:stretch>
-            <a:fillRect/>
-          </a:stretch>
-        </p:blipFill>
-        <p:spPr bwMode="auto">
-          <a:xfrm>
-            <a:off x="3213100" y="1152594"/>
-            <a:ext cx="457200" cy="457200"/>
-          </a:xfrm>
-          <a:prstGeom prst="rect">
-            <a:avLst/>
-          </a:prstGeom>
-          <a:noFill/>
-          <a:extLst>
-            <a:ext uri="{909E8E84-426E-40DD-AFC4-6F175D3DCCD1}">
-              <a14:hiddenFill xmlns:a14="http://schemas.microsoft.com/office/drawing/2010/main">
-                <a:solidFill>
-                  <a:srgbClr val="FFFFFF"/>
-                </a:solidFill>
-              </a14:hiddenFill>
-            </a:ext>
-          </a:extLst>
-        </p:spPr>
-      </p:pic>
-      <p:pic>
-        <p:nvPicPr>
-          <p:cNvPr id="1028" name="Picture 4" descr="C:\Users\Ian\Desktop\Color1.png"/>
-          <p:cNvPicPr>
-            <a:picLocks noChangeAspect="1" noChangeArrowheads="1"/>
-          </p:cNvPicPr>
-          <p:nvPr/>
-        </p:nvPicPr>
-        <p:blipFill>
-          <a:blip r:embed="rId6">
-            <a:extLst>
-              <a:ext uri="{28A0092B-C50C-407E-A947-70E740481C1C}">
-                <a14:useLocalDpi xmlns:a14="http://schemas.microsoft.com/office/drawing/2010/main" val="0"/>
-              </a:ext>
-            </a:extLst>
-          </a:blip>
-          <a:srcRect/>
-          <a:stretch>
-            <a:fillRect/>
-          </a:stretch>
-        </p:blipFill>
-        <p:spPr bwMode="auto">
-          <a:xfrm>
-            <a:off x="4035211" y="1152594"/>
-            <a:ext cx="457200" cy="457200"/>
-          </a:xfrm>
-          <a:prstGeom prst="rect">
-            <a:avLst/>
-          </a:prstGeom>
-          <a:noFill/>
-          <a:extLst>
-            <a:ext uri="{909E8E84-426E-40DD-AFC4-6F175D3DCCD1}">
-              <a14:hiddenFill xmlns:a14="http://schemas.microsoft.com/office/drawing/2010/main">
-                <a:solidFill>
-                  <a:srgbClr val="FFFFFF"/>
-                </a:solidFill>
-              </a14:hiddenFill>
-            </a:ext>
-          </a:extLst>
-        </p:spPr>
-      </p:pic>
-      <p:pic>
-        <p:nvPicPr>
-          <p:cNvPr id="1029" name="Picture 5" descr="C:\Users\Ian\Desktop\Garbage-Closed.png"/>
-          <p:cNvPicPr>
-            <a:picLocks noChangeAspect="1" noChangeArrowheads="1"/>
-          </p:cNvPicPr>
-          <p:nvPr/>
-        </p:nvPicPr>
-        <p:blipFill>
-          <a:blip r:embed="rId7">
-            <a:extLst>
-              <a:ext uri="{28A0092B-C50C-407E-A947-70E740481C1C}">
-                <a14:useLocalDpi xmlns:a14="http://schemas.microsoft.com/office/drawing/2010/main" val="0"/>
-              </a:ext>
-            </a:extLst>
-          </a:blip>
-          <a:srcRect/>
-          <a:stretch>
-            <a:fillRect/>
-          </a:stretch>
-        </p:blipFill>
-        <p:spPr bwMode="auto">
-          <a:xfrm>
-            <a:off x="4825185" y="1163027"/>
-            <a:ext cx="457200" cy="457200"/>
-          </a:xfrm>
-          <a:prstGeom prst="rect">
-            <a:avLst/>
-          </a:prstGeom>
-          <a:noFill/>
-          <a:extLst>
-            <a:ext uri="{909E8E84-426E-40DD-AFC4-6F175D3DCCD1}">
-              <a14:hiddenFill xmlns:a14="http://schemas.microsoft.com/office/drawing/2010/main">
-                <a:solidFill>
-                  <a:srgbClr val="FFFFFF"/>
-                </a:solidFill>
-              </a14:hiddenFill>
-            </a:ext>
-          </a:extLst>
-        </p:spPr>
-      </p:pic>
       <p:grpSp>
         <p:nvGrpSpPr>
-          <p:cNvPr id="4" name="Group 3"/>
+          <p:cNvPr id="18" name="Group 17"/>
           <p:cNvGrpSpPr/>
           <p:nvPr/>
         </p:nvGrpSpPr>
         <p:grpSpPr>
           <a:xfrm>
-            <a:off x="2308058" y="1140167"/>
-            <a:ext cx="502920" cy="502920"/>
-            <a:chOff x="2345677" y="1140167"/>
-            <a:chExt cx="502920" cy="502920"/>
+            <a:off x="3334142" y="1075004"/>
+            <a:ext cx="549071" cy="549822"/>
+            <a:chOff x="4180111" y="1375544"/>
+            <a:chExt cx="549071" cy="549822"/>
           </a:xfrm>
         </p:grpSpPr>
+        <p:grpSp>
+          <p:nvGrpSpPr>
+            <p:cNvPr id="19" name="Group 18"/>
+            <p:cNvGrpSpPr/>
+            <p:nvPr/>
+          </p:nvGrpSpPr>
+          <p:grpSpPr>
+            <a:xfrm>
+              <a:off x="4235574" y="1385216"/>
+              <a:ext cx="446467" cy="521728"/>
+              <a:chOff x="4821567" y="919204"/>
+              <a:chExt cx="446467" cy="521728"/>
+            </a:xfrm>
+          </p:grpSpPr>
+          <p:sp>
+            <p:nvSpPr>
+              <p:cNvPr id="21" name="Rectangle 20"/>
+              <p:cNvSpPr/>
+              <p:nvPr/>
+            </p:nvSpPr>
+            <p:spPr>
+              <a:xfrm>
+                <a:off x="4821567" y="971454"/>
+                <a:ext cx="343904" cy="406070"/>
+              </a:xfrm>
+              <a:prstGeom prst="rect">
+                <a:avLst/>
+              </a:prstGeom>
+              <a:solidFill>
+                <a:schemeClr val="tx1"/>
+              </a:solidFill>
+              <a:ln>
+                <a:noFill/>
+              </a:ln>
+            </p:spPr>
+            <p:style>
+              <a:lnRef idx="2">
+                <a:schemeClr val="accent1">
+                  <a:shade val="50000"/>
+                </a:schemeClr>
+              </a:lnRef>
+              <a:fillRef idx="1">
+                <a:schemeClr val="accent1"/>
+              </a:fillRef>
+              <a:effectRef idx="0">
+                <a:schemeClr val="accent1"/>
+              </a:effectRef>
+              <a:fontRef idx="minor">
+                <a:schemeClr val="lt1"/>
+              </a:fontRef>
+            </p:style>
+            <p:txBody>
+              <a:bodyPr rtlCol="0" anchor="ctr"/>
+              <a:lstStyle/>
+              <a:p>
+                <a:pPr algn="ctr"/>
+                <a:endParaRPr lang="en-US"/>
+              </a:p>
+            </p:txBody>
+          </p:sp>
+          <p:sp>
+            <p:nvSpPr>
+              <p:cNvPr id="23" name="Rectangle: Folded Corner 1026"/>
+              <p:cNvSpPr/>
+              <p:nvPr/>
+            </p:nvSpPr>
+            <p:spPr>
+              <a:xfrm rot="10800000" flipH="1">
+                <a:off x="4990894" y="1102754"/>
+                <a:ext cx="277140" cy="338178"/>
+              </a:xfrm>
+              <a:prstGeom prst="foldedCorner">
+                <a:avLst>
+                  <a:gd name="adj" fmla="val 44103"/>
+                </a:avLst>
+              </a:prstGeom>
+              <a:solidFill>
+                <a:schemeClr val="bg1"/>
+              </a:solidFill>
+              <a:ln>
+                <a:solidFill>
+                  <a:schemeClr val="tx1"/>
+                </a:solidFill>
+              </a:ln>
+            </p:spPr>
+            <p:style>
+              <a:lnRef idx="2">
+                <a:schemeClr val="accent1">
+                  <a:shade val="50000"/>
+                </a:schemeClr>
+              </a:lnRef>
+              <a:fillRef idx="1">
+                <a:schemeClr val="accent1"/>
+              </a:fillRef>
+              <a:effectRef idx="0">
+                <a:schemeClr val="accent1"/>
+              </a:effectRef>
+              <a:fontRef idx="minor">
+                <a:schemeClr val="lt1"/>
+              </a:fontRef>
+            </p:style>
+            <p:txBody>
+              <a:bodyPr rtlCol="0" anchor="ctr"/>
+              <a:lstStyle/>
+              <a:p>
+                <a:pPr algn="ctr"/>
+                <a:endParaRPr lang="en-US"/>
+              </a:p>
+            </p:txBody>
+          </p:sp>
+          <p:sp>
+            <p:nvSpPr>
+              <p:cNvPr id="25" name="Rounded Rectangle 227"/>
+              <p:cNvSpPr/>
+              <p:nvPr/>
+            </p:nvSpPr>
+            <p:spPr>
+              <a:xfrm rot="10800000">
+                <a:off x="4879960" y="919204"/>
+                <a:ext cx="234247" cy="101171"/>
+              </a:xfrm>
+              <a:custGeom>
+                <a:avLst/>
+                <a:gdLst/>
+                <a:ahLst/>
+                <a:cxnLst/>
+                <a:rect l="l" t="t" r="r" b="b"/>
+                <a:pathLst>
+                  <a:path w="286327" h="1000124">
+                    <a:moveTo>
+                      <a:pt x="2115" y="0"/>
+                    </a:moveTo>
+                    <a:lnTo>
+                      <a:pt x="284212" y="0"/>
+                    </a:lnTo>
+                    <a:cubicBezTo>
+                      <a:pt x="286188" y="3367"/>
+                      <a:pt x="286327" y="6905"/>
+                      <a:pt x="286327" y="10476"/>
+                    </a:cubicBezTo>
+                    <a:lnTo>
+                      <a:pt x="286327" y="712825"/>
+                    </a:lnTo>
+                    <a:cubicBezTo>
+                      <a:pt x="286327" y="772047"/>
+                      <a:pt x="247915" y="822299"/>
+                      <a:pt x="194109" y="838409"/>
+                    </a:cubicBezTo>
+                    <a:cubicBezTo>
+                      <a:pt x="194108" y="875332"/>
+                      <a:pt x="194108" y="912256"/>
+                      <a:pt x="194108" y="949179"/>
+                    </a:cubicBezTo>
+                    <a:cubicBezTo>
+                      <a:pt x="194108" y="977315"/>
+                      <a:pt x="171299" y="1000124"/>
+                      <a:pt x="143163" y="1000124"/>
+                    </a:cubicBezTo>
+                    <a:lnTo>
+                      <a:pt x="143164" y="1000123"/>
+                    </a:lnTo>
+                    <a:cubicBezTo>
+                      <a:pt x="115028" y="1000123"/>
+                      <a:pt x="92219" y="977314"/>
+                      <a:pt x="92219" y="949178"/>
+                    </a:cubicBezTo>
+                    <a:lnTo>
+                      <a:pt x="92219" y="838409"/>
+                    </a:lnTo>
+                    <a:cubicBezTo>
+                      <a:pt x="38413" y="822299"/>
+                      <a:pt x="0" y="772048"/>
+                      <a:pt x="0" y="712825"/>
+                    </a:cubicBezTo>
+                    <a:lnTo>
+                      <a:pt x="0" y="10476"/>
+                    </a:lnTo>
+                    <a:close/>
+                  </a:path>
+                </a:pathLst>
+              </a:custGeom>
+              <a:solidFill>
+                <a:schemeClr val="tx1"/>
+              </a:solidFill>
+              <a:ln w="19050">
+                <a:solidFill>
+                  <a:schemeClr val="bg1"/>
+                </a:solidFill>
+              </a:ln>
+            </p:spPr>
+            <p:style>
+              <a:lnRef idx="2">
+                <a:schemeClr val="accent1">
+                  <a:shade val="50000"/>
+                </a:schemeClr>
+              </a:lnRef>
+              <a:fillRef idx="1">
+                <a:schemeClr val="accent1"/>
+              </a:fillRef>
+              <a:effectRef idx="0">
+                <a:schemeClr val="accent1"/>
+              </a:effectRef>
+              <a:fontRef idx="minor">
+                <a:schemeClr val="lt1"/>
+              </a:fontRef>
+            </p:style>
+            <p:txBody>
+              <a:bodyPr rtlCol="0" anchor="ctr"/>
+              <a:lstStyle/>
+              <a:p>
+                <a:pPr algn="ctr"/>
+                <a:endParaRPr lang="en-SG"/>
+              </a:p>
+            </p:txBody>
+          </p:sp>
+        </p:grpSp>
         <p:sp>
           <p:nvSpPr>
-            <p:cNvPr id="17" name="Cross 16"/>
+            <p:cNvPr id="20" name="Rectangle 19"/>
             <p:cNvSpPr/>
             <p:nvPr/>
           </p:nvSpPr>
           <p:spPr>
-            <a:xfrm>
-              <a:off x="2553637" y="1353160"/>
-              <a:ext cx="228600" cy="228600"/>
+            <a:xfrm rot="10800000">
+              <a:off x="4180111" y="1375544"/>
+              <a:ext cx="549071" cy="549822"/>
             </a:xfrm>
-            <a:prstGeom prst="plus">
-              <a:avLst>
-                <a:gd name="adj" fmla="val 33338"/>
-              </a:avLst>
+            <a:prstGeom prst="rect">
+              <a:avLst/>
             </a:prstGeom>
-            <a:solidFill>
-              <a:srgbClr val="4D7399"/>
-            </a:solidFill>
+            <a:noFill/>
             <a:ln>
               <a:noFill/>
             </a:ln>
@@ -3934,31 +4023,317 @@
             </a:fontRef>
           </p:style>
           <p:txBody>
-            <a:bodyPr rtlCol="0" anchor="ctr"/>
+            <a:bodyPr wrap="none" lIns="0" tIns="0" rIns="0" bIns="0" rtlCol="0" anchor="ctr"/>
             <a:lstStyle/>
             <a:p>
               <a:pPr algn="ctr"/>
-              <a:endParaRPr lang="en-US"/>
+              <a:endParaRPr lang="en-US" b="1"/>
             </a:p>
           </p:txBody>
         </p:sp>
+      </p:grpSp>
+      <p:sp>
+        <p:nvSpPr>
+          <p:cNvPr id="27" name="TextBox 26"/>
+          <p:cNvSpPr txBox="1"/>
+          <p:nvPr/>
+        </p:nvSpPr>
+        <p:spPr>
+          <a:xfrm>
+            <a:off x="2352579" y="1661781"/>
+            <a:ext cx="458399" cy="215444"/>
+          </a:xfrm>
+          <a:prstGeom prst="rect">
+            <a:avLst/>
+          </a:prstGeom>
+          <a:noFill/>
+        </p:spPr>
+        <p:txBody>
+          <a:bodyPr wrap="square" rtlCol="0">
+            <a:spAutoFit/>
+          </a:bodyPr>
+          <a:lstStyle/>
+          <a:p>
+            <a:r>
+              <a:rPr lang="en-US" sz="800" dirty="0" smtClean="0"/>
+              <a:t>Copy</a:t>
+            </a:r>
+            <a:endParaRPr lang="en-SG" sz="800" dirty="0"/>
+          </a:p>
+        </p:txBody>
+      </p:sp>
+      <p:sp>
+        <p:nvSpPr>
+          <p:cNvPr id="28" name="TextBox 27"/>
+          <p:cNvSpPr txBox="1"/>
+          <p:nvPr/>
+        </p:nvSpPr>
+        <p:spPr>
+          <a:xfrm>
+            <a:off x="3400394" y="1651827"/>
+            <a:ext cx="458399" cy="215444"/>
+          </a:xfrm>
+          <a:prstGeom prst="rect">
+            <a:avLst/>
+          </a:prstGeom>
+          <a:noFill/>
+        </p:spPr>
+        <p:txBody>
+          <a:bodyPr wrap="square" rtlCol="0">
+            <a:spAutoFit/>
+          </a:bodyPr>
+          <a:lstStyle/>
+          <a:p>
+            <a:r>
+              <a:rPr lang="en-US" sz="800" dirty="0" smtClean="0"/>
+              <a:t>Paste</a:t>
+            </a:r>
+            <a:endParaRPr lang="en-SG" sz="800" dirty="0"/>
+          </a:p>
+        </p:txBody>
+      </p:sp>
+      <p:sp>
+        <p:nvSpPr>
+          <p:cNvPr id="29" name="TextBox 28"/>
+          <p:cNvSpPr txBox="1"/>
+          <p:nvPr/>
+        </p:nvSpPr>
+        <p:spPr>
+          <a:xfrm>
+            <a:off x="4405396" y="1639351"/>
+            <a:ext cx="458399" cy="215444"/>
+          </a:xfrm>
+          <a:prstGeom prst="rect">
+            <a:avLst/>
+          </a:prstGeom>
+          <a:noFill/>
+        </p:spPr>
+        <p:txBody>
+          <a:bodyPr wrap="square" rtlCol="0">
+            <a:spAutoFit/>
+          </a:bodyPr>
+          <a:lstStyle/>
+          <a:p>
+            <a:r>
+              <a:rPr lang="en-US" sz="800" dirty="0" smtClean="0"/>
+              <a:t>Edit</a:t>
+            </a:r>
+            <a:endParaRPr lang="en-SG" sz="800" dirty="0"/>
+          </a:p>
+        </p:txBody>
+      </p:sp>
+      <p:sp>
+        <p:nvSpPr>
+          <p:cNvPr id="30" name="TextBox 29"/>
+          <p:cNvSpPr txBox="1"/>
+          <p:nvPr/>
+        </p:nvSpPr>
+        <p:spPr>
+          <a:xfrm>
+            <a:off x="5146859" y="1662105"/>
+            <a:ext cx="458399" cy="215444"/>
+          </a:xfrm>
+          <a:prstGeom prst="rect">
+            <a:avLst/>
+          </a:prstGeom>
+          <a:noFill/>
+        </p:spPr>
+        <p:txBody>
+          <a:bodyPr wrap="square" rtlCol="0">
+            <a:spAutoFit/>
+          </a:bodyPr>
+          <a:lstStyle/>
+          <a:p>
+            <a:r>
+              <a:rPr lang="en-US" sz="800" dirty="0" smtClean="0"/>
+              <a:t>Delete</a:t>
+            </a:r>
+            <a:endParaRPr lang="en-SG" sz="800" dirty="0"/>
+          </a:p>
+        </p:txBody>
+      </p:sp>
+      <p:sp>
+        <p:nvSpPr>
+          <p:cNvPr id="42" name="Rectangle 41"/>
+          <p:cNvSpPr/>
+          <p:nvPr/>
+        </p:nvSpPr>
+        <p:spPr>
+          <a:xfrm>
+            <a:off x="4902536" y="1662105"/>
+            <a:ext cx="502920" cy="502920"/>
+          </a:xfrm>
+          <a:prstGeom prst="rect">
+            <a:avLst/>
+          </a:prstGeom>
+          <a:noFill/>
+          <a:ln>
+            <a:noFill/>
+          </a:ln>
+        </p:spPr>
+        <p:style>
+          <a:lnRef idx="2">
+            <a:schemeClr val="accent1">
+              <a:shade val="50000"/>
+            </a:schemeClr>
+          </a:lnRef>
+          <a:fillRef idx="1">
+            <a:schemeClr val="accent1"/>
+          </a:fillRef>
+          <a:effectRef idx="0">
+            <a:schemeClr val="accent1"/>
+          </a:effectRef>
+          <a:fontRef idx="minor">
+            <a:schemeClr val="lt1"/>
+          </a:fontRef>
+        </p:style>
+        <p:txBody>
+          <a:bodyPr rtlCol="0" anchor="ctr"/>
+          <a:lstStyle/>
+          <a:p>
+            <a:pPr algn="ctr"/>
+            <a:endParaRPr lang="en-US"/>
+          </a:p>
+        </p:txBody>
+      </p:sp>
+      <p:grpSp>
+        <p:nvGrpSpPr>
+          <p:cNvPr id="11" name="Group 10"/>
+          <p:cNvGrpSpPr/>
+          <p:nvPr/>
+        </p:nvGrpSpPr>
+        <p:grpSpPr>
+          <a:xfrm>
+            <a:off x="4241386" y="1058959"/>
+            <a:ext cx="594360" cy="592408"/>
+            <a:chOff x="4040236" y="1080115"/>
+            <a:chExt cx="594360" cy="592408"/>
+          </a:xfrm>
+        </p:grpSpPr>
+        <p:grpSp>
+          <p:nvGrpSpPr>
+            <p:cNvPr id="7" name="Group 6"/>
+            <p:cNvGrpSpPr/>
+            <p:nvPr/>
+          </p:nvGrpSpPr>
+          <p:grpSpPr>
+            <a:xfrm rot="18268995">
+              <a:off x="4157961" y="1269633"/>
+              <a:ext cx="507936" cy="128900"/>
+              <a:chOff x="4361991" y="971632"/>
+              <a:chExt cx="507936" cy="128900"/>
+            </a:xfrm>
+          </p:grpSpPr>
+          <p:sp>
+            <p:nvSpPr>
+              <p:cNvPr id="5" name="Rectangle 4"/>
+              <p:cNvSpPr/>
+              <p:nvPr/>
+            </p:nvSpPr>
+            <p:spPr>
+              <a:xfrm rot="10800000" flipV="1">
+                <a:off x="4504167" y="972516"/>
+                <a:ext cx="365760" cy="128016"/>
+              </a:xfrm>
+              <a:prstGeom prst="rect">
+                <a:avLst/>
+              </a:prstGeom>
+              <a:solidFill>
+                <a:schemeClr val="tx1"/>
+              </a:solidFill>
+              <a:ln>
+                <a:noFill/>
+              </a:ln>
+            </p:spPr>
+            <p:style>
+              <a:lnRef idx="2">
+                <a:schemeClr val="dk1">
+                  <a:shade val="50000"/>
+                </a:schemeClr>
+              </a:lnRef>
+              <a:fillRef idx="1">
+                <a:schemeClr val="dk1"/>
+              </a:fillRef>
+              <a:effectRef idx="0">
+                <a:schemeClr val="dk1"/>
+              </a:effectRef>
+              <a:fontRef idx="minor">
+                <a:schemeClr val="lt1"/>
+              </a:fontRef>
+            </p:style>
+            <p:txBody>
+              <a:bodyPr rtlCol="0" anchor="ctr"/>
+              <a:lstStyle/>
+              <a:p>
+                <a:pPr algn="ctr"/>
+                <a:endParaRPr lang="en-US"/>
+              </a:p>
+            </p:txBody>
+          </p:sp>
+          <p:sp>
+            <p:nvSpPr>
+              <p:cNvPr id="6" name="Isosceles Triangle 5"/>
+              <p:cNvSpPr/>
+              <p:nvPr/>
+            </p:nvSpPr>
+            <p:spPr>
+              <a:xfrm rot="16200000">
+                <a:off x="4361991" y="971632"/>
+                <a:ext cx="128016" cy="128016"/>
+              </a:xfrm>
+              <a:prstGeom prst="triangle">
+                <a:avLst/>
+              </a:prstGeom>
+              <a:solidFill>
+                <a:schemeClr val="tx1"/>
+              </a:solidFill>
+              <a:ln>
+                <a:noFill/>
+              </a:ln>
+            </p:spPr>
+            <p:style>
+              <a:lnRef idx="2">
+                <a:schemeClr val="dk1">
+                  <a:shade val="50000"/>
+                </a:schemeClr>
+              </a:lnRef>
+              <a:fillRef idx="1">
+                <a:schemeClr val="dk1"/>
+              </a:fillRef>
+              <a:effectRef idx="0">
+                <a:schemeClr val="dk1"/>
+              </a:effectRef>
+              <a:fontRef idx="minor">
+                <a:schemeClr val="lt1"/>
+              </a:fontRef>
+            </p:style>
+            <p:txBody>
+              <a:bodyPr rtlCol="0" anchor="ctr"/>
+              <a:lstStyle/>
+              <a:p>
+                <a:pPr algn="ctr"/>
+                <a:endParaRPr lang="en-US"/>
+              </a:p>
+            </p:txBody>
+          </p:sp>
+        </p:grpSp>
         <p:cxnSp>
           <p:nvCxnSpPr>
-            <p:cNvPr id="3" name="Straight Connector 2"/>
+            <p:cNvPr id="9" name="Straight Connector 8"/>
             <p:cNvCxnSpPr/>
             <p:nvPr/>
           </p:nvCxnSpPr>
           <p:spPr>
             <a:xfrm>
-              <a:off x="2451804" y="1197068"/>
-              <a:ext cx="0" cy="387033"/>
+              <a:off x="4153611" y="1260698"/>
+              <a:ext cx="150405" cy="38"/>
             </a:xfrm>
             <a:prstGeom prst="line">
               <a:avLst/>
             </a:prstGeom>
             <a:ln w="38100" cap="rnd">
               <a:solidFill>
-                <a:srgbClr val="4D7399"/>
+                <a:schemeClr val="tx1"/>
               </a:solidFill>
             </a:ln>
           </p:spPr>
@@ -3979,21 +4354,21 @@
         </p:cxnSp>
         <p:cxnSp>
           <p:nvCxnSpPr>
-            <p:cNvPr id="22" name="Straight Connector 21"/>
+            <p:cNvPr id="32" name="Straight Connector 31"/>
             <p:cNvCxnSpPr/>
             <p:nvPr/>
           </p:nvCxnSpPr>
           <p:spPr>
             <a:xfrm>
-              <a:off x="2459977" y="1194126"/>
-              <a:ext cx="274320" cy="2942"/>
+              <a:off x="4148746" y="1620831"/>
+              <a:ext cx="377341" cy="0"/>
             </a:xfrm>
             <a:prstGeom prst="line">
               <a:avLst/>
             </a:prstGeom>
             <a:ln w="38100" cap="rnd">
               <a:solidFill>
-                <a:srgbClr val="4D7399"/>
+                <a:schemeClr val="tx1"/>
               </a:solidFill>
             </a:ln>
           </p:spPr>
@@ -4014,21 +4389,21 @@
         </p:cxnSp>
         <p:cxnSp>
           <p:nvCxnSpPr>
-            <p:cNvPr id="24" name="Straight Connector 23"/>
+            <p:cNvPr id="34" name="Straight Connector 33"/>
             <p:cNvCxnSpPr/>
             <p:nvPr/>
           </p:nvCxnSpPr>
           <p:spPr>
-            <a:xfrm flipV="1">
-              <a:off x="2734297" y="1200235"/>
-              <a:ext cx="0" cy="121003"/>
+            <a:xfrm>
+              <a:off x="4141616" y="1260736"/>
+              <a:ext cx="0" cy="360678"/>
             </a:xfrm>
             <a:prstGeom prst="line">
               <a:avLst/>
             </a:prstGeom>
             <a:ln w="38100" cap="rnd">
               <a:solidFill>
-                <a:srgbClr val="4D7399"/>
+                <a:schemeClr val="tx1"/>
               </a:solidFill>
             </a:ln>
           </p:spPr>
@@ -4049,21 +4424,21 @@
         </p:cxnSp>
         <p:cxnSp>
           <p:nvCxnSpPr>
-            <p:cNvPr id="26" name="Straight Connector 25"/>
+            <p:cNvPr id="37" name="Straight Connector 36"/>
             <p:cNvCxnSpPr/>
             <p:nvPr/>
           </p:nvCxnSpPr>
           <p:spPr>
             <a:xfrm>
-              <a:off x="2451804" y="1587563"/>
-              <a:ext cx="91440" cy="0"/>
+              <a:off x="4535612" y="1403864"/>
+              <a:ext cx="0" cy="214399"/>
             </a:xfrm>
             <a:prstGeom prst="line">
               <a:avLst/>
             </a:prstGeom>
             <a:ln w="38100" cap="rnd">
               <a:solidFill>
-                <a:srgbClr val="4D7399"/>
+                <a:schemeClr val="tx1"/>
               </a:solidFill>
             </a:ln>
           </p:spPr>
@@ -4084,14 +4459,14 @@
         </p:cxnSp>
         <p:sp>
           <p:nvSpPr>
-            <p:cNvPr id="2" name="Rectangle 1"/>
+            <p:cNvPr id="45" name="Rectangle 44"/>
             <p:cNvSpPr/>
             <p:nvPr/>
           </p:nvSpPr>
           <p:spPr>
             <a:xfrm>
-              <a:off x="2345677" y="1140167"/>
-              <a:ext cx="502920" cy="502920"/>
+              <a:off x="4040236" y="1123883"/>
+              <a:ext cx="594360" cy="548640"/>
             </a:xfrm>
             <a:prstGeom prst="rect">
               <a:avLst/>
@@ -4127,6 +4502,88 @@
           </p:txBody>
         </p:sp>
       </p:grpSp>
+      <p:pic>
+        <p:nvPicPr>
+          <p:cNvPr id="1026" name="Picture 2" descr="C:\Users\Ian\Desktop\New folder\SyncLabDeleteButton.png"/>
+          <p:cNvPicPr>
+            <a:picLocks noChangeAspect="1" noChangeArrowheads="1"/>
+          </p:cNvPicPr>
+          <p:nvPr/>
+        </p:nvPicPr>
+        <p:blipFill>
+          <a:blip r:embed="rId5">
+            <a:extLst>
+              <a:ext uri="{28A0092B-C50C-407E-A947-70E740481C1C}">
+                <a14:useLocalDpi xmlns:a14="http://schemas.microsoft.com/office/drawing/2010/main" val="0"/>
+              </a:ext>
+            </a:extLst>
+          </a:blip>
+          <a:srcRect/>
+          <a:stretch>
+            <a:fillRect/>
+          </a:stretch>
+        </p:blipFill>
+        <p:spPr bwMode="auto">
+          <a:xfrm>
+            <a:off x="5261759" y="1327266"/>
+            <a:ext cx="228600" cy="228600"/>
+          </a:xfrm>
+          <a:prstGeom prst="rect">
+            <a:avLst/>
+          </a:prstGeom>
+          <a:noFill/>
+          <a:extLst>
+            <a:ext uri="{909E8E84-426E-40DD-AFC4-6F175D3DCCD1}">
+              <a14:hiddenFill xmlns:a14="http://schemas.microsoft.com/office/drawing/2010/main">
+                <a:solidFill>
+                  <a:srgbClr val="FFFFFF"/>
+                </a:solidFill>
+              </a14:hiddenFill>
+            </a:ext>
+          </a:extLst>
+        </p:spPr>
+      </p:pic>
+      <p:pic>
+        <p:nvPicPr>
+          <p:cNvPr id="1027" name="Picture 3" descr="C:\Users\Ian\Desktop\SyncLabCopyButton.png"/>
+          <p:cNvPicPr>
+            <a:picLocks noChangeAspect="1" noChangeArrowheads="1"/>
+          </p:cNvPicPr>
+          <p:nvPr/>
+        </p:nvPicPr>
+        <p:blipFill>
+          <a:blip r:embed="rId6">
+            <a:extLst>
+              <a:ext uri="{28A0092B-C50C-407E-A947-70E740481C1C}">
+                <a14:useLocalDpi xmlns:a14="http://schemas.microsoft.com/office/drawing/2010/main" val="0"/>
+              </a:ext>
+            </a:extLst>
+          </a:blip>
+          <a:srcRect/>
+          <a:stretch>
+            <a:fillRect/>
+          </a:stretch>
+        </p:blipFill>
+        <p:spPr bwMode="auto">
+          <a:xfrm>
+            <a:off x="1972178" y="527873"/>
+            <a:ext cx="1219200" cy="1219200"/>
+          </a:xfrm>
+          <a:prstGeom prst="rect">
+            <a:avLst/>
+          </a:prstGeom>
+          <a:noFill/>
+          <a:extLst>
+            <a:ext uri="{909E8E84-426E-40DD-AFC4-6F175D3DCCD1}">
+              <a14:hiddenFill xmlns:a14="http://schemas.microsoft.com/office/drawing/2010/main">
+                <a:solidFill>
+                  <a:srgbClr val="FFFFFF"/>
+                </a:solidFill>
+              </a14:hiddenFill>
+            </a:ext>
+          </a:extLst>
+        </p:spPr>
+      </p:pic>
     </p:spTree>
     <p:extLst>
       <p:ext uri="{BB962C8B-B14F-4D97-AF65-F5344CB8AC3E}">

</xml_diff>

<commit_message>
Icons for Sync Lab #1348 (#1376)
</commit_message>
<xml_diff>
--- a/doc/Icons-SyncLab.pptx
+++ b/doc/Icons-SyncLab.pptx
@@ -19,10 +19,6 @@
       <p:bold r:id="rId5"/>
       <p:italic r:id="rId6"/>
       <p:boldItalic r:id="rId7"/>
-    </p:embeddedFont>
-    <p:embeddedFont>
-      <p:font typeface="Gill Sans Ultra Bold" panose="020B0A02020104020203" pitchFamily="34" charset="0"/>
-      <p:regular r:id="rId8"/>
     </p:embeddedFont>
   </p:embeddedFontLst>
   <p:defaultTextStyle>
@@ -122,7 +118,7 @@
   </p:defaultTextStyle>
   <p:extLst>
     <p:ext uri="{EFAFB233-063F-42B5-8137-9DF3F51BA10A}">
-      <p15:sldGuideLst xmlns:p15="http://schemas.microsoft.com/office/powerpoint/2012/main">
+      <p15:sldGuideLst xmlns="" xmlns:p15="http://schemas.microsoft.com/office/powerpoint/2012/main">
         <p15:guide id="1" orient="horz" pos="2160">
           <p15:clr>
             <a:srgbClr val="A4A3A4"/>
@@ -221,7 +217,7 @@
           <a:p>
             <a:fld id="{6699ACB9-486C-4D62-A3A7-AF98E13EFDA3}" type="datetimeFigureOut">
               <a:rPr lang="en-US" smtClean="0"/>
-              <a:t>2/25/2016</a:t>
+              <a:t>5/25/2017</a:t>
             </a:fld>
             <a:endParaRPr lang="en-US"/>
           </a:p>
@@ -671,7 +667,7 @@
             <a:fld id="{1D8BD707-D9CF-40AE-B4C6-C98DA3205C09}" type="datetimeFigureOut">
               <a:rPr lang="en-US" smtClean="0"/>
               <a:pPr/>
-              <a:t>2/25/2016</a:t>
+              <a:t>5/25/2017</a:t>
             </a:fld>
             <a:endParaRPr lang="en-US"/>
           </a:p>
@@ -838,7 +834,7 @@
             <a:fld id="{1D8BD707-D9CF-40AE-B4C6-C98DA3205C09}" type="datetimeFigureOut">
               <a:rPr lang="en-US" smtClean="0"/>
               <a:pPr/>
-              <a:t>2/25/2016</a:t>
+              <a:t>5/25/2017</a:t>
             </a:fld>
             <a:endParaRPr lang="en-US"/>
           </a:p>
@@ -1015,7 +1011,7 @@
             <a:fld id="{1D8BD707-D9CF-40AE-B4C6-C98DA3205C09}" type="datetimeFigureOut">
               <a:rPr lang="en-US" smtClean="0"/>
               <a:pPr/>
-              <a:t>2/25/2016</a:t>
+              <a:t>5/25/2017</a:t>
             </a:fld>
             <a:endParaRPr lang="en-US"/>
           </a:p>
@@ -1182,7 +1178,7 @@
             <a:fld id="{1D8BD707-D9CF-40AE-B4C6-C98DA3205C09}" type="datetimeFigureOut">
               <a:rPr lang="en-US" smtClean="0"/>
               <a:pPr/>
-              <a:t>2/25/2016</a:t>
+              <a:t>5/25/2017</a:t>
             </a:fld>
             <a:endParaRPr lang="en-US"/>
           </a:p>
@@ -1425,7 +1421,7 @@
             <a:fld id="{1D8BD707-D9CF-40AE-B4C6-C98DA3205C09}" type="datetimeFigureOut">
               <a:rPr lang="en-US" smtClean="0"/>
               <a:pPr/>
-              <a:t>2/25/2016</a:t>
+              <a:t>5/25/2017</a:t>
             </a:fld>
             <a:endParaRPr lang="en-US"/>
           </a:p>
@@ -1710,7 +1706,7 @@
             <a:fld id="{1D8BD707-D9CF-40AE-B4C6-C98DA3205C09}" type="datetimeFigureOut">
               <a:rPr lang="en-US" smtClean="0"/>
               <a:pPr/>
-              <a:t>2/25/2016</a:t>
+              <a:t>5/25/2017</a:t>
             </a:fld>
             <a:endParaRPr lang="en-US"/>
           </a:p>
@@ -2129,7 +2125,7 @@
             <a:fld id="{1D8BD707-D9CF-40AE-B4C6-C98DA3205C09}" type="datetimeFigureOut">
               <a:rPr lang="en-US" smtClean="0"/>
               <a:pPr/>
-              <a:t>2/25/2016</a:t>
+              <a:t>5/25/2017</a:t>
             </a:fld>
             <a:endParaRPr lang="en-US"/>
           </a:p>
@@ -2244,7 +2240,7 @@
             <a:fld id="{1D8BD707-D9CF-40AE-B4C6-C98DA3205C09}" type="datetimeFigureOut">
               <a:rPr lang="en-US" smtClean="0"/>
               <a:pPr/>
-              <a:t>2/25/2016</a:t>
+              <a:t>5/25/2017</a:t>
             </a:fld>
             <a:endParaRPr lang="en-US"/>
           </a:p>
@@ -2336,7 +2332,7 @@
             <a:fld id="{1D8BD707-D9CF-40AE-B4C6-C98DA3205C09}" type="datetimeFigureOut">
               <a:rPr lang="en-US" smtClean="0"/>
               <a:pPr/>
-              <a:t>2/25/2016</a:t>
+              <a:t>5/25/2017</a:t>
             </a:fld>
             <a:endParaRPr lang="en-US"/>
           </a:p>
@@ -2610,7 +2606,7 @@
             <a:fld id="{1D8BD707-D9CF-40AE-B4C6-C98DA3205C09}" type="datetimeFigureOut">
               <a:rPr lang="en-US" smtClean="0"/>
               <a:pPr/>
-              <a:t>2/25/2016</a:t>
+              <a:t>5/25/2017</a:t>
             </a:fld>
             <a:endParaRPr lang="en-US"/>
           </a:p>
@@ -2860,7 +2856,7 @@
             <a:fld id="{1D8BD707-D9CF-40AE-B4C6-C98DA3205C09}" type="datetimeFigureOut">
               <a:rPr lang="en-US" smtClean="0"/>
               <a:pPr/>
-              <a:t>2/25/2016</a:t>
+              <a:t>5/25/2017</a:t>
             </a:fld>
             <a:endParaRPr lang="en-US"/>
           </a:p>
@@ -3070,7 +3066,7 @@
             <a:fld id="{1D8BD707-D9CF-40AE-B4C6-C98DA3205C09}" type="datetimeFigureOut">
               <a:rPr lang="en-US" smtClean="0"/>
               <a:pPr/>
-              <a:t>2/25/2016</a:t>
+              <a:t>5/25/2017</a:t>
             </a:fld>
             <a:endParaRPr lang="en-US"/>
           </a:p>
@@ -3472,7 +3468,7 @@
         </p:blipFill>
         <p:spPr bwMode="auto">
           <a:xfrm>
-            <a:off x="5370276" y="1286373"/>
+            <a:off x="1047658" y="920908"/>
             <a:ext cx="841375" cy="405198"/>
           </a:xfrm>
           <a:prstGeom prst="rect">
@@ -3534,7 +3530,7 @@
         </p:blipFill>
         <p:spPr bwMode="auto">
           <a:xfrm>
-            <a:off x="5370275" y="1728303"/>
+            <a:off x="1047657" y="1362838"/>
             <a:ext cx="841375" cy="384235"/>
           </a:xfrm>
           <a:prstGeom prst="rect">
@@ -3575,70 +3571,6 @@
           </a:extLst>
         </p:spPr>
       </p:pic>
-      <p:sp>
-        <p:nvSpPr>
-          <p:cNvPr id="89" name="Rectangle 88"/>
-          <p:cNvSpPr>
-            <a:spLocks/>
-          </p:cNvSpPr>
-          <p:nvPr/>
-        </p:nvSpPr>
-        <p:spPr>
-          <a:xfrm>
-            <a:off x="5676819" y="3023477"/>
-            <a:ext cx="486412" cy="411139"/>
-          </a:xfrm>
-          <a:prstGeom prst="rect">
-            <a:avLst/>
-          </a:prstGeom>
-          <a:noFill/>
-          <a:ln>
-            <a:noFill/>
-          </a:ln>
-        </p:spPr>
-        <p:style>
-          <a:lnRef idx="2">
-            <a:schemeClr val="accent1">
-              <a:shade val="50000"/>
-            </a:schemeClr>
-          </a:lnRef>
-          <a:fillRef idx="1">
-            <a:schemeClr val="accent1"/>
-          </a:fillRef>
-          <a:effectRef idx="0">
-            <a:schemeClr val="accent1"/>
-          </a:effectRef>
-          <a:fontRef idx="minor">
-            <a:schemeClr val="lt1"/>
-          </a:fontRef>
-        </p:style>
-        <p:txBody>
-          <a:bodyPr rtlCol="0" anchor="ctr"/>
-          <a:lstStyle/>
-          <a:p>
-            <a:pPr algn="ctr"/>
-            <a:r>
-              <a:rPr lang="en-US" sz="3200" dirty="0" smtClean="0">
-                <a:solidFill>
-                  <a:schemeClr val="accent6">
-                    <a:lumMod val="75000"/>
-                  </a:schemeClr>
-                </a:solidFill>
-                <a:latin typeface="Gill Sans Ultra Bold" panose="020B0A02020104020203" pitchFamily="34" charset="0"/>
-              </a:rPr>
-              <a:t>s</a:t>
-            </a:r>
-            <a:endParaRPr lang="en-SG" sz="3200" dirty="0">
-              <a:solidFill>
-                <a:schemeClr val="accent6">
-                  <a:lumMod val="75000"/>
-                </a:schemeClr>
-              </a:solidFill>
-              <a:latin typeface="Gill Sans Ultra Bold" panose="020B0A02020104020203" pitchFamily="34" charset="0"/>
-            </a:endParaRPr>
-          </a:p>
-        </p:txBody>
-      </p:sp>
       <p:pic>
         <p:nvPicPr>
           <p:cNvPr id="1034" name="Picture 10"/>
@@ -3660,7 +3592,7 @@
         </p:blipFill>
         <p:spPr bwMode="auto">
           <a:xfrm>
-            <a:off x="5499596" y="1399757"/>
+            <a:off x="1176978" y="1034292"/>
             <a:ext cx="341745" cy="310398"/>
           </a:xfrm>
           <a:prstGeom prst="rect">
@@ -3722,7 +3654,7 @@
         </p:blipFill>
         <p:spPr bwMode="auto">
           <a:xfrm>
-            <a:off x="5803663" y="1691571"/>
+            <a:off x="1481045" y="1326106"/>
             <a:ext cx="341745" cy="310398"/>
           </a:xfrm>
           <a:prstGeom prst="rect">
@@ -3763,96 +3695,6 @@
           </a:extLst>
         </p:spPr>
       </p:pic>
-      <p:sp>
-        <p:nvSpPr>
-          <p:cNvPr id="93" name="Freeform 92"/>
-          <p:cNvSpPr>
-            <a:spLocks/>
-          </p:cNvSpPr>
-          <p:nvPr/>
-        </p:nvSpPr>
-        <p:spPr>
-          <a:xfrm>
-            <a:off x="5595245" y="2879498"/>
-            <a:ext cx="764929" cy="71832"/>
-          </a:xfrm>
-          <a:custGeom>
-            <a:avLst/>
-            <a:gdLst>
-              <a:gd name="connsiteX0" fmla="*/ 0 w 708025"/>
-              <a:gd name="connsiteY0" fmla="*/ 69850 h 69850"/>
-              <a:gd name="connsiteX1" fmla="*/ 330200 w 708025"/>
-              <a:gd name="connsiteY1" fmla="*/ 69850 h 69850"/>
-              <a:gd name="connsiteX2" fmla="*/ 409575 w 708025"/>
-              <a:gd name="connsiteY2" fmla="*/ 0 h 69850"/>
-              <a:gd name="connsiteX3" fmla="*/ 708025 w 708025"/>
-              <a:gd name="connsiteY3" fmla="*/ 0 h 69850"/>
-            </a:gdLst>
-            <a:ahLst/>
-            <a:cxnLst>
-              <a:cxn ang="0">
-                <a:pos x="connsiteX0" y="connsiteY0"/>
-              </a:cxn>
-              <a:cxn ang="0">
-                <a:pos x="connsiteX1" y="connsiteY1"/>
-              </a:cxn>
-              <a:cxn ang="0">
-                <a:pos x="connsiteX2" y="connsiteY2"/>
-              </a:cxn>
-              <a:cxn ang="0">
-                <a:pos x="connsiteX3" y="connsiteY3"/>
-              </a:cxn>
-            </a:cxnLst>
-            <a:rect l="l" t="t" r="r" b="b"/>
-            <a:pathLst>
-              <a:path w="708025" h="69850">
-                <a:moveTo>
-                  <a:pt x="0" y="69850"/>
-                </a:moveTo>
-                <a:lnTo>
-                  <a:pt x="330200" y="69850"/>
-                </a:lnTo>
-                <a:lnTo>
-                  <a:pt x="409575" y="0"/>
-                </a:lnTo>
-                <a:lnTo>
-                  <a:pt x="708025" y="0"/>
-                </a:lnTo>
-              </a:path>
-            </a:pathLst>
-          </a:custGeom>
-          <a:noFill/>
-          <a:ln w="57150">
-            <a:solidFill>
-              <a:srgbClr val="0070C0"/>
-            </a:solidFill>
-          </a:ln>
-        </p:spPr>
-        <p:style>
-          <a:lnRef idx="2">
-            <a:schemeClr val="accent1">
-              <a:shade val="50000"/>
-            </a:schemeClr>
-          </a:lnRef>
-          <a:fillRef idx="1">
-            <a:schemeClr val="accent1"/>
-          </a:fillRef>
-          <a:effectRef idx="0">
-            <a:schemeClr val="accent1"/>
-          </a:effectRef>
-          <a:fontRef idx="minor">
-            <a:schemeClr val="lt1"/>
-          </a:fontRef>
-        </p:style>
-        <p:txBody>
-          <a:bodyPr rtlCol="0" anchor="ctr"/>
-          <a:lstStyle/>
-          <a:p>
-            <a:pPr algn="ctr"/>
-            <a:endParaRPr lang="en-SG"/>
-          </a:p>
-        </p:txBody>
-      </p:sp>
       <p:pic>
         <p:nvPicPr>
           <p:cNvPr id="1035" name="Picture 11"/>
@@ -3874,7 +3716,7 @@
         </p:blipFill>
         <p:spPr bwMode="auto">
           <a:xfrm>
-            <a:off x="5411551" y="1644846"/>
+            <a:off x="1088933" y="1279381"/>
             <a:ext cx="774700" cy="128587"/>
           </a:xfrm>
           <a:prstGeom prst="rect">
@@ -3915,74 +3757,418 @@
           </a:extLst>
         </p:spPr>
       </p:pic>
-      <p:sp>
-        <p:nvSpPr>
-          <p:cNvPr id="9" name="Rectangle 4"/>
-          <p:cNvSpPr>
-            <a:spLocks/>
-          </p:cNvSpPr>
+      <p:grpSp>
+        <p:nvGrpSpPr>
+          <p:cNvPr id="18" name="Group 17"/>
+          <p:cNvGrpSpPr/>
           <p:nvPr/>
+        </p:nvGrpSpPr>
+        <p:grpSpPr>
+          <a:xfrm>
+            <a:off x="3334142" y="1075004"/>
+            <a:ext cx="549071" cy="549822"/>
+            <a:chOff x="4180111" y="1375544"/>
+            <a:chExt cx="549071" cy="549822"/>
+          </a:xfrm>
+        </p:grpSpPr>
+        <p:grpSp>
+          <p:nvGrpSpPr>
+            <p:cNvPr id="19" name="Group 18"/>
+            <p:cNvGrpSpPr/>
+            <p:nvPr/>
+          </p:nvGrpSpPr>
+          <p:grpSpPr>
+            <a:xfrm>
+              <a:off x="4235574" y="1385216"/>
+              <a:ext cx="446467" cy="521728"/>
+              <a:chOff x="4821567" y="919204"/>
+              <a:chExt cx="446467" cy="521728"/>
+            </a:xfrm>
+          </p:grpSpPr>
+          <p:sp>
+            <p:nvSpPr>
+              <p:cNvPr id="21" name="Rectangle 20"/>
+              <p:cNvSpPr/>
+              <p:nvPr/>
+            </p:nvSpPr>
+            <p:spPr>
+              <a:xfrm>
+                <a:off x="4821567" y="971454"/>
+                <a:ext cx="343904" cy="406070"/>
+              </a:xfrm>
+              <a:prstGeom prst="rect">
+                <a:avLst/>
+              </a:prstGeom>
+              <a:solidFill>
+                <a:schemeClr val="tx1"/>
+              </a:solidFill>
+              <a:ln>
+                <a:noFill/>
+              </a:ln>
+            </p:spPr>
+            <p:style>
+              <a:lnRef idx="2">
+                <a:schemeClr val="accent1">
+                  <a:shade val="50000"/>
+                </a:schemeClr>
+              </a:lnRef>
+              <a:fillRef idx="1">
+                <a:schemeClr val="accent1"/>
+              </a:fillRef>
+              <a:effectRef idx="0">
+                <a:schemeClr val="accent1"/>
+              </a:effectRef>
+              <a:fontRef idx="minor">
+                <a:schemeClr val="lt1"/>
+              </a:fontRef>
+            </p:style>
+            <p:txBody>
+              <a:bodyPr rtlCol="0" anchor="ctr"/>
+              <a:lstStyle/>
+              <a:p>
+                <a:pPr algn="ctr"/>
+                <a:endParaRPr lang="en-US"/>
+              </a:p>
+            </p:txBody>
+          </p:sp>
+          <p:sp>
+            <p:nvSpPr>
+              <p:cNvPr id="23" name="Rectangle: Folded Corner 1026"/>
+              <p:cNvSpPr/>
+              <p:nvPr/>
+            </p:nvSpPr>
+            <p:spPr>
+              <a:xfrm rot="10800000" flipH="1">
+                <a:off x="4990894" y="1102754"/>
+                <a:ext cx="277140" cy="338178"/>
+              </a:xfrm>
+              <a:prstGeom prst="foldedCorner">
+                <a:avLst>
+                  <a:gd name="adj" fmla="val 44103"/>
+                </a:avLst>
+              </a:prstGeom>
+              <a:solidFill>
+                <a:schemeClr val="bg1"/>
+              </a:solidFill>
+              <a:ln>
+                <a:solidFill>
+                  <a:schemeClr val="tx1"/>
+                </a:solidFill>
+              </a:ln>
+            </p:spPr>
+            <p:style>
+              <a:lnRef idx="2">
+                <a:schemeClr val="accent1">
+                  <a:shade val="50000"/>
+                </a:schemeClr>
+              </a:lnRef>
+              <a:fillRef idx="1">
+                <a:schemeClr val="accent1"/>
+              </a:fillRef>
+              <a:effectRef idx="0">
+                <a:schemeClr val="accent1"/>
+              </a:effectRef>
+              <a:fontRef idx="minor">
+                <a:schemeClr val="lt1"/>
+              </a:fontRef>
+            </p:style>
+            <p:txBody>
+              <a:bodyPr rtlCol="0" anchor="ctr"/>
+              <a:lstStyle/>
+              <a:p>
+                <a:pPr algn="ctr"/>
+                <a:endParaRPr lang="en-US"/>
+              </a:p>
+            </p:txBody>
+          </p:sp>
+          <p:sp>
+            <p:nvSpPr>
+              <p:cNvPr id="25" name="Rounded Rectangle 227"/>
+              <p:cNvSpPr/>
+              <p:nvPr/>
+            </p:nvSpPr>
+            <p:spPr>
+              <a:xfrm rot="10800000">
+                <a:off x="4879960" y="919204"/>
+                <a:ext cx="234247" cy="101171"/>
+              </a:xfrm>
+              <a:custGeom>
+                <a:avLst/>
+                <a:gdLst/>
+                <a:ahLst/>
+                <a:cxnLst/>
+                <a:rect l="l" t="t" r="r" b="b"/>
+                <a:pathLst>
+                  <a:path w="286327" h="1000124">
+                    <a:moveTo>
+                      <a:pt x="2115" y="0"/>
+                    </a:moveTo>
+                    <a:lnTo>
+                      <a:pt x="284212" y="0"/>
+                    </a:lnTo>
+                    <a:cubicBezTo>
+                      <a:pt x="286188" y="3367"/>
+                      <a:pt x="286327" y="6905"/>
+                      <a:pt x="286327" y="10476"/>
+                    </a:cubicBezTo>
+                    <a:lnTo>
+                      <a:pt x="286327" y="712825"/>
+                    </a:lnTo>
+                    <a:cubicBezTo>
+                      <a:pt x="286327" y="772047"/>
+                      <a:pt x="247915" y="822299"/>
+                      <a:pt x="194109" y="838409"/>
+                    </a:cubicBezTo>
+                    <a:cubicBezTo>
+                      <a:pt x="194108" y="875332"/>
+                      <a:pt x="194108" y="912256"/>
+                      <a:pt x="194108" y="949179"/>
+                    </a:cubicBezTo>
+                    <a:cubicBezTo>
+                      <a:pt x="194108" y="977315"/>
+                      <a:pt x="171299" y="1000124"/>
+                      <a:pt x="143163" y="1000124"/>
+                    </a:cubicBezTo>
+                    <a:lnTo>
+                      <a:pt x="143164" y="1000123"/>
+                    </a:lnTo>
+                    <a:cubicBezTo>
+                      <a:pt x="115028" y="1000123"/>
+                      <a:pt x="92219" y="977314"/>
+                      <a:pt x="92219" y="949178"/>
+                    </a:cubicBezTo>
+                    <a:lnTo>
+                      <a:pt x="92219" y="838409"/>
+                    </a:lnTo>
+                    <a:cubicBezTo>
+                      <a:pt x="38413" y="822299"/>
+                      <a:pt x="0" y="772048"/>
+                      <a:pt x="0" y="712825"/>
+                    </a:cubicBezTo>
+                    <a:lnTo>
+                      <a:pt x="0" y="10476"/>
+                    </a:lnTo>
+                    <a:close/>
+                  </a:path>
+                </a:pathLst>
+              </a:custGeom>
+              <a:solidFill>
+                <a:schemeClr val="tx1"/>
+              </a:solidFill>
+              <a:ln w="19050">
+                <a:solidFill>
+                  <a:schemeClr val="bg1"/>
+                </a:solidFill>
+              </a:ln>
+            </p:spPr>
+            <p:style>
+              <a:lnRef idx="2">
+                <a:schemeClr val="accent1">
+                  <a:shade val="50000"/>
+                </a:schemeClr>
+              </a:lnRef>
+              <a:fillRef idx="1">
+                <a:schemeClr val="accent1"/>
+              </a:fillRef>
+              <a:effectRef idx="0">
+                <a:schemeClr val="accent1"/>
+              </a:effectRef>
+              <a:fontRef idx="minor">
+                <a:schemeClr val="lt1"/>
+              </a:fontRef>
+            </p:style>
+            <p:txBody>
+              <a:bodyPr rtlCol="0" anchor="ctr"/>
+              <a:lstStyle/>
+              <a:p>
+                <a:pPr algn="ctr"/>
+                <a:endParaRPr lang="en-SG"/>
+              </a:p>
+            </p:txBody>
+          </p:sp>
+        </p:grpSp>
+        <p:sp>
+          <p:nvSpPr>
+            <p:cNvPr id="20" name="Rectangle 19"/>
+            <p:cNvSpPr/>
+            <p:nvPr/>
+          </p:nvSpPr>
+          <p:spPr>
+            <a:xfrm rot="10800000">
+              <a:off x="4180111" y="1375544"/>
+              <a:ext cx="549071" cy="549822"/>
+            </a:xfrm>
+            <a:prstGeom prst="rect">
+              <a:avLst/>
+            </a:prstGeom>
+            <a:noFill/>
+            <a:ln>
+              <a:noFill/>
+            </a:ln>
+          </p:spPr>
+          <p:style>
+            <a:lnRef idx="2">
+              <a:schemeClr val="accent1">
+                <a:shade val="50000"/>
+              </a:schemeClr>
+            </a:lnRef>
+            <a:fillRef idx="1">
+              <a:schemeClr val="accent1"/>
+            </a:fillRef>
+            <a:effectRef idx="0">
+              <a:schemeClr val="accent1"/>
+            </a:effectRef>
+            <a:fontRef idx="minor">
+              <a:schemeClr val="lt1"/>
+            </a:fontRef>
+          </p:style>
+          <p:txBody>
+            <a:bodyPr wrap="none" lIns="0" tIns="0" rIns="0" bIns="0" rtlCol="0" anchor="ctr"/>
+            <a:lstStyle/>
+            <a:p>
+              <a:pPr algn="ctr"/>
+              <a:endParaRPr lang="en-US" b="1"/>
+            </a:p>
+          </p:txBody>
+        </p:sp>
+      </p:grpSp>
+      <p:sp>
+        <p:nvSpPr>
+          <p:cNvPr id="27" name="TextBox 26"/>
+          <p:cNvSpPr txBox="1"/>
+          <p:nvPr/>
         </p:nvSpPr>
         <p:spPr>
-          <a:xfrm rot="16200000">
-            <a:off x="3924989" y="2375244"/>
-            <a:ext cx="700291" cy="690781"/>
+          <a:xfrm>
+            <a:off x="2352579" y="1661781"/>
+            <a:ext cx="458399" cy="215444"/>
           </a:xfrm>
-          <a:custGeom>
+          <a:prstGeom prst="rect">
             <a:avLst/>
-            <a:gdLst/>
-            <a:ahLst/>
-            <a:cxnLst/>
-            <a:rect l="l" t="t" r="r" b="b"/>
-            <a:pathLst>
-              <a:path w="1752603" h="1752600">
-                <a:moveTo>
-                  <a:pt x="533400" y="0"/>
-                </a:moveTo>
-                <a:lnTo>
-                  <a:pt x="533403" y="0"/>
-                </a:lnTo>
-                <a:lnTo>
-                  <a:pt x="1066800" y="0"/>
-                </a:lnTo>
-                <a:lnTo>
-                  <a:pt x="1752603" y="0"/>
-                </a:lnTo>
-                <a:lnTo>
-                  <a:pt x="1752603" y="1752600"/>
-                </a:lnTo>
-                <a:lnTo>
-                  <a:pt x="1219203" y="1752600"/>
-                </a:lnTo>
-                <a:lnTo>
-                  <a:pt x="533403" y="1752600"/>
-                </a:lnTo>
-                <a:lnTo>
-                  <a:pt x="3" y="1752600"/>
-                </a:lnTo>
-                <a:lnTo>
-                  <a:pt x="3" y="533430"/>
-                </a:lnTo>
-                <a:cubicBezTo>
-                  <a:pt x="0" y="533420"/>
-                  <a:pt x="0" y="533410"/>
-                  <a:pt x="0" y="533400"/>
-                </a:cubicBezTo>
-                <a:cubicBezTo>
-                  <a:pt x="0" y="238811"/>
-                  <a:pt x="238811" y="0"/>
-                  <a:pt x="533400" y="0"/>
-                </a:cubicBezTo>
-                <a:close/>
-              </a:path>
-            </a:pathLst>
-          </a:custGeom>
+          </a:prstGeom>
           <a:noFill/>
-          <a:ln w="76200" cmpd="sng">
-            <a:solidFill>
-              <a:srgbClr val="0070C0"/>
-            </a:solidFill>
-            <a:miter lim="800000"/>
+        </p:spPr>
+        <p:txBody>
+          <a:bodyPr wrap="square" rtlCol="0">
+            <a:spAutoFit/>
+          </a:bodyPr>
+          <a:lstStyle/>
+          <a:p>
+            <a:r>
+              <a:rPr lang="en-US" sz="800" dirty="0" smtClean="0"/>
+              <a:t>Copy</a:t>
+            </a:r>
+            <a:endParaRPr lang="en-SG" sz="800" dirty="0"/>
+          </a:p>
+        </p:txBody>
+      </p:sp>
+      <p:sp>
+        <p:nvSpPr>
+          <p:cNvPr id="28" name="TextBox 27"/>
+          <p:cNvSpPr txBox="1"/>
+          <p:nvPr/>
+        </p:nvSpPr>
+        <p:spPr>
+          <a:xfrm>
+            <a:off x="3400394" y="1651827"/>
+            <a:ext cx="458399" cy="215444"/>
+          </a:xfrm>
+          <a:prstGeom prst="rect">
+            <a:avLst/>
+          </a:prstGeom>
+          <a:noFill/>
+        </p:spPr>
+        <p:txBody>
+          <a:bodyPr wrap="square" rtlCol="0">
+            <a:spAutoFit/>
+          </a:bodyPr>
+          <a:lstStyle/>
+          <a:p>
+            <a:r>
+              <a:rPr lang="en-US" sz="800" dirty="0" smtClean="0"/>
+              <a:t>Paste</a:t>
+            </a:r>
+            <a:endParaRPr lang="en-SG" sz="800" dirty="0"/>
+          </a:p>
+        </p:txBody>
+      </p:sp>
+      <p:sp>
+        <p:nvSpPr>
+          <p:cNvPr id="29" name="TextBox 28"/>
+          <p:cNvSpPr txBox="1"/>
+          <p:nvPr/>
+        </p:nvSpPr>
+        <p:spPr>
+          <a:xfrm>
+            <a:off x="4405396" y="1639351"/>
+            <a:ext cx="458399" cy="215444"/>
+          </a:xfrm>
+          <a:prstGeom prst="rect">
+            <a:avLst/>
+          </a:prstGeom>
+          <a:noFill/>
+        </p:spPr>
+        <p:txBody>
+          <a:bodyPr wrap="square" rtlCol="0">
+            <a:spAutoFit/>
+          </a:bodyPr>
+          <a:lstStyle/>
+          <a:p>
+            <a:r>
+              <a:rPr lang="en-US" sz="800" dirty="0" smtClean="0"/>
+              <a:t>Edit</a:t>
+            </a:r>
+            <a:endParaRPr lang="en-SG" sz="800" dirty="0"/>
+          </a:p>
+        </p:txBody>
+      </p:sp>
+      <p:sp>
+        <p:nvSpPr>
+          <p:cNvPr id="30" name="TextBox 29"/>
+          <p:cNvSpPr txBox="1"/>
+          <p:nvPr/>
+        </p:nvSpPr>
+        <p:spPr>
+          <a:xfrm>
+            <a:off x="5146859" y="1662105"/>
+            <a:ext cx="458399" cy="215444"/>
+          </a:xfrm>
+          <a:prstGeom prst="rect">
+            <a:avLst/>
+          </a:prstGeom>
+          <a:noFill/>
+        </p:spPr>
+        <p:txBody>
+          <a:bodyPr wrap="square" rtlCol="0">
+            <a:spAutoFit/>
+          </a:bodyPr>
+          <a:lstStyle/>
+          <a:p>
+            <a:r>
+              <a:rPr lang="en-US" sz="800" dirty="0" smtClean="0"/>
+              <a:t>Delete</a:t>
+            </a:r>
+            <a:endParaRPr lang="en-SG" sz="800" dirty="0"/>
+          </a:p>
+        </p:txBody>
+      </p:sp>
+      <p:sp>
+        <p:nvSpPr>
+          <p:cNvPr id="42" name="Rectangle 41"/>
+          <p:cNvSpPr/>
+          <p:nvPr/>
+        </p:nvSpPr>
+        <p:spPr>
+          <a:xfrm>
+            <a:off x="4902536" y="1662105"/>
+            <a:ext cx="502920" cy="502920"/>
+          </a:xfrm>
+          <a:prstGeom prst="rect">
+            <a:avLst/>
+          </a:prstGeom>
+          <a:noFill/>
+          <a:ln>
+            <a:noFill/>
           </a:ln>
         </p:spPr>
         <p:style>
@@ -4010,46 +4196,394 @@
           </a:p>
         </p:txBody>
       </p:sp>
-      <p:sp>
-        <p:nvSpPr>
-          <p:cNvPr id="10" name="TextBox 9"/>
-          <p:cNvSpPr txBox="1">
-            <a:spLocks/>
-          </p:cNvSpPr>
+      <p:grpSp>
+        <p:nvGrpSpPr>
+          <p:cNvPr id="11" name="Group 10"/>
+          <p:cNvGrpSpPr/>
           <p:nvPr/>
-        </p:nvSpPr>
-        <p:spPr>
+        </p:nvGrpSpPr>
+        <p:grpSpPr>
           <a:xfrm>
-            <a:off x="4029590" y="2261658"/>
-            <a:ext cx="516488" cy="892552"/>
+            <a:off x="4241386" y="1058959"/>
+            <a:ext cx="594360" cy="592408"/>
+            <a:chOff x="4040236" y="1080115"/>
+            <a:chExt cx="594360" cy="592408"/>
+          </a:xfrm>
+        </p:grpSpPr>
+        <p:grpSp>
+          <p:nvGrpSpPr>
+            <p:cNvPr id="7" name="Group 6"/>
+            <p:cNvGrpSpPr/>
+            <p:nvPr/>
+          </p:nvGrpSpPr>
+          <p:grpSpPr>
+            <a:xfrm rot="18268995">
+              <a:off x="4157961" y="1269633"/>
+              <a:ext cx="507936" cy="128900"/>
+              <a:chOff x="4361991" y="971632"/>
+              <a:chExt cx="507936" cy="128900"/>
+            </a:xfrm>
+          </p:grpSpPr>
+          <p:sp>
+            <p:nvSpPr>
+              <p:cNvPr id="5" name="Rectangle 4"/>
+              <p:cNvSpPr/>
+              <p:nvPr/>
+            </p:nvSpPr>
+            <p:spPr>
+              <a:xfrm rot="10800000" flipV="1">
+                <a:off x="4504167" y="972516"/>
+                <a:ext cx="365760" cy="128016"/>
+              </a:xfrm>
+              <a:prstGeom prst="rect">
+                <a:avLst/>
+              </a:prstGeom>
+              <a:solidFill>
+                <a:schemeClr val="tx1"/>
+              </a:solidFill>
+              <a:ln>
+                <a:noFill/>
+              </a:ln>
+            </p:spPr>
+            <p:style>
+              <a:lnRef idx="2">
+                <a:schemeClr val="dk1">
+                  <a:shade val="50000"/>
+                </a:schemeClr>
+              </a:lnRef>
+              <a:fillRef idx="1">
+                <a:schemeClr val="dk1"/>
+              </a:fillRef>
+              <a:effectRef idx="0">
+                <a:schemeClr val="dk1"/>
+              </a:effectRef>
+              <a:fontRef idx="minor">
+                <a:schemeClr val="lt1"/>
+              </a:fontRef>
+            </p:style>
+            <p:txBody>
+              <a:bodyPr rtlCol="0" anchor="ctr"/>
+              <a:lstStyle/>
+              <a:p>
+                <a:pPr algn="ctr"/>
+                <a:endParaRPr lang="en-US"/>
+              </a:p>
+            </p:txBody>
+          </p:sp>
+          <p:sp>
+            <p:nvSpPr>
+              <p:cNvPr id="6" name="Isosceles Triangle 5"/>
+              <p:cNvSpPr/>
+              <p:nvPr/>
+            </p:nvSpPr>
+            <p:spPr>
+              <a:xfrm rot="16200000">
+                <a:off x="4361991" y="971632"/>
+                <a:ext cx="128016" cy="128016"/>
+              </a:xfrm>
+              <a:prstGeom prst="triangle">
+                <a:avLst/>
+              </a:prstGeom>
+              <a:solidFill>
+                <a:schemeClr val="tx1"/>
+              </a:solidFill>
+              <a:ln>
+                <a:noFill/>
+              </a:ln>
+            </p:spPr>
+            <p:style>
+              <a:lnRef idx="2">
+                <a:schemeClr val="dk1">
+                  <a:shade val="50000"/>
+                </a:schemeClr>
+              </a:lnRef>
+              <a:fillRef idx="1">
+                <a:schemeClr val="dk1"/>
+              </a:fillRef>
+              <a:effectRef idx="0">
+                <a:schemeClr val="dk1"/>
+              </a:effectRef>
+              <a:fontRef idx="minor">
+                <a:schemeClr val="lt1"/>
+              </a:fontRef>
+            </p:style>
+            <p:txBody>
+              <a:bodyPr rtlCol="0" anchor="ctr"/>
+              <a:lstStyle/>
+              <a:p>
+                <a:pPr algn="ctr"/>
+                <a:endParaRPr lang="en-US"/>
+              </a:p>
+            </p:txBody>
+          </p:sp>
+        </p:grpSp>
+        <p:cxnSp>
+          <p:nvCxnSpPr>
+            <p:cNvPr id="9" name="Straight Connector 8"/>
+            <p:cNvCxnSpPr/>
+            <p:nvPr/>
+          </p:nvCxnSpPr>
+          <p:spPr>
+            <a:xfrm>
+              <a:off x="4153611" y="1260698"/>
+              <a:ext cx="150405" cy="38"/>
+            </a:xfrm>
+            <a:prstGeom prst="line">
+              <a:avLst/>
+            </a:prstGeom>
+            <a:ln w="38100" cap="rnd">
+              <a:solidFill>
+                <a:schemeClr val="tx1"/>
+              </a:solidFill>
+            </a:ln>
+          </p:spPr>
+          <p:style>
+            <a:lnRef idx="1">
+              <a:schemeClr val="accent1"/>
+            </a:lnRef>
+            <a:fillRef idx="0">
+              <a:schemeClr val="accent1"/>
+            </a:fillRef>
+            <a:effectRef idx="0">
+              <a:schemeClr val="accent1"/>
+            </a:effectRef>
+            <a:fontRef idx="minor">
+              <a:schemeClr val="tx1"/>
+            </a:fontRef>
+          </p:style>
+        </p:cxnSp>
+        <p:cxnSp>
+          <p:nvCxnSpPr>
+            <p:cNvPr id="32" name="Straight Connector 31"/>
+            <p:cNvCxnSpPr/>
+            <p:nvPr/>
+          </p:nvCxnSpPr>
+          <p:spPr>
+            <a:xfrm>
+              <a:off x="4148746" y="1620831"/>
+              <a:ext cx="377341" cy="0"/>
+            </a:xfrm>
+            <a:prstGeom prst="line">
+              <a:avLst/>
+            </a:prstGeom>
+            <a:ln w="38100" cap="rnd">
+              <a:solidFill>
+                <a:schemeClr val="tx1"/>
+              </a:solidFill>
+            </a:ln>
+          </p:spPr>
+          <p:style>
+            <a:lnRef idx="1">
+              <a:schemeClr val="accent1"/>
+            </a:lnRef>
+            <a:fillRef idx="0">
+              <a:schemeClr val="accent1"/>
+            </a:fillRef>
+            <a:effectRef idx="0">
+              <a:schemeClr val="accent1"/>
+            </a:effectRef>
+            <a:fontRef idx="minor">
+              <a:schemeClr val="tx1"/>
+            </a:fontRef>
+          </p:style>
+        </p:cxnSp>
+        <p:cxnSp>
+          <p:nvCxnSpPr>
+            <p:cNvPr id="34" name="Straight Connector 33"/>
+            <p:cNvCxnSpPr/>
+            <p:nvPr/>
+          </p:nvCxnSpPr>
+          <p:spPr>
+            <a:xfrm>
+              <a:off x="4141616" y="1260736"/>
+              <a:ext cx="0" cy="360678"/>
+            </a:xfrm>
+            <a:prstGeom prst="line">
+              <a:avLst/>
+            </a:prstGeom>
+            <a:ln w="38100" cap="rnd">
+              <a:solidFill>
+                <a:schemeClr val="tx1"/>
+              </a:solidFill>
+            </a:ln>
+          </p:spPr>
+          <p:style>
+            <a:lnRef idx="1">
+              <a:schemeClr val="accent1"/>
+            </a:lnRef>
+            <a:fillRef idx="0">
+              <a:schemeClr val="accent1"/>
+            </a:fillRef>
+            <a:effectRef idx="0">
+              <a:schemeClr val="accent1"/>
+            </a:effectRef>
+            <a:fontRef idx="minor">
+              <a:schemeClr val="tx1"/>
+            </a:fontRef>
+          </p:style>
+        </p:cxnSp>
+        <p:cxnSp>
+          <p:nvCxnSpPr>
+            <p:cNvPr id="37" name="Straight Connector 36"/>
+            <p:cNvCxnSpPr/>
+            <p:nvPr/>
+          </p:nvCxnSpPr>
+          <p:spPr>
+            <a:xfrm>
+              <a:off x="4535612" y="1403864"/>
+              <a:ext cx="0" cy="214399"/>
+            </a:xfrm>
+            <a:prstGeom prst="line">
+              <a:avLst/>
+            </a:prstGeom>
+            <a:ln w="38100" cap="rnd">
+              <a:solidFill>
+                <a:schemeClr val="tx1"/>
+              </a:solidFill>
+            </a:ln>
+          </p:spPr>
+          <p:style>
+            <a:lnRef idx="1">
+              <a:schemeClr val="accent1"/>
+            </a:lnRef>
+            <a:fillRef idx="0">
+              <a:schemeClr val="accent1"/>
+            </a:fillRef>
+            <a:effectRef idx="0">
+              <a:schemeClr val="accent1"/>
+            </a:effectRef>
+            <a:fontRef idx="minor">
+              <a:schemeClr val="tx1"/>
+            </a:fontRef>
+          </p:style>
+        </p:cxnSp>
+        <p:sp>
+          <p:nvSpPr>
+            <p:cNvPr id="45" name="Rectangle 44"/>
+            <p:cNvSpPr/>
+            <p:nvPr/>
+          </p:nvSpPr>
+          <p:spPr>
+            <a:xfrm>
+              <a:off x="4040236" y="1123883"/>
+              <a:ext cx="594360" cy="548640"/>
+            </a:xfrm>
+            <a:prstGeom prst="rect">
+              <a:avLst/>
+            </a:prstGeom>
+            <a:noFill/>
+            <a:ln>
+              <a:noFill/>
+            </a:ln>
+          </p:spPr>
+          <p:style>
+            <a:lnRef idx="2">
+              <a:schemeClr val="accent1">
+                <a:shade val="50000"/>
+              </a:schemeClr>
+            </a:lnRef>
+            <a:fillRef idx="1">
+              <a:schemeClr val="accent1"/>
+            </a:fillRef>
+            <a:effectRef idx="0">
+              <a:schemeClr val="accent1"/>
+            </a:effectRef>
+            <a:fontRef idx="minor">
+              <a:schemeClr val="lt1"/>
+            </a:fontRef>
+          </p:style>
+          <p:txBody>
+            <a:bodyPr rtlCol="0" anchor="ctr"/>
+            <a:lstStyle/>
+            <a:p>
+              <a:pPr algn="ctr"/>
+              <a:endParaRPr lang="en-US"/>
+            </a:p>
+          </p:txBody>
+        </p:sp>
+      </p:grpSp>
+      <p:pic>
+        <p:nvPicPr>
+          <p:cNvPr id="1026" name="Picture 2" descr="C:\Users\Ian\Desktop\New folder\SyncLabDeleteButton.png"/>
+          <p:cNvPicPr>
+            <a:picLocks noChangeAspect="1" noChangeArrowheads="1"/>
+          </p:cNvPicPr>
+          <p:nvPr/>
+        </p:nvPicPr>
+        <p:blipFill>
+          <a:blip r:embed="rId5">
+            <a:extLst>
+              <a:ext uri="{28A0092B-C50C-407E-A947-70E740481C1C}">
+                <a14:useLocalDpi xmlns:a14="http://schemas.microsoft.com/office/drawing/2010/main" val="0"/>
+              </a:ext>
+            </a:extLst>
+          </a:blip>
+          <a:srcRect/>
+          <a:stretch>
+            <a:fillRect/>
+          </a:stretch>
+        </p:blipFill>
+        <p:spPr bwMode="auto">
+          <a:xfrm>
+            <a:off x="5261759" y="1327266"/>
+            <a:ext cx="228600" cy="228600"/>
           </a:xfrm>
           <a:prstGeom prst="rect">
             <a:avLst/>
           </a:prstGeom>
           <a:noFill/>
+          <a:extLst>
+            <a:ext uri="{909E8E84-426E-40DD-AFC4-6F175D3DCCD1}">
+              <a14:hiddenFill xmlns:a14="http://schemas.microsoft.com/office/drawing/2010/main">
+                <a:solidFill>
+                  <a:srgbClr val="FFFFFF"/>
+                </a:solidFill>
+              </a14:hiddenFill>
+            </a:ext>
+          </a:extLst>
         </p:spPr>
-        <p:txBody>
-          <a:bodyPr wrap="none" rtlCol="0">
-            <a:spAutoFit/>
-          </a:bodyPr>
-          <a:lstStyle/>
-          <a:p>
-            <a:r>
-              <a:rPr lang="en-US" sz="5200" dirty="0" smtClean="0">
+      </p:pic>
+      <p:pic>
+        <p:nvPicPr>
+          <p:cNvPr id="1027" name="Picture 3" descr="C:\Users\Ian\Desktop\SyncLabCopyButton.png"/>
+          <p:cNvPicPr>
+            <a:picLocks noChangeAspect="1" noChangeArrowheads="1"/>
+          </p:cNvPicPr>
+          <p:nvPr/>
+        </p:nvPicPr>
+        <p:blipFill>
+          <a:blip r:embed="rId6">
+            <a:extLst>
+              <a:ext uri="{28A0092B-C50C-407E-A947-70E740481C1C}">
+                <a14:useLocalDpi xmlns:a14="http://schemas.microsoft.com/office/drawing/2010/main" val="0"/>
+              </a:ext>
+            </a:extLst>
+          </a:blip>
+          <a:srcRect/>
+          <a:stretch>
+            <a:fillRect/>
+          </a:stretch>
+        </p:blipFill>
+        <p:spPr bwMode="auto">
+          <a:xfrm>
+            <a:off x="1972178" y="527873"/>
+            <a:ext cx="1219200" cy="1219200"/>
+          </a:xfrm>
+          <a:prstGeom prst="rect">
+            <a:avLst/>
+          </a:prstGeom>
+          <a:noFill/>
+          <a:extLst>
+            <a:ext uri="{909E8E84-426E-40DD-AFC4-6F175D3DCCD1}">
+              <a14:hiddenFill xmlns:a14="http://schemas.microsoft.com/office/drawing/2010/main">
                 <a:solidFill>
-                  <a:srgbClr val="E46A09"/>
+                  <a:srgbClr val="FFFFFF"/>
                 </a:solidFill>
-              </a:rPr>
-              <a:t>=</a:t>
-            </a:r>
-            <a:endParaRPr lang="en-US" sz="5200" dirty="0">
-              <a:solidFill>
-                <a:srgbClr val="E46A09"/>
-              </a:solidFill>
-            </a:endParaRPr>
-          </a:p>
-        </p:txBody>
-      </p:sp>
+              </a14:hiddenFill>
+            </a:ext>
+          </a:extLst>
+        </p:spPr>
+      </p:pic>
     </p:spTree>
     <p:extLst>
       <p:ext uri="{BB962C8B-B14F-4D97-AF65-F5344CB8AC3E}">

</xml_diff>

<commit_message>
Revert "Merge branch 'dev-release' into 'master' (#1416)"
This reverts commit c8b0dddcfac299d29c8bcca5859a390c28a8f256.
</commit_message>
<xml_diff>
--- a/doc/Icons-SyncLab.pptx
+++ b/doc/Icons-SyncLab.pptx
@@ -19,6 +19,10 @@
       <p:bold r:id="rId5"/>
       <p:italic r:id="rId6"/>
       <p:boldItalic r:id="rId7"/>
+    </p:embeddedFont>
+    <p:embeddedFont>
+      <p:font typeface="Gill Sans Ultra Bold" panose="020B0A02020104020203" pitchFamily="34" charset="0"/>
+      <p:regular r:id="rId8"/>
     </p:embeddedFont>
   </p:embeddedFontLst>
   <p:defaultTextStyle>
@@ -118,7 +122,7 @@
   </p:defaultTextStyle>
   <p:extLst>
     <p:ext uri="{EFAFB233-063F-42B5-8137-9DF3F51BA10A}">
-      <p15:sldGuideLst xmlns="" xmlns:p15="http://schemas.microsoft.com/office/powerpoint/2012/main">
+      <p15:sldGuideLst xmlns:p15="http://schemas.microsoft.com/office/powerpoint/2012/main">
         <p15:guide id="1" orient="horz" pos="2160">
           <p15:clr>
             <a:srgbClr val="A4A3A4"/>
@@ -217,7 +221,7 @@
           <a:p>
             <a:fld id="{6699ACB9-486C-4D62-A3A7-AF98E13EFDA3}" type="datetimeFigureOut">
               <a:rPr lang="en-US" smtClean="0"/>
-              <a:t>5/25/2017</a:t>
+              <a:t>2/25/2016</a:t>
             </a:fld>
             <a:endParaRPr lang="en-US"/>
           </a:p>
@@ -667,7 +671,7 @@
             <a:fld id="{1D8BD707-D9CF-40AE-B4C6-C98DA3205C09}" type="datetimeFigureOut">
               <a:rPr lang="en-US" smtClean="0"/>
               <a:pPr/>
-              <a:t>5/25/2017</a:t>
+              <a:t>2/25/2016</a:t>
             </a:fld>
             <a:endParaRPr lang="en-US"/>
           </a:p>
@@ -834,7 +838,7 @@
             <a:fld id="{1D8BD707-D9CF-40AE-B4C6-C98DA3205C09}" type="datetimeFigureOut">
               <a:rPr lang="en-US" smtClean="0"/>
               <a:pPr/>
-              <a:t>5/25/2017</a:t>
+              <a:t>2/25/2016</a:t>
             </a:fld>
             <a:endParaRPr lang="en-US"/>
           </a:p>
@@ -1011,7 +1015,7 @@
             <a:fld id="{1D8BD707-D9CF-40AE-B4C6-C98DA3205C09}" type="datetimeFigureOut">
               <a:rPr lang="en-US" smtClean="0"/>
               <a:pPr/>
-              <a:t>5/25/2017</a:t>
+              <a:t>2/25/2016</a:t>
             </a:fld>
             <a:endParaRPr lang="en-US"/>
           </a:p>
@@ -1178,7 +1182,7 @@
             <a:fld id="{1D8BD707-D9CF-40AE-B4C6-C98DA3205C09}" type="datetimeFigureOut">
               <a:rPr lang="en-US" smtClean="0"/>
               <a:pPr/>
-              <a:t>5/25/2017</a:t>
+              <a:t>2/25/2016</a:t>
             </a:fld>
             <a:endParaRPr lang="en-US"/>
           </a:p>
@@ -1421,7 +1425,7 @@
             <a:fld id="{1D8BD707-D9CF-40AE-B4C6-C98DA3205C09}" type="datetimeFigureOut">
               <a:rPr lang="en-US" smtClean="0"/>
               <a:pPr/>
-              <a:t>5/25/2017</a:t>
+              <a:t>2/25/2016</a:t>
             </a:fld>
             <a:endParaRPr lang="en-US"/>
           </a:p>
@@ -1706,7 +1710,7 @@
             <a:fld id="{1D8BD707-D9CF-40AE-B4C6-C98DA3205C09}" type="datetimeFigureOut">
               <a:rPr lang="en-US" smtClean="0"/>
               <a:pPr/>
-              <a:t>5/25/2017</a:t>
+              <a:t>2/25/2016</a:t>
             </a:fld>
             <a:endParaRPr lang="en-US"/>
           </a:p>
@@ -2125,7 +2129,7 @@
             <a:fld id="{1D8BD707-D9CF-40AE-B4C6-C98DA3205C09}" type="datetimeFigureOut">
               <a:rPr lang="en-US" smtClean="0"/>
               <a:pPr/>
-              <a:t>5/25/2017</a:t>
+              <a:t>2/25/2016</a:t>
             </a:fld>
             <a:endParaRPr lang="en-US"/>
           </a:p>
@@ -2240,7 +2244,7 @@
             <a:fld id="{1D8BD707-D9CF-40AE-B4C6-C98DA3205C09}" type="datetimeFigureOut">
               <a:rPr lang="en-US" smtClean="0"/>
               <a:pPr/>
-              <a:t>5/25/2017</a:t>
+              <a:t>2/25/2016</a:t>
             </a:fld>
             <a:endParaRPr lang="en-US"/>
           </a:p>
@@ -2332,7 +2336,7 @@
             <a:fld id="{1D8BD707-D9CF-40AE-B4C6-C98DA3205C09}" type="datetimeFigureOut">
               <a:rPr lang="en-US" smtClean="0"/>
               <a:pPr/>
-              <a:t>5/25/2017</a:t>
+              <a:t>2/25/2016</a:t>
             </a:fld>
             <a:endParaRPr lang="en-US"/>
           </a:p>
@@ -2606,7 +2610,7 @@
             <a:fld id="{1D8BD707-D9CF-40AE-B4C6-C98DA3205C09}" type="datetimeFigureOut">
               <a:rPr lang="en-US" smtClean="0"/>
               <a:pPr/>
-              <a:t>5/25/2017</a:t>
+              <a:t>2/25/2016</a:t>
             </a:fld>
             <a:endParaRPr lang="en-US"/>
           </a:p>
@@ -2856,7 +2860,7 @@
             <a:fld id="{1D8BD707-D9CF-40AE-B4C6-C98DA3205C09}" type="datetimeFigureOut">
               <a:rPr lang="en-US" smtClean="0"/>
               <a:pPr/>
-              <a:t>5/25/2017</a:t>
+              <a:t>2/25/2016</a:t>
             </a:fld>
             <a:endParaRPr lang="en-US"/>
           </a:p>
@@ -3066,7 +3070,7 @@
             <a:fld id="{1D8BD707-D9CF-40AE-B4C6-C98DA3205C09}" type="datetimeFigureOut">
               <a:rPr lang="en-US" smtClean="0"/>
               <a:pPr/>
-              <a:t>5/25/2017</a:t>
+              <a:t>2/25/2016</a:t>
             </a:fld>
             <a:endParaRPr lang="en-US"/>
           </a:p>
@@ -3468,7 +3472,7 @@
         </p:blipFill>
         <p:spPr bwMode="auto">
           <a:xfrm>
-            <a:off x="1047658" y="920908"/>
+            <a:off x="5370276" y="1286373"/>
             <a:ext cx="841375" cy="405198"/>
           </a:xfrm>
           <a:prstGeom prst="rect">
@@ -3530,7 +3534,7 @@
         </p:blipFill>
         <p:spPr bwMode="auto">
           <a:xfrm>
-            <a:off x="1047657" y="1362838"/>
+            <a:off x="5370275" y="1728303"/>
             <a:ext cx="841375" cy="384235"/>
           </a:xfrm>
           <a:prstGeom prst="rect">
@@ -3571,6 +3575,70 @@
           </a:extLst>
         </p:spPr>
       </p:pic>
+      <p:sp>
+        <p:nvSpPr>
+          <p:cNvPr id="89" name="Rectangle 88"/>
+          <p:cNvSpPr>
+            <a:spLocks/>
+          </p:cNvSpPr>
+          <p:nvPr/>
+        </p:nvSpPr>
+        <p:spPr>
+          <a:xfrm>
+            <a:off x="5676819" y="3023477"/>
+            <a:ext cx="486412" cy="411139"/>
+          </a:xfrm>
+          <a:prstGeom prst="rect">
+            <a:avLst/>
+          </a:prstGeom>
+          <a:noFill/>
+          <a:ln>
+            <a:noFill/>
+          </a:ln>
+        </p:spPr>
+        <p:style>
+          <a:lnRef idx="2">
+            <a:schemeClr val="accent1">
+              <a:shade val="50000"/>
+            </a:schemeClr>
+          </a:lnRef>
+          <a:fillRef idx="1">
+            <a:schemeClr val="accent1"/>
+          </a:fillRef>
+          <a:effectRef idx="0">
+            <a:schemeClr val="accent1"/>
+          </a:effectRef>
+          <a:fontRef idx="minor">
+            <a:schemeClr val="lt1"/>
+          </a:fontRef>
+        </p:style>
+        <p:txBody>
+          <a:bodyPr rtlCol="0" anchor="ctr"/>
+          <a:lstStyle/>
+          <a:p>
+            <a:pPr algn="ctr"/>
+            <a:r>
+              <a:rPr lang="en-US" sz="3200" dirty="0" smtClean="0">
+                <a:solidFill>
+                  <a:schemeClr val="accent6">
+                    <a:lumMod val="75000"/>
+                  </a:schemeClr>
+                </a:solidFill>
+                <a:latin typeface="Gill Sans Ultra Bold" panose="020B0A02020104020203" pitchFamily="34" charset="0"/>
+              </a:rPr>
+              <a:t>s</a:t>
+            </a:r>
+            <a:endParaRPr lang="en-SG" sz="3200" dirty="0">
+              <a:solidFill>
+                <a:schemeClr val="accent6">
+                  <a:lumMod val="75000"/>
+                </a:schemeClr>
+              </a:solidFill>
+              <a:latin typeface="Gill Sans Ultra Bold" panose="020B0A02020104020203" pitchFamily="34" charset="0"/>
+            </a:endParaRPr>
+          </a:p>
+        </p:txBody>
+      </p:sp>
       <p:pic>
         <p:nvPicPr>
           <p:cNvPr id="1034" name="Picture 10"/>
@@ -3592,7 +3660,7 @@
         </p:blipFill>
         <p:spPr bwMode="auto">
           <a:xfrm>
-            <a:off x="1176978" y="1034292"/>
+            <a:off x="5499596" y="1399757"/>
             <a:ext cx="341745" cy="310398"/>
           </a:xfrm>
           <a:prstGeom prst="rect">
@@ -3654,7 +3722,7 @@
         </p:blipFill>
         <p:spPr bwMode="auto">
           <a:xfrm>
-            <a:off x="1481045" y="1326106"/>
+            <a:off x="5803663" y="1691571"/>
             <a:ext cx="341745" cy="310398"/>
           </a:xfrm>
           <a:prstGeom prst="rect">
@@ -3695,6 +3763,96 @@
           </a:extLst>
         </p:spPr>
       </p:pic>
+      <p:sp>
+        <p:nvSpPr>
+          <p:cNvPr id="93" name="Freeform 92"/>
+          <p:cNvSpPr>
+            <a:spLocks/>
+          </p:cNvSpPr>
+          <p:nvPr/>
+        </p:nvSpPr>
+        <p:spPr>
+          <a:xfrm>
+            <a:off x="5595245" y="2879498"/>
+            <a:ext cx="764929" cy="71832"/>
+          </a:xfrm>
+          <a:custGeom>
+            <a:avLst/>
+            <a:gdLst>
+              <a:gd name="connsiteX0" fmla="*/ 0 w 708025"/>
+              <a:gd name="connsiteY0" fmla="*/ 69850 h 69850"/>
+              <a:gd name="connsiteX1" fmla="*/ 330200 w 708025"/>
+              <a:gd name="connsiteY1" fmla="*/ 69850 h 69850"/>
+              <a:gd name="connsiteX2" fmla="*/ 409575 w 708025"/>
+              <a:gd name="connsiteY2" fmla="*/ 0 h 69850"/>
+              <a:gd name="connsiteX3" fmla="*/ 708025 w 708025"/>
+              <a:gd name="connsiteY3" fmla="*/ 0 h 69850"/>
+            </a:gdLst>
+            <a:ahLst/>
+            <a:cxnLst>
+              <a:cxn ang="0">
+                <a:pos x="connsiteX0" y="connsiteY0"/>
+              </a:cxn>
+              <a:cxn ang="0">
+                <a:pos x="connsiteX1" y="connsiteY1"/>
+              </a:cxn>
+              <a:cxn ang="0">
+                <a:pos x="connsiteX2" y="connsiteY2"/>
+              </a:cxn>
+              <a:cxn ang="0">
+                <a:pos x="connsiteX3" y="connsiteY3"/>
+              </a:cxn>
+            </a:cxnLst>
+            <a:rect l="l" t="t" r="r" b="b"/>
+            <a:pathLst>
+              <a:path w="708025" h="69850">
+                <a:moveTo>
+                  <a:pt x="0" y="69850"/>
+                </a:moveTo>
+                <a:lnTo>
+                  <a:pt x="330200" y="69850"/>
+                </a:lnTo>
+                <a:lnTo>
+                  <a:pt x="409575" y="0"/>
+                </a:lnTo>
+                <a:lnTo>
+                  <a:pt x="708025" y="0"/>
+                </a:lnTo>
+              </a:path>
+            </a:pathLst>
+          </a:custGeom>
+          <a:noFill/>
+          <a:ln w="57150">
+            <a:solidFill>
+              <a:srgbClr val="0070C0"/>
+            </a:solidFill>
+          </a:ln>
+        </p:spPr>
+        <p:style>
+          <a:lnRef idx="2">
+            <a:schemeClr val="accent1">
+              <a:shade val="50000"/>
+            </a:schemeClr>
+          </a:lnRef>
+          <a:fillRef idx="1">
+            <a:schemeClr val="accent1"/>
+          </a:fillRef>
+          <a:effectRef idx="0">
+            <a:schemeClr val="accent1"/>
+          </a:effectRef>
+          <a:fontRef idx="minor">
+            <a:schemeClr val="lt1"/>
+          </a:fontRef>
+        </p:style>
+        <p:txBody>
+          <a:bodyPr rtlCol="0" anchor="ctr"/>
+          <a:lstStyle/>
+          <a:p>
+            <a:pPr algn="ctr"/>
+            <a:endParaRPr lang="en-SG"/>
+          </a:p>
+        </p:txBody>
+      </p:sp>
       <p:pic>
         <p:nvPicPr>
           <p:cNvPr id="1035" name="Picture 11"/>
@@ -3716,7 +3874,7 @@
         </p:blipFill>
         <p:spPr bwMode="auto">
           <a:xfrm>
-            <a:off x="1088933" y="1279381"/>
+            <a:off x="5411551" y="1644846"/>
             <a:ext cx="774700" cy="128587"/>
           </a:xfrm>
           <a:prstGeom prst="rect">
@@ -3757,418 +3915,74 @@
           </a:extLst>
         </p:spPr>
       </p:pic>
-      <p:grpSp>
-        <p:nvGrpSpPr>
-          <p:cNvPr id="18" name="Group 17"/>
-          <p:cNvGrpSpPr/>
+      <p:sp>
+        <p:nvSpPr>
+          <p:cNvPr id="9" name="Rectangle 4"/>
+          <p:cNvSpPr>
+            <a:spLocks/>
+          </p:cNvSpPr>
           <p:nvPr/>
-        </p:nvGrpSpPr>
-        <p:grpSpPr>
-          <a:xfrm>
-            <a:off x="3334142" y="1075004"/>
-            <a:ext cx="549071" cy="549822"/>
-            <a:chOff x="4180111" y="1375544"/>
-            <a:chExt cx="549071" cy="549822"/>
+        </p:nvSpPr>
+        <p:spPr>
+          <a:xfrm rot="16200000">
+            <a:off x="3924989" y="2375244"/>
+            <a:ext cx="700291" cy="690781"/>
           </a:xfrm>
-        </p:grpSpPr>
-        <p:grpSp>
-          <p:nvGrpSpPr>
-            <p:cNvPr id="19" name="Group 18"/>
-            <p:cNvGrpSpPr/>
-            <p:nvPr/>
-          </p:nvGrpSpPr>
-          <p:grpSpPr>
-            <a:xfrm>
-              <a:off x="4235574" y="1385216"/>
-              <a:ext cx="446467" cy="521728"/>
-              <a:chOff x="4821567" y="919204"/>
-              <a:chExt cx="446467" cy="521728"/>
-            </a:xfrm>
-          </p:grpSpPr>
-          <p:sp>
-            <p:nvSpPr>
-              <p:cNvPr id="21" name="Rectangle 20"/>
-              <p:cNvSpPr/>
-              <p:nvPr/>
-            </p:nvSpPr>
-            <p:spPr>
-              <a:xfrm>
-                <a:off x="4821567" y="971454"/>
-                <a:ext cx="343904" cy="406070"/>
-              </a:xfrm>
-              <a:prstGeom prst="rect">
-                <a:avLst/>
-              </a:prstGeom>
-              <a:solidFill>
-                <a:schemeClr val="tx1"/>
-              </a:solidFill>
-              <a:ln>
-                <a:noFill/>
-              </a:ln>
-            </p:spPr>
-            <p:style>
-              <a:lnRef idx="2">
-                <a:schemeClr val="accent1">
-                  <a:shade val="50000"/>
-                </a:schemeClr>
-              </a:lnRef>
-              <a:fillRef idx="1">
-                <a:schemeClr val="accent1"/>
-              </a:fillRef>
-              <a:effectRef idx="0">
-                <a:schemeClr val="accent1"/>
-              </a:effectRef>
-              <a:fontRef idx="minor">
-                <a:schemeClr val="lt1"/>
-              </a:fontRef>
-            </p:style>
-            <p:txBody>
-              <a:bodyPr rtlCol="0" anchor="ctr"/>
-              <a:lstStyle/>
-              <a:p>
-                <a:pPr algn="ctr"/>
-                <a:endParaRPr lang="en-US"/>
-              </a:p>
-            </p:txBody>
-          </p:sp>
-          <p:sp>
-            <p:nvSpPr>
-              <p:cNvPr id="23" name="Rectangle: Folded Corner 1026"/>
-              <p:cNvSpPr/>
-              <p:nvPr/>
-            </p:nvSpPr>
-            <p:spPr>
-              <a:xfrm rot="10800000" flipH="1">
-                <a:off x="4990894" y="1102754"/>
-                <a:ext cx="277140" cy="338178"/>
-              </a:xfrm>
-              <a:prstGeom prst="foldedCorner">
-                <a:avLst>
-                  <a:gd name="adj" fmla="val 44103"/>
-                </a:avLst>
-              </a:prstGeom>
-              <a:solidFill>
-                <a:schemeClr val="bg1"/>
-              </a:solidFill>
-              <a:ln>
-                <a:solidFill>
-                  <a:schemeClr val="tx1"/>
-                </a:solidFill>
-              </a:ln>
-            </p:spPr>
-            <p:style>
-              <a:lnRef idx="2">
-                <a:schemeClr val="accent1">
-                  <a:shade val="50000"/>
-                </a:schemeClr>
-              </a:lnRef>
-              <a:fillRef idx="1">
-                <a:schemeClr val="accent1"/>
-              </a:fillRef>
-              <a:effectRef idx="0">
-                <a:schemeClr val="accent1"/>
-              </a:effectRef>
-              <a:fontRef idx="minor">
-                <a:schemeClr val="lt1"/>
-              </a:fontRef>
-            </p:style>
-            <p:txBody>
-              <a:bodyPr rtlCol="0" anchor="ctr"/>
-              <a:lstStyle/>
-              <a:p>
-                <a:pPr algn="ctr"/>
-                <a:endParaRPr lang="en-US"/>
-              </a:p>
-            </p:txBody>
-          </p:sp>
-          <p:sp>
-            <p:nvSpPr>
-              <p:cNvPr id="25" name="Rounded Rectangle 227"/>
-              <p:cNvSpPr/>
-              <p:nvPr/>
-            </p:nvSpPr>
-            <p:spPr>
-              <a:xfrm rot="10800000">
-                <a:off x="4879960" y="919204"/>
-                <a:ext cx="234247" cy="101171"/>
-              </a:xfrm>
-              <a:custGeom>
-                <a:avLst/>
-                <a:gdLst/>
-                <a:ahLst/>
-                <a:cxnLst/>
-                <a:rect l="l" t="t" r="r" b="b"/>
-                <a:pathLst>
-                  <a:path w="286327" h="1000124">
-                    <a:moveTo>
-                      <a:pt x="2115" y="0"/>
-                    </a:moveTo>
-                    <a:lnTo>
-                      <a:pt x="284212" y="0"/>
-                    </a:lnTo>
-                    <a:cubicBezTo>
-                      <a:pt x="286188" y="3367"/>
-                      <a:pt x="286327" y="6905"/>
-                      <a:pt x="286327" y="10476"/>
-                    </a:cubicBezTo>
-                    <a:lnTo>
-                      <a:pt x="286327" y="712825"/>
-                    </a:lnTo>
-                    <a:cubicBezTo>
-                      <a:pt x="286327" y="772047"/>
-                      <a:pt x="247915" y="822299"/>
-                      <a:pt x="194109" y="838409"/>
-                    </a:cubicBezTo>
-                    <a:cubicBezTo>
-                      <a:pt x="194108" y="875332"/>
-                      <a:pt x="194108" y="912256"/>
-                      <a:pt x="194108" y="949179"/>
-                    </a:cubicBezTo>
-                    <a:cubicBezTo>
-                      <a:pt x="194108" y="977315"/>
-                      <a:pt x="171299" y="1000124"/>
-                      <a:pt x="143163" y="1000124"/>
-                    </a:cubicBezTo>
-                    <a:lnTo>
-                      <a:pt x="143164" y="1000123"/>
-                    </a:lnTo>
-                    <a:cubicBezTo>
-                      <a:pt x="115028" y="1000123"/>
-                      <a:pt x="92219" y="977314"/>
-                      <a:pt x="92219" y="949178"/>
-                    </a:cubicBezTo>
-                    <a:lnTo>
-                      <a:pt x="92219" y="838409"/>
-                    </a:lnTo>
-                    <a:cubicBezTo>
-                      <a:pt x="38413" y="822299"/>
-                      <a:pt x="0" y="772048"/>
-                      <a:pt x="0" y="712825"/>
-                    </a:cubicBezTo>
-                    <a:lnTo>
-                      <a:pt x="0" y="10476"/>
-                    </a:lnTo>
-                    <a:close/>
-                  </a:path>
-                </a:pathLst>
-              </a:custGeom>
-              <a:solidFill>
-                <a:schemeClr val="tx1"/>
-              </a:solidFill>
-              <a:ln w="19050">
-                <a:solidFill>
-                  <a:schemeClr val="bg1"/>
-                </a:solidFill>
-              </a:ln>
-            </p:spPr>
-            <p:style>
-              <a:lnRef idx="2">
-                <a:schemeClr val="accent1">
-                  <a:shade val="50000"/>
-                </a:schemeClr>
-              </a:lnRef>
-              <a:fillRef idx="1">
-                <a:schemeClr val="accent1"/>
-              </a:fillRef>
-              <a:effectRef idx="0">
-                <a:schemeClr val="accent1"/>
-              </a:effectRef>
-              <a:fontRef idx="minor">
-                <a:schemeClr val="lt1"/>
-              </a:fontRef>
-            </p:style>
-            <p:txBody>
-              <a:bodyPr rtlCol="0" anchor="ctr"/>
-              <a:lstStyle/>
-              <a:p>
-                <a:pPr algn="ctr"/>
-                <a:endParaRPr lang="en-SG"/>
-              </a:p>
-            </p:txBody>
-          </p:sp>
-        </p:grpSp>
-        <p:sp>
-          <p:nvSpPr>
-            <p:cNvPr id="20" name="Rectangle 19"/>
-            <p:cNvSpPr/>
-            <p:nvPr/>
-          </p:nvSpPr>
-          <p:spPr>
-            <a:xfrm rot="10800000">
-              <a:off x="4180111" y="1375544"/>
-              <a:ext cx="549071" cy="549822"/>
-            </a:xfrm>
-            <a:prstGeom prst="rect">
-              <a:avLst/>
-            </a:prstGeom>
-            <a:noFill/>
-            <a:ln>
-              <a:noFill/>
-            </a:ln>
-          </p:spPr>
-          <p:style>
-            <a:lnRef idx="2">
-              <a:schemeClr val="accent1">
-                <a:shade val="50000"/>
-              </a:schemeClr>
-            </a:lnRef>
-            <a:fillRef idx="1">
-              <a:schemeClr val="accent1"/>
-            </a:fillRef>
-            <a:effectRef idx="0">
-              <a:schemeClr val="accent1"/>
-            </a:effectRef>
-            <a:fontRef idx="minor">
-              <a:schemeClr val="lt1"/>
-            </a:fontRef>
-          </p:style>
-          <p:txBody>
-            <a:bodyPr wrap="none" lIns="0" tIns="0" rIns="0" bIns="0" rtlCol="0" anchor="ctr"/>
-            <a:lstStyle/>
-            <a:p>
-              <a:pPr algn="ctr"/>
-              <a:endParaRPr lang="en-US" b="1"/>
-            </a:p>
-          </p:txBody>
-        </p:sp>
-      </p:grpSp>
-      <p:sp>
-        <p:nvSpPr>
-          <p:cNvPr id="27" name="TextBox 26"/>
-          <p:cNvSpPr txBox="1"/>
-          <p:nvPr/>
-        </p:nvSpPr>
-        <p:spPr>
-          <a:xfrm>
-            <a:off x="2352579" y="1661781"/>
-            <a:ext cx="458399" cy="215444"/>
-          </a:xfrm>
-          <a:prstGeom prst="rect">
+          <a:custGeom>
             <a:avLst/>
-          </a:prstGeom>
+            <a:gdLst/>
+            <a:ahLst/>
+            <a:cxnLst/>
+            <a:rect l="l" t="t" r="r" b="b"/>
+            <a:pathLst>
+              <a:path w="1752603" h="1752600">
+                <a:moveTo>
+                  <a:pt x="533400" y="0"/>
+                </a:moveTo>
+                <a:lnTo>
+                  <a:pt x="533403" y="0"/>
+                </a:lnTo>
+                <a:lnTo>
+                  <a:pt x="1066800" y="0"/>
+                </a:lnTo>
+                <a:lnTo>
+                  <a:pt x="1752603" y="0"/>
+                </a:lnTo>
+                <a:lnTo>
+                  <a:pt x="1752603" y="1752600"/>
+                </a:lnTo>
+                <a:lnTo>
+                  <a:pt x="1219203" y="1752600"/>
+                </a:lnTo>
+                <a:lnTo>
+                  <a:pt x="533403" y="1752600"/>
+                </a:lnTo>
+                <a:lnTo>
+                  <a:pt x="3" y="1752600"/>
+                </a:lnTo>
+                <a:lnTo>
+                  <a:pt x="3" y="533430"/>
+                </a:lnTo>
+                <a:cubicBezTo>
+                  <a:pt x="0" y="533420"/>
+                  <a:pt x="0" y="533410"/>
+                  <a:pt x="0" y="533400"/>
+                </a:cubicBezTo>
+                <a:cubicBezTo>
+                  <a:pt x="0" y="238811"/>
+                  <a:pt x="238811" y="0"/>
+                  <a:pt x="533400" y="0"/>
+                </a:cubicBezTo>
+                <a:close/>
+              </a:path>
+            </a:pathLst>
+          </a:custGeom>
           <a:noFill/>
-        </p:spPr>
-        <p:txBody>
-          <a:bodyPr wrap="square" rtlCol="0">
-            <a:spAutoFit/>
-          </a:bodyPr>
-          <a:lstStyle/>
-          <a:p>
-            <a:r>
-              <a:rPr lang="en-US" sz="800" dirty="0" smtClean="0"/>
-              <a:t>Copy</a:t>
-            </a:r>
-            <a:endParaRPr lang="en-SG" sz="800" dirty="0"/>
-          </a:p>
-        </p:txBody>
-      </p:sp>
-      <p:sp>
-        <p:nvSpPr>
-          <p:cNvPr id="28" name="TextBox 27"/>
-          <p:cNvSpPr txBox="1"/>
-          <p:nvPr/>
-        </p:nvSpPr>
-        <p:spPr>
-          <a:xfrm>
-            <a:off x="3400394" y="1651827"/>
-            <a:ext cx="458399" cy="215444"/>
-          </a:xfrm>
-          <a:prstGeom prst="rect">
-            <a:avLst/>
-          </a:prstGeom>
-          <a:noFill/>
-        </p:spPr>
-        <p:txBody>
-          <a:bodyPr wrap="square" rtlCol="0">
-            <a:spAutoFit/>
-          </a:bodyPr>
-          <a:lstStyle/>
-          <a:p>
-            <a:r>
-              <a:rPr lang="en-US" sz="800" dirty="0" smtClean="0"/>
-              <a:t>Paste</a:t>
-            </a:r>
-            <a:endParaRPr lang="en-SG" sz="800" dirty="0"/>
-          </a:p>
-        </p:txBody>
-      </p:sp>
-      <p:sp>
-        <p:nvSpPr>
-          <p:cNvPr id="29" name="TextBox 28"/>
-          <p:cNvSpPr txBox="1"/>
-          <p:nvPr/>
-        </p:nvSpPr>
-        <p:spPr>
-          <a:xfrm>
-            <a:off x="4405396" y="1639351"/>
-            <a:ext cx="458399" cy="215444"/>
-          </a:xfrm>
-          <a:prstGeom prst="rect">
-            <a:avLst/>
-          </a:prstGeom>
-          <a:noFill/>
-        </p:spPr>
-        <p:txBody>
-          <a:bodyPr wrap="square" rtlCol="0">
-            <a:spAutoFit/>
-          </a:bodyPr>
-          <a:lstStyle/>
-          <a:p>
-            <a:r>
-              <a:rPr lang="en-US" sz="800" dirty="0" smtClean="0"/>
-              <a:t>Edit</a:t>
-            </a:r>
-            <a:endParaRPr lang="en-SG" sz="800" dirty="0"/>
-          </a:p>
-        </p:txBody>
-      </p:sp>
-      <p:sp>
-        <p:nvSpPr>
-          <p:cNvPr id="30" name="TextBox 29"/>
-          <p:cNvSpPr txBox="1"/>
-          <p:nvPr/>
-        </p:nvSpPr>
-        <p:spPr>
-          <a:xfrm>
-            <a:off x="5146859" y="1662105"/>
-            <a:ext cx="458399" cy="215444"/>
-          </a:xfrm>
-          <a:prstGeom prst="rect">
-            <a:avLst/>
-          </a:prstGeom>
-          <a:noFill/>
-        </p:spPr>
-        <p:txBody>
-          <a:bodyPr wrap="square" rtlCol="0">
-            <a:spAutoFit/>
-          </a:bodyPr>
-          <a:lstStyle/>
-          <a:p>
-            <a:r>
-              <a:rPr lang="en-US" sz="800" dirty="0" smtClean="0"/>
-              <a:t>Delete</a:t>
-            </a:r>
-            <a:endParaRPr lang="en-SG" sz="800" dirty="0"/>
-          </a:p>
-        </p:txBody>
-      </p:sp>
-      <p:sp>
-        <p:nvSpPr>
-          <p:cNvPr id="42" name="Rectangle 41"/>
-          <p:cNvSpPr/>
-          <p:nvPr/>
-        </p:nvSpPr>
-        <p:spPr>
-          <a:xfrm>
-            <a:off x="4902536" y="1662105"/>
-            <a:ext cx="502920" cy="502920"/>
-          </a:xfrm>
-          <a:prstGeom prst="rect">
-            <a:avLst/>
-          </a:prstGeom>
-          <a:noFill/>
-          <a:ln>
-            <a:noFill/>
+          <a:ln w="76200" cmpd="sng">
+            <a:solidFill>
+              <a:srgbClr val="0070C0"/>
+            </a:solidFill>
+            <a:miter lim="800000"/>
           </a:ln>
         </p:spPr>
         <p:style>
@@ -4196,394 +4010,46 @@
           </a:p>
         </p:txBody>
       </p:sp>
-      <p:grpSp>
-        <p:nvGrpSpPr>
-          <p:cNvPr id="11" name="Group 10"/>
-          <p:cNvGrpSpPr/>
+      <p:sp>
+        <p:nvSpPr>
+          <p:cNvPr id="10" name="TextBox 9"/>
+          <p:cNvSpPr txBox="1">
+            <a:spLocks/>
+          </p:cNvSpPr>
           <p:nvPr/>
-        </p:nvGrpSpPr>
-        <p:grpSpPr>
+        </p:nvSpPr>
+        <p:spPr>
           <a:xfrm>
-            <a:off x="4241386" y="1058959"/>
-            <a:ext cx="594360" cy="592408"/>
-            <a:chOff x="4040236" y="1080115"/>
-            <a:chExt cx="594360" cy="592408"/>
-          </a:xfrm>
-        </p:grpSpPr>
-        <p:grpSp>
-          <p:nvGrpSpPr>
-            <p:cNvPr id="7" name="Group 6"/>
-            <p:cNvGrpSpPr/>
-            <p:nvPr/>
-          </p:nvGrpSpPr>
-          <p:grpSpPr>
-            <a:xfrm rot="18268995">
-              <a:off x="4157961" y="1269633"/>
-              <a:ext cx="507936" cy="128900"/>
-              <a:chOff x="4361991" y="971632"/>
-              <a:chExt cx="507936" cy="128900"/>
-            </a:xfrm>
-          </p:grpSpPr>
-          <p:sp>
-            <p:nvSpPr>
-              <p:cNvPr id="5" name="Rectangle 4"/>
-              <p:cNvSpPr/>
-              <p:nvPr/>
-            </p:nvSpPr>
-            <p:spPr>
-              <a:xfrm rot="10800000" flipV="1">
-                <a:off x="4504167" y="972516"/>
-                <a:ext cx="365760" cy="128016"/>
-              </a:xfrm>
-              <a:prstGeom prst="rect">
-                <a:avLst/>
-              </a:prstGeom>
-              <a:solidFill>
-                <a:schemeClr val="tx1"/>
-              </a:solidFill>
-              <a:ln>
-                <a:noFill/>
-              </a:ln>
-            </p:spPr>
-            <p:style>
-              <a:lnRef idx="2">
-                <a:schemeClr val="dk1">
-                  <a:shade val="50000"/>
-                </a:schemeClr>
-              </a:lnRef>
-              <a:fillRef idx="1">
-                <a:schemeClr val="dk1"/>
-              </a:fillRef>
-              <a:effectRef idx="0">
-                <a:schemeClr val="dk1"/>
-              </a:effectRef>
-              <a:fontRef idx="minor">
-                <a:schemeClr val="lt1"/>
-              </a:fontRef>
-            </p:style>
-            <p:txBody>
-              <a:bodyPr rtlCol="0" anchor="ctr"/>
-              <a:lstStyle/>
-              <a:p>
-                <a:pPr algn="ctr"/>
-                <a:endParaRPr lang="en-US"/>
-              </a:p>
-            </p:txBody>
-          </p:sp>
-          <p:sp>
-            <p:nvSpPr>
-              <p:cNvPr id="6" name="Isosceles Triangle 5"/>
-              <p:cNvSpPr/>
-              <p:nvPr/>
-            </p:nvSpPr>
-            <p:spPr>
-              <a:xfrm rot="16200000">
-                <a:off x="4361991" y="971632"/>
-                <a:ext cx="128016" cy="128016"/>
-              </a:xfrm>
-              <a:prstGeom prst="triangle">
-                <a:avLst/>
-              </a:prstGeom>
-              <a:solidFill>
-                <a:schemeClr val="tx1"/>
-              </a:solidFill>
-              <a:ln>
-                <a:noFill/>
-              </a:ln>
-            </p:spPr>
-            <p:style>
-              <a:lnRef idx="2">
-                <a:schemeClr val="dk1">
-                  <a:shade val="50000"/>
-                </a:schemeClr>
-              </a:lnRef>
-              <a:fillRef idx="1">
-                <a:schemeClr val="dk1"/>
-              </a:fillRef>
-              <a:effectRef idx="0">
-                <a:schemeClr val="dk1"/>
-              </a:effectRef>
-              <a:fontRef idx="minor">
-                <a:schemeClr val="lt1"/>
-              </a:fontRef>
-            </p:style>
-            <p:txBody>
-              <a:bodyPr rtlCol="0" anchor="ctr"/>
-              <a:lstStyle/>
-              <a:p>
-                <a:pPr algn="ctr"/>
-                <a:endParaRPr lang="en-US"/>
-              </a:p>
-            </p:txBody>
-          </p:sp>
-        </p:grpSp>
-        <p:cxnSp>
-          <p:nvCxnSpPr>
-            <p:cNvPr id="9" name="Straight Connector 8"/>
-            <p:cNvCxnSpPr/>
-            <p:nvPr/>
-          </p:nvCxnSpPr>
-          <p:spPr>
-            <a:xfrm>
-              <a:off x="4153611" y="1260698"/>
-              <a:ext cx="150405" cy="38"/>
-            </a:xfrm>
-            <a:prstGeom prst="line">
-              <a:avLst/>
-            </a:prstGeom>
-            <a:ln w="38100" cap="rnd">
-              <a:solidFill>
-                <a:schemeClr val="tx1"/>
-              </a:solidFill>
-            </a:ln>
-          </p:spPr>
-          <p:style>
-            <a:lnRef idx="1">
-              <a:schemeClr val="accent1"/>
-            </a:lnRef>
-            <a:fillRef idx="0">
-              <a:schemeClr val="accent1"/>
-            </a:fillRef>
-            <a:effectRef idx="0">
-              <a:schemeClr val="accent1"/>
-            </a:effectRef>
-            <a:fontRef idx="minor">
-              <a:schemeClr val="tx1"/>
-            </a:fontRef>
-          </p:style>
-        </p:cxnSp>
-        <p:cxnSp>
-          <p:nvCxnSpPr>
-            <p:cNvPr id="32" name="Straight Connector 31"/>
-            <p:cNvCxnSpPr/>
-            <p:nvPr/>
-          </p:nvCxnSpPr>
-          <p:spPr>
-            <a:xfrm>
-              <a:off x="4148746" y="1620831"/>
-              <a:ext cx="377341" cy="0"/>
-            </a:xfrm>
-            <a:prstGeom prst="line">
-              <a:avLst/>
-            </a:prstGeom>
-            <a:ln w="38100" cap="rnd">
-              <a:solidFill>
-                <a:schemeClr val="tx1"/>
-              </a:solidFill>
-            </a:ln>
-          </p:spPr>
-          <p:style>
-            <a:lnRef idx="1">
-              <a:schemeClr val="accent1"/>
-            </a:lnRef>
-            <a:fillRef idx="0">
-              <a:schemeClr val="accent1"/>
-            </a:fillRef>
-            <a:effectRef idx="0">
-              <a:schemeClr val="accent1"/>
-            </a:effectRef>
-            <a:fontRef idx="minor">
-              <a:schemeClr val="tx1"/>
-            </a:fontRef>
-          </p:style>
-        </p:cxnSp>
-        <p:cxnSp>
-          <p:nvCxnSpPr>
-            <p:cNvPr id="34" name="Straight Connector 33"/>
-            <p:cNvCxnSpPr/>
-            <p:nvPr/>
-          </p:nvCxnSpPr>
-          <p:spPr>
-            <a:xfrm>
-              <a:off x="4141616" y="1260736"/>
-              <a:ext cx="0" cy="360678"/>
-            </a:xfrm>
-            <a:prstGeom prst="line">
-              <a:avLst/>
-            </a:prstGeom>
-            <a:ln w="38100" cap="rnd">
-              <a:solidFill>
-                <a:schemeClr val="tx1"/>
-              </a:solidFill>
-            </a:ln>
-          </p:spPr>
-          <p:style>
-            <a:lnRef idx="1">
-              <a:schemeClr val="accent1"/>
-            </a:lnRef>
-            <a:fillRef idx="0">
-              <a:schemeClr val="accent1"/>
-            </a:fillRef>
-            <a:effectRef idx="0">
-              <a:schemeClr val="accent1"/>
-            </a:effectRef>
-            <a:fontRef idx="minor">
-              <a:schemeClr val="tx1"/>
-            </a:fontRef>
-          </p:style>
-        </p:cxnSp>
-        <p:cxnSp>
-          <p:nvCxnSpPr>
-            <p:cNvPr id="37" name="Straight Connector 36"/>
-            <p:cNvCxnSpPr/>
-            <p:nvPr/>
-          </p:nvCxnSpPr>
-          <p:spPr>
-            <a:xfrm>
-              <a:off x="4535612" y="1403864"/>
-              <a:ext cx="0" cy="214399"/>
-            </a:xfrm>
-            <a:prstGeom prst="line">
-              <a:avLst/>
-            </a:prstGeom>
-            <a:ln w="38100" cap="rnd">
-              <a:solidFill>
-                <a:schemeClr val="tx1"/>
-              </a:solidFill>
-            </a:ln>
-          </p:spPr>
-          <p:style>
-            <a:lnRef idx="1">
-              <a:schemeClr val="accent1"/>
-            </a:lnRef>
-            <a:fillRef idx="0">
-              <a:schemeClr val="accent1"/>
-            </a:fillRef>
-            <a:effectRef idx="0">
-              <a:schemeClr val="accent1"/>
-            </a:effectRef>
-            <a:fontRef idx="minor">
-              <a:schemeClr val="tx1"/>
-            </a:fontRef>
-          </p:style>
-        </p:cxnSp>
-        <p:sp>
-          <p:nvSpPr>
-            <p:cNvPr id="45" name="Rectangle 44"/>
-            <p:cNvSpPr/>
-            <p:nvPr/>
-          </p:nvSpPr>
-          <p:spPr>
-            <a:xfrm>
-              <a:off x="4040236" y="1123883"/>
-              <a:ext cx="594360" cy="548640"/>
-            </a:xfrm>
-            <a:prstGeom prst="rect">
-              <a:avLst/>
-            </a:prstGeom>
-            <a:noFill/>
-            <a:ln>
-              <a:noFill/>
-            </a:ln>
-          </p:spPr>
-          <p:style>
-            <a:lnRef idx="2">
-              <a:schemeClr val="accent1">
-                <a:shade val="50000"/>
-              </a:schemeClr>
-            </a:lnRef>
-            <a:fillRef idx="1">
-              <a:schemeClr val="accent1"/>
-            </a:fillRef>
-            <a:effectRef idx="0">
-              <a:schemeClr val="accent1"/>
-            </a:effectRef>
-            <a:fontRef idx="minor">
-              <a:schemeClr val="lt1"/>
-            </a:fontRef>
-          </p:style>
-          <p:txBody>
-            <a:bodyPr rtlCol="0" anchor="ctr"/>
-            <a:lstStyle/>
-            <a:p>
-              <a:pPr algn="ctr"/>
-              <a:endParaRPr lang="en-US"/>
-            </a:p>
-          </p:txBody>
-        </p:sp>
-      </p:grpSp>
-      <p:pic>
-        <p:nvPicPr>
-          <p:cNvPr id="1026" name="Picture 2" descr="C:\Users\Ian\Desktop\New folder\SyncLabDeleteButton.png"/>
-          <p:cNvPicPr>
-            <a:picLocks noChangeAspect="1" noChangeArrowheads="1"/>
-          </p:cNvPicPr>
-          <p:nvPr/>
-        </p:nvPicPr>
-        <p:blipFill>
-          <a:blip r:embed="rId5">
-            <a:extLst>
-              <a:ext uri="{28A0092B-C50C-407E-A947-70E740481C1C}">
-                <a14:useLocalDpi xmlns:a14="http://schemas.microsoft.com/office/drawing/2010/main" val="0"/>
-              </a:ext>
-            </a:extLst>
-          </a:blip>
-          <a:srcRect/>
-          <a:stretch>
-            <a:fillRect/>
-          </a:stretch>
-        </p:blipFill>
-        <p:spPr bwMode="auto">
-          <a:xfrm>
-            <a:off x="5261759" y="1327266"/>
-            <a:ext cx="228600" cy="228600"/>
+            <a:off x="4029590" y="2261658"/>
+            <a:ext cx="516488" cy="892552"/>
           </a:xfrm>
           <a:prstGeom prst="rect">
             <a:avLst/>
           </a:prstGeom>
           <a:noFill/>
-          <a:extLst>
-            <a:ext uri="{909E8E84-426E-40DD-AFC4-6F175D3DCCD1}">
-              <a14:hiddenFill xmlns:a14="http://schemas.microsoft.com/office/drawing/2010/main">
+        </p:spPr>
+        <p:txBody>
+          <a:bodyPr wrap="none" rtlCol="0">
+            <a:spAutoFit/>
+          </a:bodyPr>
+          <a:lstStyle/>
+          <a:p>
+            <a:r>
+              <a:rPr lang="en-US" sz="5200" dirty="0" smtClean="0">
                 <a:solidFill>
-                  <a:srgbClr val="FFFFFF"/>
+                  <a:srgbClr val="E46A09"/>
                 </a:solidFill>
-              </a14:hiddenFill>
-            </a:ext>
-          </a:extLst>
-        </p:spPr>
-      </p:pic>
-      <p:pic>
-        <p:nvPicPr>
-          <p:cNvPr id="1027" name="Picture 3" descr="C:\Users\Ian\Desktop\SyncLabCopyButton.png"/>
-          <p:cNvPicPr>
-            <a:picLocks noChangeAspect="1" noChangeArrowheads="1"/>
-          </p:cNvPicPr>
-          <p:nvPr/>
-        </p:nvPicPr>
-        <p:blipFill>
-          <a:blip r:embed="rId6">
-            <a:extLst>
-              <a:ext uri="{28A0092B-C50C-407E-A947-70E740481C1C}">
-                <a14:useLocalDpi xmlns:a14="http://schemas.microsoft.com/office/drawing/2010/main" val="0"/>
-              </a:ext>
-            </a:extLst>
-          </a:blip>
-          <a:srcRect/>
-          <a:stretch>
-            <a:fillRect/>
-          </a:stretch>
-        </p:blipFill>
-        <p:spPr bwMode="auto">
-          <a:xfrm>
-            <a:off x="1972178" y="527873"/>
-            <a:ext cx="1219200" cy="1219200"/>
-          </a:xfrm>
-          <a:prstGeom prst="rect">
-            <a:avLst/>
-          </a:prstGeom>
-          <a:noFill/>
-          <a:extLst>
-            <a:ext uri="{909E8E84-426E-40DD-AFC4-6F175D3DCCD1}">
-              <a14:hiddenFill xmlns:a14="http://schemas.microsoft.com/office/drawing/2010/main">
-                <a:solidFill>
-                  <a:srgbClr val="FFFFFF"/>
-                </a:solidFill>
-              </a14:hiddenFill>
-            </a:ext>
-          </a:extLst>
-        </p:spPr>
-      </p:pic>
+              </a:rPr>
+              <a:t>=</a:t>
+            </a:r>
+            <a:endParaRPr lang="en-US" sz="5200" dirty="0">
+              <a:solidFill>
+                <a:srgbClr val="E46A09"/>
+              </a:solidFill>
+            </a:endParaRPr>
+          </a:p>
+        </p:txBody>
+      </p:sp>
     </p:spTree>
     <p:extLst>
       <p:ext uri="{BB962C8B-B14F-4D97-AF65-F5344CB8AC3E}">

</xml_diff>

<commit_message>
Revert "Merge branch 'dev-release' into 'master' (#1416)" (#1417)
This reverts commit c8b0dddcfac299d29c8bcca5859a390c28a8f256.
</commit_message>
<xml_diff>
--- a/doc/Icons-SyncLab.pptx
+++ b/doc/Icons-SyncLab.pptx
@@ -19,6 +19,10 @@
       <p:bold r:id="rId5"/>
       <p:italic r:id="rId6"/>
       <p:boldItalic r:id="rId7"/>
+    </p:embeddedFont>
+    <p:embeddedFont>
+      <p:font typeface="Gill Sans Ultra Bold" panose="020B0A02020104020203" pitchFamily="34" charset="0"/>
+      <p:regular r:id="rId8"/>
     </p:embeddedFont>
   </p:embeddedFontLst>
   <p:defaultTextStyle>
@@ -118,7 +122,7 @@
   </p:defaultTextStyle>
   <p:extLst>
     <p:ext uri="{EFAFB233-063F-42B5-8137-9DF3F51BA10A}">
-      <p15:sldGuideLst xmlns="" xmlns:p15="http://schemas.microsoft.com/office/powerpoint/2012/main">
+      <p15:sldGuideLst xmlns:p15="http://schemas.microsoft.com/office/powerpoint/2012/main">
         <p15:guide id="1" orient="horz" pos="2160">
           <p15:clr>
             <a:srgbClr val="A4A3A4"/>
@@ -217,7 +221,7 @@
           <a:p>
             <a:fld id="{6699ACB9-486C-4D62-A3A7-AF98E13EFDA3}" type="datetimeFigureOut">
               <a:rPr lang="en-US" smtClean="0"/>
-              <a:t>5/25/2017</a:t>
+              <a:t>2/25/2016</a:t>
             </a:fld>
             <a:endParaRPr lang="en-US"/>
           </a:p>
@@ -667,7 +671,7 @@
             <a:fld id="{1D8BD707-D9CF-40AE-B4C6-C98DA3205C09}" type="datetimeFigureOut">
               <a:rPr lang="en-US" smtClean="0"/>
               <a:pPr/>
-              <a:t>5/25/2017</a:t>
+              <a:t>2/25/2016</a:t>
             </a:fld>
             <a:endParaRPr lang="en-US"/>
           </a:p>
@@ -834,7 +838,7 @@
             <a:fld id="{1D8BD707-D9CF-40AE-B4C6-C98DA3205C09}" type="datetimeFigureOut">
               <a:rPr lang="en-US" smtClean="0"/>
               <a:pPr/>
-              <a:t>5/25/2017</a:t>
+              <a:t>2/25/2016</a:t>
             </a:fld>
             <a:endParaRPr lang="en-US"/>
           </a:p>
@@ -1011,7 +1015,7 @@
             <a:fld id="{1D8BD707-D9CF-40AE-B4C6-C98DA3205C09}" type="datetimeFigureOut">
               <a:rPr lang="en-US" smtClean="0"/>
               <a:pPr/>
-              <a:t>5/25/2017</a:t>
+              <a:t>2/25/2016</a:t>
             </a:fld>
             <a:endParaRPr lang="en-US"/>
           </a:p>
@@ -1178,7 +1182,7 @@
             <a:fld id="{1D8BD707-D9CF-40AE-B4C6-C98DA3205C09}" type="datetimeFigureOut">
               <a:rPr lang="en-US" smtClean="0"/>
               <a:pPr/>
-              <a:t>5/25/2017</a:t>
+              <a:t>2/25/2016</a:t>
             </a:fld>
             <a:endParaRPr lang="en-US"/>
           </a:p>
@@ -1421,7 +1425,7 @@
             <a:fld id="{1D8BD707-D9CF-40AE-B4C6-C98DA3205C09}" type="datetimeFigureOut">
               <a:rPr lang="en-US" smtClean="0"/>
               <a:pPr/>
-              <a:t>5/25/2017</a:t>
+              <a:t>2/25/2016</a:t>
             </a:fld>
             <a:endParaRPr lang="en-US"/>
           </a:p>
@@ -1706,7 +1710,7 @@
             <a:fld id="{1D8BD707-D9CF-40AE-B4C6-C98DA3205C09}" type="datetimeFigureOut">
               <a:rPr lang="en-US" smtClean="0"/>
               <a:pPr/>
-              <a:t>5/25/2017</a:t>
+              <a:t>2/25/2016</a:t>
             </a:fld>
             <a:endParaRPr lang="en-US"/>
           </a:p>
@@ -2125,7 +2129,7 @@
             <a:fld id="{1D8BD707-D9CF-40AE-B4C6-C98DA3205C09}" type="datetimeFigureOut">
               <a:rPr lang="en-US" smtClean="0"/>
               <a:pPr/>
-              <a:t>5/25/2017</a:t>
+              <a:t>2/25/2016</a:t>
             </a:fld>
             <a:endParaRPr lang="en-US"/>
           </a:p>
@@ -2240,7 +2244,7 @@
             <a:fld id="{1D8BD707-D9CF-40AE-B4C6-C98DA3205C09}" type="datetimeFigureOut">
               <a:rPr lang="en-US" smtClean="0"/>
               <a:pPr/>
-              <a:t>5/25/2017</a:t>
+              <a:t>2/25/2016</a:t>
             </a:fld>
             <a:endParaRPr lang="en-US"/>
           </a:p>
@@ -2332,7 +2336,7 @@
             <a:fld id="{1D8BD707-D9CF-40AE-B4C6-C98DA3205C09}" type="datetimeFigureOut">
               <a:rPr lang="en-US" smtClean="0"/>
               <a:pPr/>
-              <a:t>5/25/2017</a:t>
+              <a:t>2/25/2016</a:t>
             </a:fld>
             <a:endParaRPr lang="en-US"/>
           </a:p>
@@ -2606,7 +2610,7 @@
             <a:fld id="{1D8BD707-D9CF-40AE-B4C6-C98DA3205C09}" type="datetimeFigureOut">
               <a:rPr lang="en-US" smtClean="0"/>
               <a:pPr/>
-              <a:t>5/25/2017</a:t>
+              <a:t>2/25/2016</a:t>
             </a:fld>
             <a:endParaRPr lang="en-US"/>
           </a:p>
@@ -2856,7 +2860,7 @@
             <a:fld id="{1D8BD707-D9CF-40AE-B4C6-C98DA3205C09}" type="datetimeFigureOut">
               <a:rPr lang="en-US" smtClean="0"/>
               <a:pPr/>
-              <a:t>5/25/2017</a:t>
+              <a:t>2/25/2016</a:t>
             </a:fld>
             <a:endParaRPr lang="en-US"/>
           </a:p>
@@ -3066,7 +3070,7 @@
             <a:fld id="{1D8BD707-D9CF-40AE-B4C6-C98DA3205C09}" type="datetimeFigureOut">
               <a:rPr lang="en-US" smtClean="0"/>
               <a:pPr/>
-              <a:t>5/25/2017</a:t>
+              <a:t>2/25/2016</a:t>
             </a:fld>
             <a:endParaRPr lang="en-US"/>
           </a:p>
@@ -3468,7 +3472,7 @@
         </p:blipFill>
         <p:spPr bwMode="auto">
           <a:xfrm>
-            <a:off x="1047658" y="920908"/>
+            <a:off x="5370276" y="1286373"/>
             <a:ext cx="841375" cy="405198"/>
           </a:xfrm>
           <a:prstGeom prst="rect">
@@ -3530,7 +3534,7 @@
         </p:blipFill>
         <p:spPr bwMode="auto">
           <a:xfrm>
-            <a:off x="1047657" y="1362838"/>
+            <a:off x="5370275" y="1728303"/>
             <a:ext cx="841375" cy="384235"/>
           </a:xfrm>
           <a:prstGeom prst="rect">
@@ -3571,6 +3575,70 @@
           </a:extLst>
         </p:spPr>
       </p:pic>
+      <p:sp>
+        <p:nvSpPr>
+          <p:cNvPr id="89" name="Rectangle 88"/>
+          <p:cNvSpPr>
+            <a:spLocks/>
+          </p:cNvSpPr>
+          <p:nvPr/>
+        </p:nvSpPr>
+        <p:spPr>
+          <a:xfrm>
+            <a:off x="5676819" y="3023477"/>
+            <a:ext cx="486412" cy="411139"/>
+          </a:xfrm>
+          <a:prstGeom prst="rect">
+            <a:avLst/>
+          </a:prstGeom>
+          <a:noFill/>
+          <a:ln>
+            <a:noFill/>
+          </a:ln>
+        </p:spPr>
+        <p:style>
+          <a:lnRef idx="2">
+            <a:schemeClr val="accent1">
+              <a:shade val="50000"/>
+            </a:schemeClr>
+          </a:lnRef>
+          <a:fillRef idx="1">
+            <a:schemeClr val="accent1"/>
+          </a:fillRef>
+          <a:effectRef idx="0">
+            <a:schemeClr val="accent1"/>
+          </a:effectRef>
+          <a:fontRef idx="minor">
+            <a:schemeClr val="lt1"/>
+          </a:fontRef>
+        </p:style>
+        <p:txBody>
+          <a:bodyPr rtlCol="0" anchor="ctr"/>
+          <a:lstStyle/>
+          <a:p>
+            <a:pPr algn="ctr"/>
+            <a:r>
+              <a:rPr lang="en-US" sz="3200" dirty="0" smtClean="0">
+                <a:solidFill>
+                  <a:schemeClr val="accent6">
+                    <a:lumMod val="75000"/>
+                  </a:schemeClr>
+                </a:solidFill>
+                <a:latin typeface="Gill Sans Ultra Bold" panose="020B0A02020104020203" pitchFamily="34" charset="0"/>
+              </a:rPr>
+              <a:t>s</a:t>
+            </a:r>
+            <a:endParaRPr lang="en-SG" sz="3200" dirty="0">
+              <a:solidFill>
+                <a:schemeClr val="accent6">
+                  <a:lumMod val="75000"/>
+                </a:schemeClr>
+              </a:solidFill>
+              <a:latin typeface="Gill Sans Ultra Bold" panose="020B0A02020104020203" pitchFamily="34" charset="0"/>
+            </a:endParaRPr>
+          </a:p>
+        </p:txBody>
+      </p:sp>
       <p:pic>
         <p:nvPicPr>
           <p:cNvPr id="1034" name="Picture 10"/>
@@ -3592,7 +3660,7 @@
         </p:blipFill>
         <p:spPr bwMode="auto">
           <a:xfrm>
-            <a:off x="1176978" y="1034292"/>
+            <a:off x="5499596" y="1399757"/>
             <a:ext cx="341745" cy="310398"/>
           </a:xfrm>
           <a:prstGeom prst="rect">
@@ -3654,7 +3722,7 @@
         </p:blipFill>
         <p:spPr bwMode="auto">
           <a:xfrm>
-            <a:off x="1481045" y="1326106"/>
+            <a:off x="5803663" y="1691571"/>
             <a:ext cx="341745" cy="310398"/>
           </a:xfrm>
           <a:prstGeom prst="rect">
@@ -3695,6 +3763,96 @@
           </a:extLst>
         </p:spPr>
       </p:pic>
+      <p:sp>
+        <p:nvSpPr>
+          <p:cNvPr id="93" name="Freeform 92"/>
+          <p:cNvSpPr>
+            <a:spLocks/>
+          </p:cNvSpPr>
+          <p:nvPr/>
+        </p:nvSpPr>
+        <p:spPr>
+          <a:xfrm>
+            <a:off x="5595245" y="2879498"/>
+            <a:ext cx="764929" cy="71832"/>
+          </a:xfrm>
+          <a:custGeom>
+            <a:avLst/>
+            <a:gdLst>
+              <a:gd name="connsiteX0" fmla="*/ 0 w 708025"/>
+              <a:gd name="connsiteY0" fmla="*/ 69850 h 69850"/>
+              <a:gd name="connsiteX1" fmla="*/ 330200 w 708025"/>
+              <a:gd name="connsiteY1" fmla="*/ 69850 h 69850"/>
+              <a:gd name="connsiteX2" fmla="*/ 409575 w 708025"/>
+              <a:gd name="connsiteY2" fmla="*/ 0 h 69850"/>
+              <a:gd name="connsiteX3" fmla="*/ 708025 w 708025"/>
+              <a:gd name="connsiteY3" fmla="*/ 0 h 69850"/>
+            </a:gdLst>
+            <a:ahLst/>
+            <a:cxnLst>
+              <a:cxn ang="0">
+                <a:pos x="connsiteX0" y="connsiteY0"/>
+              </a:cxn>
+              <a:cxn ang="0">
+                <a:pos x="connsiteX1" y="connsiteY1"/>
+              </a:cxn>
+              <a:cxn ang="0">
+                <a:pos x="connsiteX2" y="connsiteY2"/>
+              </a:cxn>
+              <a:cxn ang="0">
+                <a:pos x="connsiteX3" y="connsiteY3"/>
+              </a:cxn>
+            </a:cxnLst>
+            <a:rect l="l" t="t" r="r" b="b"/>
+            <a:pathLst>
+              <a:path w="708025" h="69850">
+                <a:moveTo>
+                  <a:pt x="0" y="69850"/>
+                </a:moveTo>
+                <a:lnTo>
+                  <a:pt x="330200" y="69850"/>
+                </a:lnTo>
+                <a:lnTo>
+                  <a:pt x="409575" y="0"/>
+                </a:lnTo>
+                <a:lnTo>
+                  <a:pt x="708025" y="0"/>
+                </a:lnTo>
+              </a:path>
+            </a:pathLst>
+          </a:custGeom>
+          <a:noFill/>
+          <a:ln w="57150">
+            <a:solidFill>
+              <a:srgbClr val="0070C0"/>
+            </a:solidFill>
+          </a:ln>
+        </p:spPr>
+        <p:style>
+          <a:lnRef idx="2">
+            <a:schemeClr val="accent1">
+              <a:shade val="50000"/>
+            </a:schemeClr>
+          </a:lnRef>
+          <a:fillRef idx="1">
+            <a:schemeClr val="accent1"/>
+          </a:fillRef>
+          <a:effectRef idx="0">
+            <a:schemeClr val="accent1"/>
+          </a:effectRef>
+          <a:fontRef idx="minor">
+            <a:schemeClr val="lt1"/>
+          </a:fontRef>
+        </p:style>
+        <p:txBody>
+          <a:bodyPr rtlCol="0" anchor="ctr"/>
+          <a:lstStyle/>
+          <a:p>
+            <a:pPr algn="ctr"/>
+            <a:endParaRPr lang="en-SG"/>
+          </a:p>
+        </p:txBody>
+      </p:sp>
       <p:pic>
         <p:nvPicPr>
           <p:cNvPr id="1035" name="Picture 11"/>
@@ -3716,7 +3874,7 @@
         </p:blipFill>
         <p:spPr bwMode="auto">
           <a:xfrm>
-            <a:off x="1088933" y="1279381"/>
+            <a:off x="5411551" y="1644846"/>
             <a:ext cx="774700" cy="128587"/>
           </a:xfrm>
           <a:prstGeom prst="rect">
@@ -3757,418 +3915,74 @@
           </a:extLst>
         </p:spPr>
       </p:pic>
-      <p:grpSp>
-        <p:nvGrpSpPr>
-          <p:cNvPr id="18" name="Group 17"/>
-          <p:cNvGrpSpPr/>
+      <p:sp>
+        <p:nvSpPr>
+          <p:cNvPr id="9" name="Rectangle 4"/>
+          <p:cNvSpPr>
+            <a:spLocks/>
+          </p:cNvSpPr>
           <p:nvPr/>
-        </p:nvGrpSpPr>
-        <p:grpSpPr>
-          <a:xfrm>
-            <a:off x="3334142" y="1075004"/>
-            <a:ext cx="549071" cy="549822"/>
-            <a:chOff x="4180111" y="1375544"/>
-            <a:chExt cx="549071" cy="549822"/>
+        </p:nvSpPr>
+        <p:spPr>
+          <a:xfrm rot="16200000">
+            <a:off x="3924989" y="2375244"/>
+            <a:ext cx="700291" cy="690781"/>
           </a:xfrm>
-        </p:grpSpPr>
-        <p:grpSp>
-          <p:nvGrpSpPr>
-            <p:cNvPr id="19" name="Group 18"/>
-            <p:cNvGrpSpPr/>
-            <p:nvPr/>
-          </p:nvGrpSpPr>
-          <p:grpSpPr>
-            <a:xfrm>
-              <a:off x="4235574" y="1385216"/>
-              <a:ext cx="446467" cy="521728"/>
-              <a:chOff x="4821567" y="919204"/>
-              <a:chExt cx="446467" cy="521728"/>
-            </a:xfrm>
-          </p:grpSpPr>
-          <p:sp>
-            <p:nvSpPr>
-              <p:cNvPr id="21" name="Rectangle 20"/>
-              <p:cNvSpPr/>
-              <p:nvPr/>
-            </p:nvSpPr>
-            <p:spPr>
-              <a:xfrm>
-                <a:off x="4821567" y="971454"/>
-                <a:ext cx="343904" cy="406070"/>
-              </a:xfrm>
-              <a:prstGeom prst="rect">
-                <a:avLst/>
-              </a:prstGeom>
-              <a:solidFill>
-                <a:schemeClr val="tx1"/>
-              </a:solidFill>
-              <a:ln>
-                <a:noFill/>
-              </a:ln>
-            </p:spPr>
-            <p:style>
-              <a:lnRef idx="2">
-                <a:schemeClr val="accent1">
-                  <a:shade val="50000"/>
-                </a:schemeClr>
-              </a:lnRef>
-              <a:fillRef idx="1">
-                <a:schemeClr val="accent1"/>
-              </a:fillRef>
-              <a:effectRef idx="0">
-                <a:schemeClr val="accent1"/>
-              </a:effectRef>
-              <a:fontRef idx="minor">
-                <a:schemeClr val="lt1"/>
-              </a:fontRef>
-            </p:style>
-            <p:txBody>
-              <a:bodyPr rtlCol="0" anchor="ctr"/>
-              <a:lstStyle/>
-              <a:p>
-                <a:pPr algn="ctr"/>
-                <a:endParaRPr lang="en-US"/>
-              </a:p>
-            </p:txBody>
-          </p:sp>
-          <p:sp>
-            <p:nvSpPr>
-              <p:cNvPr id="23" name="Rectangle: Folded Corner 1026"/>
-              <p:cNvSpPr/>
-              <p:nvPr/>
-            </p:nvSpPr>
-            <p:spPr>
-              <a:xfrm rot="10800000" flipH="1">
-                <a:off x="4990894" y="1102754"/>
-                <a:ext cx="277140" cy="338178"/>
-              </a:xfrm>
-              <a:prstGeom prst="foldedCorner">
-                <a:avLst>
-                  <a:gd name="adj" fmla="val 44103"/>
-                </a:avLst>
-              </a:prstGeom>
-              <a:solidFill>
-                <a:schemeClr val="bg1"/>
-              </a:solidFill>
-              <a:ln>
-                <a:solidFill>
-                  <a:schemeClr val="tx1"/>
-                </a:solidFill>
-              </a:ln>
-            </p:spPr>
-            <p:style>
-              <a:lnRef idx="2">
-                <a:schemeClr val="accent1">
-                  <a:shade val="50000"/>
-                </a:schemeClr>
-              </a:lnRef>
-              <a:fillRef idx="1">
-                <a:schemeClr val="accent1"/>
-              </a:fillRef>
-              <a:effectRef idx="0">
-                <a:schemeClr val="accent1"/>
-              </a:effectRef>
-              <a:fontRef idx="minor">
-                <a:schemeClr val="lt1"/>
-              </a:fontRef>
-            </p:style>
-            <p:txBody>
-              <a:bodyPr rtlCol="0" anchor="ctr"/>
-              <a:lstStyle/>
-              <a:p>
-                <a:pPr algn="ctr"/>
-                <a:endParaRPr lang="en-US"/>
-              </a:p>
-            </p:txBody>
-          </p:sp>
-          <p:sp>
-            <p:nvSpPr>
-              <p:cNvPr id="25" name="Rounded Rectangle 227"/>
-              <p:cNvSpPr/>
-              <p:nvPr/>
-            </p:nvSpPr>
-            <p:spPr>
-              <a:xfrm rot="10800000">
-                <a:off x="4879960" y="919204"/>
-                <a:ext cx="234247" cy="101171"/>
-              </a:xfrm>
-              <a:custGeom>
-                <a:avLst/>
-                <a:gdLst/>
-                <a:ahLst/>
-                <a:cxnLst/>
-                <a:rect l="l" t="t" r="r" b="b"/>
-                <a:pathLst>
-                  <a:path w="286327" h="1000124">
-                    <a:moveTo>
-                      <a:pt x="2115" y="0"/>
-                    </a:moveTo>
-                    <a:lnTo>
-                      <a:pt x="284212" y="0"/>
-                    </a:lnTo>
-                    <a:cubicBezTo>
-                      <a:pt x="286188" y="3367"/>
-                      <a:pt x="286327" y="6905"/>
-                      <a:pt x="286327" y="10476"/>
-                    </a:cubicBezTo>
-                    <a:lnTo>
-                      <a:pt x="286327" y="712825"/>
-                    </a:lnTo>
-                    <a:cubicBezTo>
-                      <a:pt x="286327" y="772047"/>
-                      <a:pt x="247915" y="822299"/>
-                      <a:pt x="194109" y="838409"/>
-                    </a:cubicBezTo>
-                    <a:cubicBezTo>
-                      <a:pt x="194108" y="875332"/>
-                      <a:pt x="194108" y="912256"/>
-                      <a:pt x="194108" y="949179"/>
-                    </a:cubicBezTo>
-                    <a:cubicBezTo>
-                      <a:pt x="194108" y="977315"/>
-                      <a:pt x="171299" y="1000124"/>
-                      <a:pt x="143163" y="1000124"/>
-                    </a:cubicBezTo>
-                    <a:lnTo>
-                      <a:pt x="143164" y="1000123"/>
-                    </a:lnTo>
-                    <a:cubicBezTo>
-                      <a:pt x="115028" y="1000123"/>
-                      <a:pt x="92219" y="977314"/>
-                      <a:pt x="92219" y="949178"/>
-                    </a:cubicBezTo>
-                    <a:lnTo>
-                      <a:pt x="92219" y="838409"/>
-                    </a:lnTo>
-                    <a:cubicBezTo>
-                      <a:pt x="38413" y="822299"/>
-                      <a:pt x="0" y="772048"/>
-                      <a:pt x="0" y="712825"/>
-                    </a:cubicBezTo>
-                    <a:lnTo>
-                      <a:pt x="0" y="10476"/>
-                    </a:lnTo>
-                    <a:close/>
-                  </a:path>
-                </a:pathLst>
-              </a:custGeom>
-              <a:solidFill>
-                <a:schemeClr val="tx1"/>
-              </a:solidFill>
-              <a:ln w="19050">
-                <a:solidFill>
-                  <a:schemeClr val="bg1"/>
-                </a:solidFill>
-              </a:ln>
-            </p:spPr>
-            <p:style>
-              <a:lnRef idx="2">
-                <a:schemeClr val="accent1">
-                  <a:shade val="50000"/>
-                </a:schemeClr>
-              </a:lnRef>
-              <a:fillRef idx="1">
-                <a:schemeClr val="accent1"/>
-              </a:fillRef>
-              <a:effectRef idx="0">
-                <a:schemeClr val="accent1"/>
-              </a:effectRef>
-              <a:fontRef idx="minor">
-                <a:schemeClr val="lt1"/>
-              </a:fontRef>
-            </p:style>
-            <p:txBody>
-              <a:bodyPr rtlCol="0" anchor="ctr"/>
-              <a:lstStyle/>
-              <a:p>
-                <a:pPr algn="ctr"/>
-                <a:endParaRPr lang="en-SG"/>
-              </a:p>
-            </p:txBody>
-          </p:sp>
-        </p:grpSp>
-        <p:sp>
-          <p:nvSpPr>
-            <p:cNvPr id="20" name="Rectangle 19"/>
-            <p:cNvSpPr/>
-            <p:nvPr/>
-          </p:nvSpPr>
-          <p:spPr>
-            <a:xfrm rot="10800000">
-              <a:off x="4180111" y="1375544"/>
-              <a:ext cx="549071" cy="549822"/>
-            </a:xfrm>
-            <a:prstGeom prst="rect">
-              <a:avLst/>
-            </a:prstGeom>
-            <a:noFill/>
-            <a:ln>
-              <a:noFill/>
-            </a:ln>
-          </p:spPr>
-          <p:style>
-            <a:lnRef idx="2">
-              <a:schemeClr val="accent1">
-                <a:shade val="50000"/>
-              </a:schemeClr>
-            </a:lnRef>
-            <a:fillRef idx="1">
-              <a:schemeClr val="accent1"/>
-            </a:fillRef>
-            <a:effectRef idx="0">
-              <a:schemeClr val="accent1"/>
-            </a:effectRef>
-            <a:fontRef idx="minor">
-              <a:schemeClr val="lt1"/>
-            </a:fontRef>
-          </p:style>
-          <p:txBody>
-            <a:bodyPr wrap="none" lIns="0" tIns="0" rIns="0" bIns="0" rtlCol="0" anchor="ctr"/>
-            <a:lstStyle/>
-            <a:p>
-              <a:pPr algn="ctr"/>
-              <a:endParaRPr lang="en-US" b="1"/>
-            </a:p>
-          </p:txBody>
-        </p:sp>
-      </p:grpSp>
-      <p:sp>
-        <p:nvSpPr>
-          <p:cNvPr id="27" name="TextBox 26"/>
-          <p:cNvSpPr txBox="1"/>
-          <p:nvPr/>
-        </p:nvSpPr>
-        <p:spPr>
-          <a:xfrm>
-            <a:off x="2352579" y="1661781"/>
-            <a:ext cx="458399" cy="215444"/>
-          </a:xfrm>
-          <a:prstGeom prst="rect">
+          <a:custGeom>
             <a:avLst/>
-          </a:prstGeom>
+            <a:gdLst/>
+            <a:ahLst/>
+            <a:cxnLst/>
+            <a:rect l="l" t="t" r="r" b="b"/>
+            <a:pathLst>
+              <a:path w="1752603" h="1752600">
+                <a:moveTo>
+                  <a:pt x="533400" y="0"/>
+                </a:moveTo>
+                <a:lnTo>
+                  <a:pt x="533403" y="0"/>
+                </a:lnTo>
+                <a:lnTo>
+                  <a:pt x="1066800" y="0"/>
+                </a:lnTo>
+                <a:lnTo>
+                  <a:pt x="1752603" y="0"/>
+                </a:lnTo>
+                <a:lnTo>
+                  <a:pt x="1752603" y="1752600"/>
+                </a:lnTo>
+                <a:lnTo>
+                  <a:pt x="1219203" y="1752600"/>
+                </a:lnTo>
+                <a:lnTo>
+                  <a:pt x="533403" y="1752600"/>
+                </a:lnTo>
+                <a:lnTo>
+                  <a:pt x="3" y="1752600"/>
+                </a:lnTo>
+                <a:lnTo>
+                  <a:pt x="3" y="533430"/>
+                </a:lnTo>
+                <a:cubicBezTo>
+                  <a:pt x="0" y="533420"/>
+                  <a:pt x="0" y="533410"/>
+                  <a:pt x="0" y="533400"/>
+                </a:cubicBezTo>
+                <a:cubicBezTo>
+                  <a:pt x="0" y="238811"/>
+                  <a:pt x="238811" y="0"/>
+                  <a:pt x="533400" y="0"/>
+                </a:cubicBezTo>
+                <a:close/>
+              </a:path>
+            </a:pathLst>
+          </a:custGeom>
           <a:noFill/>
-        </p:spPr>
-        <p:txBody>
-          <a:bodyPr wrap="square" rtlCol="0">
-            <a:spAutoFit/>
-          </a:bodyPr>
-          <a:lstStyle/>
-          <a:p>
-            <a:r>
-              <a:rPr lang="en-US" sz="800" dirty="0" smtClean="0"/>
-              <a:t>Copy</a:t>
-            </a:r>
-            <a:endParaRPr lang="en-SG" sz="800" dirty="0"/>
-          </a:p>
-        </p:txBody>
-      </p:sp>
-      <p:sp>
-        <p:nvSpPr>
-          <p:cNvPr id="28" name="TextBox 27"/>
-          <p:cNvSpPr txBox="1"/>
-          <p:nvPr/>
-        </p:nvSpPr>
-        <p:spPr>
-          <a:xfrm>
-            <a:off x="3400394" y="1651827"/>
-            <a:ext cx="458399" cy="215444"/>
-          </a:xfrm>
-          <a:prstGeom prst="rect">
-            <a:avLst/>
-          </a:prstGeom>
-          <a:noFill/>
-        </p:spPr>
-        <p:txBody>
-          <a:bodyPr wrap="square" rtlCol="0">
-            <a:spAutoFit/>
-          </a:bodyPr>
-          <a:lstStyle/>
-          <a:p>
-            <a:r>
-              <a:rPr lang="en-US" sz="800" dirty="0" smtClean="0"/>
-              <a:t>Paste</a:t>
-            </a:r>
-            <a:endParaRPr lang="en-SG" sz="800" dirty="0"/>
-          </a:p>
-        </p:txBody>
-      </p:sp>
-      <p:sp>
-        <p:nvSpPr>
-          <p:cNvPr id="29" name="TextBox 28"/>
-          <p:cNvSpPr txBox="1"/>
-          <p:nvPr/>
-        </p:nvSpPr>
-        <p:spPr>
-          <a:xfrm>
-            <a:off x="4405396" y="1639351"/>
-            <a:ext cx="458399" cy="215444"/>
-          </a:xfrm>
-          <a:prstGeom prst="rect">
-            <a:avLst/>
-          </a:prstGeom>
-          <a:noFill/>
-        </p:spPr>
-        <p:txBody>
-          <a:bodyPr wrap="square" rtlCol="0">
-            <a:spAutoFit/>
-          </a:bodyPr>
-          <a:lstStyle/>
-          <a:p>
-            <a:r>
-              <a:rPr lang="en-US" sz="800" dirty="0" smtClean="0"/>
-              <a:t>Edit</a:t>
-            </a:r>
-            <a:endParaRPr lang="en-SG" sz="800" dirty="0"/>
-          </a:p>
-        </p:txBody>
-      </p:sp>
-      <p:sp>
-        <p:nvSpPr>
-          <p:cNvPr id="30" name="TextBox 29"/>
-          <p:cNvSpPr txBox="1"/>
-          <p:nvPr/>
-        </p:nvSpPr>
-        <p:spPr>
-          <a:xfrm>
-            <a:off x="5146859" y="1662105"/>
-            <a:ext cx="458399" cy="215444"/>
-          </a:xfrm>
-          <a:prstGeom prst="rect">
-            <a:avLst/>
-          </a:prstGeom>
-          <a:noFill/>
-        </p:spPr>
-        <p:txBody>
-          <a:bodyPr wrap="square" rtlCol="0">
-            <a:spAutoFit/>
-          </a:bodyPr>
-          <a:lstStyle/>
-          <a:p>
-            <a:r>
-              <a:rPr lang="en-US" sz="800" dirty="0" smtClean="0"/>
-              <a:t>Delete</a:t>
-            </a:r>
-            <a:endParaRPr lang="en-SG" sz="800" dirty="0"/>
-          </a:p>
-        </p:txBody>
-      </p:sp>
-      <p:sp>
-        <p:nvSpPr>
-          <p:cNvPr id="42" name="Rectangle 41"/>
-          <p:cNvSpPr/>
-          <p:nvPr/>
-        </p:nvSpPr>
-        <p:spPr>
-          <a:xfrm>
-            <a:off x="4902536" y="1662105"/>
-            <a:ext cx="502920" cy="502920"/>
-          </a:xfrm>
-          <a:prstGeom prst="rect">
-            <a:avLst/>
-          </a:prstGeom>
-          <a:noFill/>
-          <a:ln>
-            <a:noFill/>
+          <a:ln w="76200" cmpd="sng">
+            <a:solidFill>
+              <a:srgbClr val="0070C0"/>
+            </a:solidFill>
+            <a:miter lim="800000"/>
           </a:ln>
         </p:spPr>
         <p:style>
@@ -4196,394 +4010,46 @@
           </a:p>
         </p:txBody>
       </p:sp>
-      <p:grpSp>
-        <p:nvGrpSpPr>
-          <p:cNvPr id="11" name="Group 10"/>
-          <p:cNvGrpSpPr/>
+      <p:sp>
+        <p:nvSpPr>
+          <p:cNvPr id="10" name="TextBox 9"/>
+          <p:cNvSpPr txBox="1">
+            <a:spLocks/>
+          </p:cNvSpPr>
           <p:nvPr/>
-        </p:nvGrpSpPr>
-        <p:grpSpPr>
+        </p:nvSpPr>
+        <p:spPr>
           <a:xfrm>
-            <a:off x="4241386" y="1058959"/>
-            <a:ext cx="594360" cy="592408"/>
-            <a:chOff x="4040236" y="1080115"/>
-            <a:chExt cx="594360" cy="592408"/>
-          </a:xfrm>
-        </p:grpSpPr>
-        <p:grpSp>
-          <p:nvGrpSpPr>
-            <p:cNvPr id="7" name="Group 6"/>
-            <p:cNvGrpSpPr/>
-            <p:nvPr/>
-          </p:nvGrpSpPr>
-          <p:grpSpPr>
-            <a:xfrm rot="18268995">
-              <a:off x="4157961" y="1269633"/>
-              <a:ext cx="507936" cy="128900"/>
-              <a:chOff x="4361991" y="971632"/>
-              <a:chExt cx="507936" cy="128900"/>
-            </a:xfrm>
-          </p:grpSpPr>
-          <p:sp>
-            <p:nvSpPr>
-              <p:cNvPr id="5" name="Rectangle 4"/>
-              <p:cNvSpPr/>
-              <p:nvPr/>
-            </p:nvSpPr>
-            <p:spPr>
-              <a:xfrm rot="10800000" flipV="1">
-                <a:off x="4504167" y="972516"/>
-                <a:ext cx="365760" cy="128016"/>
-              </a:xfrm>
-              <a:prstGeom prst="rect">
-                <a:avLst/>
-              </a:prstGeom>
-              <a:solidFill>
-                <a:schemeClr val="tx1"/>
-              </a:solidFill>
-              <a:ln>
-                <a:noFill/>
-              </a:ln>
-            </p:spPr>
-            <p:style>
-              <a:lnRef idx="2">
-                <a:schemeClr val="dk1">
-                  <a:shade val="50000"/>
-                </a:schemeClr>
-              </a:lnRef>
-              <a:fillRef idx="1">
-                <a:schemeClr val="dk1"/>
-              </a:fillRef>
-              <a:effectRef idx="0">
-                <a:schemeClr val="dk1"/>
-              </a:effectRef>
-              <a:fontRef idx="minor">
-                <a:schemeClr val="lt1"/>
-              </a:fontRef>
-            </p:style>
-            <p:txBody>
-              <a:bodyPr rtlCol="0" anchor="ctr"/>
-              <a:lstStyle/>
-              <a:p>
-                <a:pPr algn="ctr"/>
-                <a:endParaRPr lang="en-US"/>
-              </a:p>
-            </p:txBody>
-          </p:sp>
-          <p:sp>
-            <p:nvSpPr>
-              <p:cNvPr id="6" name="Isosceles Triangle 5"/>
-              <p:cNvSpPr/>
-              <p:nvPr/>
-            </p:nvSpPr>
-            <p:spPr>
-              <a:xfrm rot="16200000">
-                <a:off x="4361991" y="971632"/>
-                <a:ext cx="128016" cy="128016"/>
-              </a:xfrm>
-              <a:prstGeom prst="triangle">
-                <a:avLst/>
-              </a:prstGeom>
-              <a:solidFill>
-                <a:schemeClr val="tx1"/>
-              </a:solidFill>
-              <a:ln>
-                <a:noFill/>
-              </a:ln>
-            </p:spPr>
-            <p:style>
-              <a:lnRef idx="2">
-                <a:schemeClr val="dk1">
-                  <a:shade val="50000"/>
-                </a:schemeClr>
-              </a:lnRef>
-              <a:fillRef idx="1">
-                <a:schemeClr val="dk1"/>
-              </a:fillRef>
-              <a:effectRef idx="0">
-                <a:schemeClr val="dk1"/>
-              </a:effectRef>
-              <a:fontRef idx="minor">
-                <a:schemeClr val="lt1"/>
-              </a:fontRef>
-            </p:style>
-            <p:txBody>
-              <a:bodyPr rtlCol="0" anchor="ctr"/>
-              <a:lstStyle/>
-              <a:p>
-                <a:pPr algn="ctr"/>
-                <a:endParaRPr lang="en-US"/>
-              </a:p>
-            </p:txBody>
-          </p:sp>
-        </p:grpSp>
-        <p:cxnSp>
-          <p:nvCxnSpPr>
-            <p:cNvPr id="9" name="Straight Connector 8"/>
-            <p:cNvCxnSpPr/>
-            <p:nvPr/>
-          </p:nvCxnSpPr>
-          <p:spPr>
-            <a:xfrm>
-              <a:off x="4153611" y="1260698"/>
-              <a:ext cx="150405" cy="38"/>
-            </a:xfrm>
-            <a:prstGeom prst="line">
-              <a:avLst/>
-            </a:prstGeom>
-            <a:ln w="38100" cap="rnd">
-              <a:solidFill>
-                <a:schemeClr val="tx1"/>
-              </a:solidFill>
-            </a:ln>
-          </p:spPr>
-          <p:style>
-            <a:lnRef idx="1">
-              <a:schemeClr val="accent1"/>
-            </a:lnRef>
-            <a:fillRef idx="0">
-              <a:schemeClr val="accent1"/>
-            </a:fillRef>
-            <a:effectRef idx="0">
-              <a:schemeClr val="accent1"/>
-            </a:effectRef>
-            <a:fontRef idx="minor">
-              <a:schemeClr val="tx1"/>
-            </a:fontRef>
-          </p:style>
-        </p:cxnSp>
-        <p:cxnSp>
-          <p:nvCxnSpPr>
-            <p:cNvPr id="32" name="Straight Connector 31"/>
-            <p:cNvCxnSpPr/>
-            <p:nvPr/>
-          </p:nvCxnSpPr>
-          <p:spPr>
-            <a:xfrm>
-              <a:off x="4148746" y="1620831"/>
-              <a:ext cx="377341" cy="0"/>
-            </a:xfrm>
-            <a:prstGeom prst="line">
-              <a:avLst/>
-            </a:prstGeom>
-            <a:ln w="38100" cap="rnd">
-              <a:solidFill>
-                <a:schemeClr val="tx1"/>
-              </a:solidFill>
-            </a:ln>
-          </p:spPr>
-          <p:style>
-            <a:lnRef idx="1">
-              <a:schemeClr val="accent1"/>
-            </a:lnRef>
-            <a:fillRef idx="0">
-              <a:schemeClr val="accent1"/>
-            </a:fillRef>
-            <a:effectRef idx="0">
-              <a:schemeClr val="accent1"/>
-            </a:effectRef>
-            <a:fontRef idx="minor">
-              <a:schemeClr val="tx1"/>
-            </a:fontRef>
-          </p:style>
-        </p:cxnSp>
-        <p:cxnSp>
-          <p:nvCxnSpPr>
-            <p:cNvPr id="34" name="Straight Connector 33"/>
-            <p:cNvCxnSpPr/>
-            <p:nvPr/>
-          </p:nvCxnSpPr>
-          <p:spPr>
-            <a:xfrm>
-              <a:off x="4141616" y="1260736"/>
-              <a:ext cx="0" cy="360678"/>
-            </a:xfrm>
-            <a:prstGeom prst="line">
-              <a:avLst/>
-            </a:prstGeom>
-            <a:ln w="38100" cap="rnd">
-              <a:solidFill>
-                <a:schemeClr val="tx1"/>
-              </a:solidFill>
-            </a:ln>
-          </p:spPr>
-          <p:style>
-            <a:lnRef idx="1">
-              <a:schemeClr val="accent1"/>
-            </a:lnRef>
-            <a:fillRef idx="0">
-              <a:schemeClr val="accent1"/>
-            </a:fillRef>
-            <a:effectRef idx="0">
-              <a:schemeClr val="accent1"/>
-            </a:effectRef>
-            <a:fontRef idx="minor">
-              <a:schemeClr val="tx1"/>
-            </a:fontRef>
-          </p:style>
-        </p:cxnSp>
-        <p:cxnSp>
-          <p:nvCxnSpPr>
-            <p:cNvPr id="37" name="Straight Connector 36"/>
-            <p:cNvCxnSpPr/>
-            <p:nvPr/>
-          </p:nvCxnSpPr>
-          <p:spPr>
-            <a:xfrm>
-              <a:off x="4535612" y="1403864"/>
-              <a:ext cx="0" cy="214399"/>
-            </a:xfrm>
-            <a:prstGeom prst="line">
-              <a:avLst/>
-            </a:prstGeom>
-            <a:ln w="38100" cap="rnd">
-              <a:solidFill>
-                <a:schemeClr val="tx1"/>
-              </a:solidFill>
-            </a:ln>
-          </p:spPr>
-          <p:style>
-            <a:lnRef idx="1">
-              <a:schemeClr val="accent1"/>
-            </a:lnRef>
-            <a:fillRef idx="0">
-              <a:schemeClr val="accent1"/>
-            </a:fillRef>
-            <a:effectRef idx="0">
-              <a:schemeClr val="accent1"/>
-            </a:effectRef>
-            <a:fontRef idx="minor">
-              <a:schemeClr val="tx1"/>
-            </a:fontRef>
-          </p:style>
-        </p:cxnSp>
-        <p:sp>
-          <p:nvSpPr>
-            <p:cNvPr id="45" name="Rectangle 44"/>
-            <p:cNvSpPr/>
-            <p:nvPr/>
-          </p:nvSpPr>
-          <p:spPr>
-            <a:xfrm>
-              <a:off x="4040236" y="1123883"/>
-              <a:ext cx="594360" cy="548640"/>
-            </a:xfrm>
-            <a:prstGeom prst="rect">
-              <a:avLst/>
-            </a:prstGeom>
-            <a:noFill/>
-            <a:ln>
-              <a:noFill/>
-            </a:ln>
-          </p:spPr>
-          <p:style>
-            <a:lnRef idx="2">
-              <a:schemeClr val="accent1">
-                <a:shade val="50000"/>
-              </a:schemeClr>
-            </a:lnRef>
-            <a:fillRef idx="1">
-              <a:schemeClr val="accent1"/>
-            </a:fillRef>
-            <a:effectRef idx="0">
-              <a:schemeClr val="accent1"/>
-            </a:effectRef>
-            <a:fontRef idx="minor">
-              <a:schemeClr val="lt1"/>
-            </a:fontRef>
-          </p:style>
-          <p:txBody>
-            <a:bodyPr rtlCol="0" anchor="ctr"/>
-            <a:lstStyle/>
-            <a:p>
-              <a:pPr algn="ctr"/>
-              <a:endParaRPr lang="en-US"/>
-            </a:p>
-          </p:txBody>
-        </p:sp>
-      </p:grpSp>
-      <p:pic>
-        <p:nvPicPr>
-          <p:cNvPr id="1026" name="Picture 2" descr="C:\Users\Ian\Desktop\New folder\SyncLabDeleteButton.png"/>
-          <p:cNvPicPr>
-            <a:picLocks noChangeAspect="1" noChangeArrowheads="1"/>
-          </p:cNvPicPr>
-          <p:nvPr/>
-        </p:nvPicPr>
-        <p:blipFill>
-          <a:blip r:embed="rId5">
-            <a:extLst>
-              <a:ext uri="{28A0092B-C50C-407E-A947-70E740481C1C}">
-                <a14:useLocalDpi xmlns:a14="http://schemas.microsoft.com/office/drawing/2010/main" val="0"/>
-              </a:ext>
-            </a:extLst>
-          </a:blip>
-          <a:srcRect/>
-          <a:stretch>
-            <a:fillRect/>
-          </a:stretch>
-        </p:blipFill>
-        <p:spPr bwMode="auto">
-          <a:xfrm>
-            <a:off x="5261759" y="1327266"/>
-            <a:ext cx="228600" cy="228600"/>
+            <a:off x="4029590" y="2261658"/>
+            <a:ext cx="516488" cy="892552"/>
           </a:xfrm>
           <a:prstGeom prst="rect">
             <a:avLst/>
           </a:prstGeom>
           <a:noFill/>
-          <a:extLst>
-            <a:ext uri="{909E8E84-426E-40DD-AFC4-6F175D3DCCD1}">
-              <a14:hiddenFill xmlns:a14="http://schemas.microsoft.com/office/drawing/2010/main">
+        </p:spPr>
+        <p:txBody>
+          <a:bodyPr wrap="none" rtlCol="0">
+            <a:spAutoFit/>
+          </a:bodyPr>
+          <a:lstStyle/>
+          <a:p>
+            <a:r>
+              <a:rPr lang="en-US" sz="5200" dirty="0" smtClean="0">
                 <a:solidFill>
-                  <a:srgbClr val="FFFFFF"/>
+                  <a:srgbClr val="E46A09"/>
                 </a:solidFill>
-              </a14:hiddenFill>
-            </a:ext>
-          </a:extLst>
-        </p:spPr>
-      </p:pic>
-      <p:pic>
-        <p:nvPicPr>
-          <p:cNvPr id="1027" name="Picture 3" descr="C:\Users\Ian\Desktop\SyncLabCopyButton.png"/>
-          <p:cNvPicPr>
-            <a:picLocks noChangeAspect="1" noChangeArrowheads="1"/>
-          </p:cNvPicPr>
-          <p:nvPr/>
-        </p:nvPicPr>
-        <p:blipFill>
-          <a:blip r:embed="rId6">
-            <a:extLst>
-              <a:ext uri="{28A0092B-C50C-407E-A947-70E740481C1C}">
-                <a14:useLocalDpi xmlns:a14="http://schemas.microsoft.com/office/drawing/2010/main" val="0"/>
-              </a:ext>
-            </a:extLst>
-          </a:blip>
-          <a:srcRect/>
-          <a:stretch>
-            <a:fillRect/>
-          </a:stretch>
-        </p:blipFill>
-        <p:spPr bwMode="auto">
-          <a:xfrm>
-            <a:off x="1972178" y="527873"/>
-            <a:ext cx="1219200" cy="1219200"/>
-          </a:xfrm>
-          <a:prstGeom prst="rect">
-            <a:avLst/>
-          </a:prstGeom>
-          <a:noFill/>
-          <a:extLst>
-            <a:ext uri="{909E8E84-426E-40DD-AFC4-6F175D3DCCD1}">
-              <a14:hiddenFill xmlns:a14="http://schemas.microsoft.com/office/drawing/2010/main">
-                <a:solidFill>
-                  <a:srgbClr val="FFFFFF"/>
-                </a:solidFill>
-              </a14:hiddenFill>
-            </a:ext>
-          </a:extLst>
-        </p:spPr>
-      </p:pic>
+              </a:rPr>
+              <a:t>=</a:t>
+            </a:r>
+            <a:endParaRPr lang="en-US" sz="5200" dirty="0">
+              <a:solidFill>
+                <a:srgbClr val="E46A09"/>
+              </a:solidFill>
+            </a:endParaRPr>
+          </a:p>
+        </p:txBody>
+      </p:sp>
     </p:spTree>
     <p:extLst>
       <p:ext uri="{BB962C8B-B14F-4D97-AF65-F5344CB8AC3E}">

</xml_diff>